<commit_message>
Added color coding for numbers
</commit_message>
<xml_diff>
--- a/ImpactCaseStudy-Segmentation.pptx
+++ b/ImpactCaseStudy-Segmentation.pptx
@@ -1153,6 +1153,13 @@
         </dgm:presLayoutVars>
       </dgm:prSet>
       <dgm:spPr/>
+      <dgm:t>
+        <a:bodyPr/>
+        <a:lstStyle/>
+        <a:p>
+          <a:endParaRPr lang="en-US"/>
+        </a:p>
+      </dgm:t>
     </dgm:pt>
     <dgm:pt modelId="{597E60A9-8AD6-4E1B-98AC-8509A1F3B292}" type="pres">
       <dgm:prSet presAssocID="{5DBE9D1E-6B8B-4464-8597-7F5151FC858D}" presName="hierRoot1" presStyleCnt="0"/>
@@ -1173,6 +1180,13 @@
         </dgm:presLayoutVars>
       </dgm:prSet>
       <dgm:spPr/>
+      <dgm:t>
+        <a:bodyPr/>
+        <a:lstStyle/>
+        <a:p>
+          <a:endParaRPr lang="en-US"/>
+        </a:p>
+      </dgm:t>
     </dgm:pt>
     <dgm:pt modelId="{FB707F5B-F856-433F-9D7E-7048E1053E8E}" type="pres">
       <dgm:prSet presAssocID="{5DBE9D1E-6B8B-4464-8597-7F5151FC858D}" presName="hierChild2" presStyleCnt="0"/>
@@ -1181,6 +1195,13 @@
     <dgm:pt modelId="{B97137C5-69F6-47B6-878D-242E88B7B49C}" type="pres">
       <dgm:prSet presAssocID="{675F8BAB-7C44-4E59-AC27-46D1E1E03C34}" presName="Name10" presStyleLbl="parChTrans1D2" presStyleIdx="0" presStyleCnt="4"/>
       <dgm:spPr/>
+      <dgm:t>
+        <a:bodyPr/>
+        <a:lstStyle/>
+        <a:p>
+          <a:endParaRPr lang="en-US"/>
+        </a:p>
+      </dgm:t>
     </dgm:pt>
     <dgm:pt modelId="{58126D5F-BC41-4B13-916F-7FA63C441719}" type="pres">
       <dgm:prSet presAssocID="{3F41E21A-00E8-4050-8797-1DF0B2ADCDA6}" presName="hierRoot2" presStyleCnt="0"/>
@@ -1201,6 +1222,13 @@
         </dgm:presLayoutVars>
       </dgm:prSet>
       <dgm:spPr/>
+      <dgm:t>
+        <a:bodyPr/>
+        <a:lstStyle/>
+        <a:p>
+          <a:endParaRPr lang="en-US"/>
+        </a:p>
+      </dgm:t>
     </dgm:pt>
     <dgm:pt modelId="{808A57A4-52A8-4737-A52D-F1BDFE12F458}" type="pres">
       <dgm:prSet presAssocID="{3F41E21A-00E8-4050-8797-1DF0B2ADCDA6}" presName="hierChild3" presStyleCnt="0"/>
@@ -1209,6 +1237,13 @@
     <dgm:pt modelId="{10C238A5-8CC6-4FED-B388-1D9027C2D290}" type="pres">
       <dgm:prSet presAssocID="{F1A1EE65-0271-4BA5-90C5-26300EE210EC}" presName="Name10" presStyleLbl="parChTrans1D2" presStyleIdx="1" presStyleCnt="4"/>
       <dgm:spPr/>
+      <dgm:t>
+        <a:bodyPr/>
+        <a:lstStyle/>
+        <a:p>
+          <a:endParaRPr lang="en-US"/>
+        </a:p>
+      </dgm:t>
     </dgm:pt>
     <dgm:pt modelId="{5BFE7617-AE28-4DB5-BCA9-6D646F2D96CE}" type="pres">
       <dgm:prSet presAssocID="{23E1773A-DB2D-4BEB-966B-3E79151C8AEC}" presName="hierRoot2" presStyleCnt="0"/>
@@ -1229,6 +1264,13 @@
         </dgm:presLayoutVars>
       </dgm:prSet>
       <dgm:spPr/>
+      <dgm:t>
+        <a:bodyPr/>
+        <a:lstStyle/>
+        <a:p>
+          <a:endParaRPr lang="en-US"/>
+        </a:p>
+      </dgm:t>
     </dgm:pt>
     <dgm:pt modelId="{82126AA5-9CE4-427C-BCFB-DB187DAF09CE}" type="pres">
       <dgm:prSet presAssocID="{23E1773A-DB2D-4BEB-966B-3E79151C8AEC}" presName="hierChild3" presStyleCnt="0"/>
@@ -1237,6 +1279,13 @@
     <dgm:pt modelId="{88A8F376-78F7-498E-A997-762DED87DC79}" type="pres">
       <dgm:prSet presAssocID="{62BEA221-65F2-4DB7-8B37-CEDE3E6018BE}" presName="Name10" presStyleLbl="parChTrans1D2" presStyleIdx="2" presStyleCnt="4"/>
       <dgm:spPr/>
+      <dgm:t>
+        <a:bodyPr/>
+        <a:lstStyle/>
+        <a:p>
+          <a:endParaRPr lang="en-US"/>
+        </a:p>
+      </dgm:t>
     </dgm:pt>
     <dgm:pt modelId="{E668DB85-515E-4D07-8D50-8283654D0E63}" type="pres">
       <dgm:prSet presAssocID="{CA1E18E3-CE6C-4154-BFC7-32A2848CC12E}" presName="hierRoot2" presStyleCnt="0"/>
@@ -1257,6 +1306,13 @@
         </dgm:presLayoutVars>
       </dgm:prSet>
       <dgm:spPr/>
+      <dgm:t>
+        <a:bodyPr/>
+        <a:lstStyle/>
+        <a:p>
+          <a:endParaRPr lang="en-US"/>
+        </a:p>
+      </dgm:t>
     </dgm:pt>
     <dgm:pt modelId="{C375A47B-A451-4A1B-80C8-ED0739FB3728}" type="pres">
       <dgm:prSet presAssocID="{CA1E18E3-CE6C-4154-BFC7-32A2848CC12E}" presName="hierChild3" presStyleCnt="0"/>
@@ -1281,6 +1337,13 @@
         </dgm:presLayoutVars>
       </dgm:prSet>
       <dgm:spPr/>
+      <dgm:t>
+        <a:bodyPr/>
+        <a:lstStyle/>
+        <a:p>
+          <a:endParaRPr lang="en-US"/>
+        </a:p>
+      </dgm:t>
     </dgm:pt>
     <dgm:pt modelId="{01C37877-1968-4F21-BF2E-F509B71BBE06}" type="pres">
       <dgm:prSet presAssocID="{D63D405B-6771-4EF4-B58C-330902096DC2}" presName="hierChild2" presStyleCnt="0"/>
@@ -1289,6 +1352,13 @@
     <dgm:pt modelId="{B5F55A30-A18C-4236-AF29-5279EB4C375C}" type="pres">
       <dgm:prSet presAssocID="{9CA9094D-3079-4FD8-A7C4-453178EF57A4}" presName="Name10" presStyleLbl="parChTrans1D2" presStyleIdx="3" presStyleCnt="4"/>
       <dgm:spPr/>
+      <dgm:t>
+        <a:bodyPr/>
+        <a:lstStyle/>
+        <a:p>
+          <a:endParaRPr lang="en-US"/>
+        </a:p>
+      </dgm:t>
     </dgm:pt>
     <dgm:pt modelId="{68055BEC-DFB0-4A13-BC50-D8AD4048679E}" type="pres">
       <dgm:prSet presAssocID="{F744E7C3-FACD-4A4B-9677-894563BC3079}" presName="hierRoot2" presStyleCnt="0"/>
@@ -1309,6 +1379,13 @@
         </dgm:presLayoutVars>
       </dgm:prSet>
       <dgm:spPr/>
+      <dgm:t>
+        <a:bodyPr/>
+        <a:lstStyle/>
+        <a:p>
+          <a:endParaRPr lang="en-US"/>
+        </a:p>
+      </dgm:t>
     </dgm:pt>
     <dgm:pt modelId="{D9D85008-4356-49BA-BD39-6CDBE2902146}" type="pres">
       <dgm:prSet presAssocID="{F744E7C3-FACD-4A4B-9677-894563BC3079}" presName="hierChild3" presStyleCnt="0"/>
@@ -1333,6 +1410,13 @@
         </dgm:presLayoutVars>
       </dgm:prSet>
       <dgm:spPr/>
+      <dgm:t>
+        <a:bodyPr/>
+        <a:lstStyle/>
+        <a:p>
+          <a:endParaRPr lang="en-US"/>
+        </a:p>
+      </dgm:t>
     </dgm:pt>
     <dgm:pt modelId="{B3096B30-32BD-442C-8D8F-7A3F9457CA18}" type="pres">
       <dgm:prSet presAssocID="{33677739-6CBB-4E4D-916B-C44D338393F9}" presName="hierChild2" presStyleCnt="0"/>
@@ -1340,25 +1424,25 @@
     </dgm:pt>
   </dgm:ptLst>
   <dgm:cxnLst>
-    <dgm:cxn modelId="{06B78C0B-0535-445D-80E0-0FADD2650AFA}" srcId="{17B86879-4164-4C4A-BEF3-28E6D402743E}" destId="{5DBE9D1E-6B8B-4464-8597-7F5151FC858D}" srcOrd="0" destOrd="0" parTransId="{3C9BE825-1BED-4859-9B34-30A90EAB1E83}" sibTransId="{85251A6C-D411-401C-92C4-27C62F2AF3C4}"/>
+    <dgm:cxn modelId="{D2E80544-F610-49DC-AD17-4068D9867E77}" type="presOf" srcId="{F1A1EE65-0271-4BA5-90C5-26300EE210EC}" destId="{10C238A5-8CC6-4FED-B388-1D9027C2D290}" srcOrd="0" destOrd="0" presId="urn:microsoft.com/office/officeart/2005/8/layout/hierarchy1"/>
+    <dgm:cxn modelId="{7E008B97-455F-4431-8D58-1DEDF790C499}" type="presOf" srcId="{3F41E21A-00E8-4050-8797-1DF0B2ADCDA6}" destId="{716E5B24-81A4-457E-BC6D-42B86BE22920}" srcOrd="0" destOrd="0" presId="urn:microsoft.com/office/officeart/2005/8/layout/hierarchy1"/>
+    <dgm:cxn modelId="{965EB4DB-E846-4E60-9810-BCD5D2A0C68C}" type="presOf" srcId="{33677739-6CBB-4E4D-916B-C44D338393F9}" destId="{1F5AA930-B0F1-4E69-A99B-73EC7FC57F61}" srcOrd="0" destOrd="0" presId="urn:microsoft.com/office/officeart/2005/8/layout/hierarchy1"/>
+    <dgm:cxn modelId="{62F31B7A-EB26-4B85-ABF6-23215E36E29A}" type="presOf" srcId="{23E1773A-DB2D-4BEB-966B-3E79151C8AEC}" destId="{0B4BCCE7-6284-4698-BD2B-2E30DC3142C9}" srcOrd="0" destOrd="0" presId="urn:microsoft.com/office/officeart/2005/8/layout/hierarchy1"/>
+    <dgm:cxn modelId="{A3F48469-B19E-4DA4-BF29-455677DBFCFE}" srcId="{5DBE9D1E-6B8B-4464-8597-7F5151FC858D}" destId="{23E1773A-DB2D-4BEB-966B-3E79151C8AEC}" srcOrd="1" destOrd="0" parTransId="{F1A1EE65-0271-4BA5-90C5-26300EE210EC}" sibTransId="{8A9F3D43-1094-45FD-B338-9820389F2DEF}"/>
+    <dgm:cxn modelId="{F1699A52-1A7C-45D4-B680-C94C34F7C373}" type="presOf" srcId="{17B86879-4164-4C4A-BEF3-28E6D402743E}" destId="{405214ED-D045-448F-8358-D256F466A327}" srcOrd="0" destOrd="0" presId="urn:microsoft.com/office/officeart/2005/8/layout/hierarchy1"/>
+    <dgm:cxn modelId="{8EEBDFE4-FE24-4AD6-A4D3-D557822B86C8}" srcId="{17B86879-4164-4C4A-BEF3-28E6D402743E}" destId="{D63D405B-6771-4EF4-B58C-330902096DC2}" srcOrd="1" destOrd="0" parTransId="{F3B88785-78B9-4F48-BC24-1952527E89B5}" sibTransId="{186C54E7-9B9B-463C-A752-83B1BD7E8962}"/>
+    <dgm:cxn modelId="{067B4D42-D809-4CF9-81CC-7C94EF68B748}" type="presOf" srcId="{D63D405B-6771-4EF4-B58C-330902096DC2}" destId="{69EE4296-0809-4F76-995B-68D85F372033}" srcOrd="0" destOrd="0" presId="urn:microsoft.com/office/officeart/2005/8/layout/hierarchy1"/>
+    <dgm:cxn modelId="{CA4B3768-F980-4DFA-BF35-74BC0B2AE72B}" srcId="{17B86879-4164-4C4A-BEF3-28E6D402743E}" destId="{33677739-6CBB-4E4D-916B-C44D338393F9}" srcOrd="2" destOrd="0" parTransId="{433D1B3E-0CBD-45FB-83AD-4DE975834E41}" sibTransId="{7D04900A-7CA2-4D86-BB6B-9393532C37D8}"/>
+    <dgm:cxn modelId="{220D85FF-DC72-46A0-910E-3706B607CE77}" type="presOf" srcId="{675F8BAB-7C44-4E59-AC27-46D1E1E03C34}" destId="{B97137C5-69F6-47B6-878D-242E88B7B49C}" srcOrd="0" destOrd="0" presId="urn:microsoft.com/office/officeart/2005/8/layout/hierarchy1"/>
+    <dgm:cxn modelId="{5EF939D8-8DAF-42E2-A105-4225894509D5}" srcId="{5DBE9D1E-6B8B-4464-8597-7F5151FC858D}" destId="{CA1E18E3-CE6C-4154-BFC7-32A2848CC12E}" srcOrd="2" destOrd="0" parTransId="{62BEA221-65F2-4DB7-8B37-CEDE3E6018BE}" sibTransId="{D72553E6-40C3-411C-9238-3BB9C56CBB09}"/>
+    <dgm:cxn modelId="{D7FEEADE-D1E8-4468-8187-1BB1E4031319}" srcId="{5DBE9D1E-6B8B-4464-8597-7F5151FC858D}" destId="{3F41E21A-00E8-4050-8797-1DF0B2ADCDA6}" srcOrd="0" destOrd="0" parTransId="{675F8BAB-7C44-4E59-AC27-46D1E1E03C34}" sibTransId="{0BF7DD9A-7FC2-4094-A615-6B5FFA007EA2}"/>
+    <dgm:cxn modelId="{4B537A6B-D77F-4258-9080-140DFBD39947}" type="presOf" srcId="{F744E7C3-FACD-4A4B-9677-894563BC3079}" destId="{30B4EFF9-8178-4D85-8A45-CA5C10A72F66}" srcOrd="0" destOrd="0" presId="urn:microsoft.com/office/officeart/2005/8/layout/hierarchy1"/>
+    <dgm:cxn modelId="{9628AD94-32AD-4687-B89A-64492E56304E}" type="presOf" srcId="{9CA9094D-3079-4FD8-A7C4-453178EF57A4}" destId="{B5F55A30-A18C-4236-AF29-5279EB4C375C}" srcOrd="0" destOrd="0" presId="urn:microsoft.com/office/officeart/2005/8/layout/hierarchy1"/>
     <dgm:cxn modelId="{24DC612D-28E6-4DEF-AE0B-813A6DA77A4D}" srcId="{D63D405B-6771-4EF4-B58C-330902096DC2}" destId="{F744E7C3-FACD-4A4B-9677-894563BC3079}" srcOrd="0" destOrd="0" parTransId="{9CA9094D-3079-4FD8-A7C4-453178EF57A4}" sibTransId="{D768A292-0FDB-4FF0-B63E-F004ED2E645C}"/>
     <dgm:cxn modelId="{F0324A5B-39DF-41ED-A8ED-A9E554A0FE13}" type="presOf" srcId="{5DBE9D1E-6B8B-4464-8597-7F5151FC858D}" destId="{24B01C29-C774-4AEF-B9D3-86ECB068D205}" srcOrd="0" destOrd="0" presId="urn:microsoft.com/office/officeart/2005/8/layout/hierarchy1"/>
-    <dgm:cxn modelId="{067B4D42-D809-4CF9-81CC-7C94EF68B748}" type="presOf" srcId="{D63D405B-6771-4EF4-B58C-330902096DC2}" destId="{69EE4296-0809-4F76-995B-68D85F372033}" srcOrd="0" destOrd="0" presId="urn:microsoft.com/office/officeart/2005/8/layout/hierarchy1"/>
-    <dgm:cxn modelId="{D2E80544-F610-49DC-AD17-4068D9867E77}" type="presOf" srcId="{F1A1EE65-0271-4BA5-90C5-26300EE210EC}" destId="{10C238A5-8CC6-4FED-B388-1D9027C2D290}" srcOrd="0" destOrd="0" presId="urn:microsoft.com/office/officeart/2005/8/layout/hierarchy1"/>
-    <dgm:cxn modelId="{CA4B3768-F980-4DFA-BF35-74BC0B2AE72B}" srcId="{17B86879-4164-4C4A-BEF3-28E6D402743E}" destId="{33677739-6CBB-4E4D-916B-C44D338393F9}" srcOrd="2" destOrd="0" parTransId="{433D1B3E-0CBD-45FB-83AD-4DE975834E41}" sibTransId="{7D04900A-7CA2-4D86-BB6B-9393532C37D8}"/>
-    <dgm:cxn modelId="{A3F48469-B19E-4DA4-BF29-455677DBFCFE}" srcId="{5DBE9D1E-6B8B-4464-8597-7F5151FC858D}" destId="{23E1773A-DB2D-4BEB-966B-3E79151C8AEC}" srcOrd="1" destOrd="0" parTransId="{F1A1EE65-0271-4BA5-90C5-26300EE210EC}" sibTransId="{8A9F3D43-1094-45FD-B338-9820389F2DEF}"/>
-    <dgm:cxn modelId="{4B537A6B-D77F-4258-9080-140DFBD39947}" type="presOf" srcId="{F744E7C3-FACD-4A4B-9677-894563BC3079}" destId="{30B4EFF9-8178-4D85-8A45-CA5C10A72F66}" srcOrd="0" destOrd="0" presId="urn:microsoft.com/office/officeart/2005/8/layout/hierarchy1"/>
-    <dgm:cxn modelId="{F1699A52-1A7C-45D4-B680-C94C34F7C373}" type="presOf" srcId="{17B86879-4164-4C4A-BEF3-28E6D402743E}" destId="{405214ED-D045-448F-8358-D256F466A327}" srcOrd="0" destOrd="0" presId="urn:microsoft.com/office/officeart/2005/8/layout/hierarchy1"/>
+    <dgm:cxn modelId="{ED7770FF-DF3A-44B3-B54B-E824F09897BF}" type="presOf" srcId="{CA1E18E3-CE6C-4154-BFC7-32A2848CC12E}" destId="{EC38DE71-BA1E-41AB-ABEC-67F23036DEE0}" srcOrd="0" destOrd="0" presId="urn:microsoft.com/office/officeart/2005/8/layout/hierarchy1"/>
+    <dgm:cxn modelId="{06B78C0B-0535-445D-80E0-0FADD2650AFA}" srcId="{17B86879-4164-4C4A-BEF3-28E6D402743E}" destId="{5DBE9D1E-6B8B-4464-8597-7F5151FC858D}" srcOrd="0" destOrd="0" parTransId="{3C9BE825-1BED-4859-9B34-30A90EAB1E83}" sibTransId="{85251A6C-D411-401C-92C4-27C62F2AF3C4}"/>
     <dgm:cxn modelId="{099C3D53-A164-40AA-97D5-28E16868E1AB}" type="presOf" srcId="{62BEA221-65F2-4DB7-8B37-CEDE3E6018BE}" destId="{88A8F376-78F7-498E-A997-762DED87DC79}" srcOrd="0" destOrd="0" presId="urn:microsoft.com/office/officeart/2005/8/layout/hierarchy1"/>
-    <dgm:cxn modelId="{62F31B7A-EB26-4B85-ABF6-23215E36E29A}" type="presOf" srcId="{23E1773A-DB2D-4BEB-966B-3E79151C8AEC}" destId="{0B4BCCE7-6284-4698-BD2B-2E30DC3142C9}" srcOrd="0" destOrd="0" presId="urn:microsoft.com/office/officeart/2005/8/layout/hierarchy1"/>
-    <dgm:cxn modelId="{9628AD94-32AD-4687-B89A-64492E56304E}" type="presOf" srcId="{9CA9094D-3079-4FD8-A7C4-453178EF57A4}" destId="{B5F55A30-A18C-4236-AF29-5279EB4C375C}" srcOrd="0" destOrd="0" presId="urn:microsoft.com/office/officeart/2005/8/layout/hierarchy1"/>
-    <dgm:cxn modelId="{7E008B97-455F-4431-8D58-1DEDF790C499}" type="presOf" srcId="{3F41E21A-00E8-4050-8797-1DF0B2ADCDA6}" destId="{716E5B24-81A4-457E-BC6D-42B86BE22920}" srcOrd="0" destOrd="0" presId="urn:microsoft.com/office/officeart/2005/8/layout/hierarchy1"/>
-    <dgm:cxn modelId="{5EF939D8-8DAF-42E2-A105-4225894509D5}" srcId="{5DBE9D1E-6B8B-4464-8597-7F5151FC858D}" destId="{CA1E18E3-CE6C-4154-BFC7-32A2848CC12E}" srcOrd="2" destOrd="0" parTransId="{62BEA221-65F2-4DB7-8B37-CEDE3E6018BE}" sibTransId="{D72553E6-40C3-411C-9238-3BB9C56CBB09}"/>
-    <dgm:cxn modelId="{965EB4DB-E846-4E60-9810-BCD5D2A0C68C}" type="presOf" srcId="{33677739-6CBB-4E4D-916B-C44D338393F9}" destId="{1F5AA930-B0F1-4E69-A99B-73EC7FC57F61}" srcOrd="0" destOrd="0" presId="urn:microsoft.com/office/officeart/2005/8/layout/hierarchy1"/>
-    <dgm:cxn modelId="{D7FEEADE-D1E8-4468-8187-1BB1E4031319}" srcId="{5DBE9D1E-6B8B-4464-8597-7F5151FC858D}" destId="{3F41E21A-00E8-4050-8797-1DF0B2ADCDA6}" srcOrd="0" destOrd="0" parTransId="{675F8BAB-7C44-4E59-AC27-46D1E1E03C34}" sibTransId="{0BF7DD9A-7FC2-4094-A615-6B5FFA007EA2}"/>
-    <dgm:cxn modelId="{8EEBDFE4-FE24-4AD6-A4D3-D557822B86C8}" srcId="{17B86879-4164-4C4A-BEF3-28E6D402743E}" destId="{D63D405B-6771-4EF4-B58C-330902096DC2}" srcOrd="1" destOrd="0" parTransId="{F3B88785-78B9-4F48-BC24-1952527E89B5}" sibTransId="{186C54E7-9B9B-463C-A752-83B1BD7E8962}"/>
-    <dgm:cxn modelId="{ED7770FF-DF3A-44B3-B54B-E824F09897BF}" type="presOf" srcId="{CA1E18E3-CE6C-4154-BFC7-32A2848CC12E}" destId="{EC38DE71-BA1E-41AB-ABEC-67F23036DEE0}" srcOrd="0" destOrd="0" presId="urn:microsoft.com/office/officeart/2005/8/layout/hierarchy1"/>
-    <dgm:cxn modelId="{220D85FF-DC72-46A0-910E-3706B607CE77}" type="presOf" srcId="{675F8BAB-7C44-4E59-AC27-46D1E1E03C34}" destId="{B97137C5-69F6-47B6-878D-242E88B7B49C}" srcOrd="0" destOrd="0" presId="urn:microsoft.com/office/officeart/2005/8/layout/hierarchy1"/>
     <dgm:cxn modelId="{7F5E21FA-1909-4291-94C8-6A7F0AA95893}" type="presParOf" srcId="{405214ED-D045-448F-8358-D256F466A327}" destId="{597E60A9-8AD6-4E1B-98AC-8509A1F3B292}" srcOrd="0" destOrd="0" presId="urn:microsoft.com/office/officeart/2005/8/layout/hierarchy1"/>
     <dgm:cxn modelId="{2C4B17E5-07B1-4453-930C-875C02BA87AB}" type="presParOf" srcId="{597E60A9-8AD6-4E1B-98AC-8509A1F3B292}" destId="{6F8A5B43-692C-4679-9ED2-527323F9776F}" srcOrd="0" destOrd="0" presId="urn:microsoft.com/office/officeart/2005/8/layout/hierarchy1"/>
     <dgm:cxn modelId="{620F9C69-FE03-4218-A8C2-6C7098C99710}" type="presParOf" srcId="{6F8A5B43-692C-4679-9ED2-527323F9776F}" destId="{A0ADFDFE-D015-47DE-8107-3F6B852113FD}" srcOrd="0" destOrd="0" presId="urn:microsoft.com/office/officeart/2005/8/layout/hierarchy1"/>
@@ -1761,7 +1845,7 @@
         </a:bodyPr>
         <a:lstStyle/>
         <a:p>
-          <a:pPr marL="0" lvl="0" indent="0" algn="ctr" defTabSz="444500">
+          <a:pPr lvl="0" algn="ctr" defTabSz="444500">
             <a:lnSpc>
               <a:spcPct val="90000"/>
             </a:lnSpc>
@@ -1771,7 +1855,6 @@
             <a:spcAft>
               <a:spcPct val="35000"/>
             </a:spcAft>
-            <a:buNone/>
           </a:pPr>
           <a:r>
             <a:rPr lang="en-US" sz="1000" u="sng" kern="1200"/>
@@ -1893,7 +1976,7 @@
         </a:bodyPr>
         <a:lstStyle/>
         <a:p>
-          <a:pPr marL="0" lvl="0" indent="0" algn="ctr" defTabSz="444500">
+          <a:pPr lvl="0" algn="ctr" defTabSz="444500">
             <a:lnSpc>
               <a:spcPct val="90000"/>
             </a:lnSpc>
@@ -1903,7 +1986,6 @@
             <a:spcAft>
               <a:spcPct val="35000"/>
             </a:spcAft>
-            <a:buNone/>
           </a:pPr>
           <a:r>
             <a:rPr lang="en-US" sz="1000" kern="1200"/>
@@ -2024,7 +2106,7 @@
         </a:bodyPr>
         <a:lstStyle/>
         <a:p>
-          <a:pPr marL="0" lvl="0" indent="0" algn="ctr" defTabSz="444500">
+          <a:pPr lvl="0" algn="ctr" defTabSz="444500">
             <a:lnSpc>
               <a:spcPct val="90000"/>
             </a:lnSpc>
@@ -2034,7 +2116,6 @@
             <a:spcAft>
               <a:spcPct val="35000"/>
             </a:spcAft>
-            <a:buNone/>
           </a:pPr>
           <a:r>
             <a:rPr lang="en-US" sz="1000" kern="1200"/>
@@ -2155,7 +2236,7 @@
         </a:bodyPr>
         <a:lstStyle/>
         <a:p>
-          <a:pPr marL="0" lvl="0" indent="0" algn="ctr" defTabSz="444500">
+          <a:pPr lvl="0" algn="ctr" defTabSz="444500">
             <a:lnSpc>
               <a:spcPct val="90000"/>
             </a:lnSpc>
@@ -2165,7 +2246,6 @@
             <a:spcAft>
               <a:spcPct val="35000"/>
             </a:spcAft>
-            <a:buNone/>
           </a:pPr>
           <a:r>
             <a:rPr lang="en-US" sz="1000" kern="1200"/>
@@ -2286,7 +2366,7 @@
         </a:bodyPr>
         <a:lstStyle/>
         <a:p>
-          <a:pPr marL="0" lvl="0" indent="0" algn="ctr" defTabSz="444500">
+          <a:pPr lvl="0" algn="ctr" defTabSz="444500">
             <a:lnSpc>
               <a:spcPct val="90000"/>
             </a:lnSpc>
@@ -2296,7 +2376,6 @@
             <a:spcAft>
               <a:spcPct val="35000"/>
             </a:spcAft>
-            <a:buNone/>
           </a:pPr>
           <a:r>
             <a:rPr lang="en-US" sz="1000" u="sng" kern="1200" dirty="0"/>
@@ -2421,7 +2500,7 @@
         </a:bodyPr>
         <a:lstStyle/>
         <a:p>
-          <a:pPr marL="0" lvl="0" indent="0" algn="ctr" defTabSz="444500">
+          <a:pPr lvl="0" algn="ctr" defTabSz="444500">
             <a:lnSpc>
               <a:spcPct val="90000"/>
             </a:lnSpc>
@@ -2431,7 +2510,6 @@
             <a:spcAft>
               <a:spcPct val="35000"/>
             </a:spcAft>
-            <a:buNone/>
           </a:pPr>
           <a:r>
             <a:rPr lang="en-US" sz="1000" kern="1200"/>
@@ -2552,7 +2630,7 @@
         </a:bodyPr>
         <a:lstStyle/>
         <a:p>
-          <a:pPr marL="0" lvl="0" indent="0" algn="ctr" defTabSz="444500">
+          <a:pPr lvl="0" algn="ctr" defTabSz="444500">
             <a:lnSpc>
               <a:spcPct val="90000"/>
             </a:lnSpc>
@@ -2562,7 +2640,6 @@
             <a:spcAft>
               <a:spcPct val="35000"/>
             </a:spcAft>
-            <a:buNone/>
           </a:pPr>
           <a:r>
             <a:rPr lang="en-US" sz="1000" kern="1200"/>
@@ -4198,7 +4275,7 @@
           <p:cNvPr id="2" name="Title 1">
             <a:extLst>
               <a:ext uri="{FF2B5EF4-FFF2-40B4-BE49-F238E27FC236}">
-                <a16:creationId xmlns:a16="http://schemas.microsoft.com/office/drawing/2014/main" id="{7A2A5E37-D398-66F6-AA5A-917CC0982E0C}"/>
+                <a16:creationId xmlns:a16="http://schemas.microsoft.com/office/drawing/2014/main" xmlns="" id="{7A2A5E37-D398-66F6-AA5A-917CC0982E0C}"/>
               </a:ext>
             </a:extLst>
           </p:cNvPr>
@@ -4235,7 +4312,7 @@
           <p:cNvPr id="3" name="Subtitle 2">
             <a:extLst>
               <a:ext uri="{FF2B5EF4-FFF2-40B4-BE49-F238E27FC236}">
-                <a16:creationId xmlns:a16="http://schemas.microsoft.com/office/drawing/2014/main" id="{EE0825E3-8F34-F38B-7463-4F39738E9AAE}"/>
+                <a16:creationId xmlns:a16="http://schemas.microsoft.com/office/drawing/2014/main" xmlns="" id="{EE0825E3-8F34-F38B-7463-4F39738E9AAE}"/>
               </a:ext>
             </a:extLst>
           </p:cNvPr>
@@ -4305,7 +4382,7 @@
           <p:cNvPr id="4" name="Date Placeholder 3">
             <a:extLst>
               <a:ext uri="{FF2B5EF4-FFF2-40B4-BE49-F238E27FC236}">
-                <a16:creationId xmlns:a16="http://schemas.microsoft.com/office/drawing/2014/main" id="{1A70BCA6-9757-50B4-3AA5-837768B1F8E6}"/>
+                <a16:creationId xmlns:a16="http://schemas.microsoft.com/office/drawing/2014/main" xmlns="" id="{1A70BCA6-9757-50B4-3AA5-837768B1F8E6}"/>
               </a:ext>
             </a:extLst>
           </p:cNvPr>
@@ -4334,7 +4411,7 @@
           <p:cNvPr id="5" name="Footer Placeholder 4">
             <a:extLst>
               <a:ext uri="{FF2B5EF4-FFF2-40B4-BE49-F238E27FC236}">
-                <a16:creationId xmlns:a16="http://schemas.microsoft.com/office/drawing/2014/main" id="{6276BEAF-4D80-EE0A-5E99-2116DFBC3BC7}"/>
+                <a16:creationId xmlns:a16="http://schemas.microsoft.com/office/drawing/2014/main" xmlns="" id="{6276BEAF-4D80-EE0A-5E99-2116DFBC3BC7}"/>
               </a:ext>
             </a:extLst>
           </p:cNvPr>
@@ -4359,7 +4436,7 @@
           <p:cNvPr id="6" name="Slide Number Placeholder 5">
             <a:extLst>
               <a:ext uri="{FF2B5EF4-FFF2-40B4-BE49-F238E27FC236}">
-                <a16:creationId xmlns:a16="http://schemas.microsoft.com/office/drawing/2014/main" id="{4753E563-FEDB-98B1-CF89-4BB68ECD020F}"/>
+                <a16:creationId xmlns:a16="http://schemas.microsoft.com/office/drawing/2014/main" xmlns="" id="{4753E563-FEDB-98B1-CF89-4BB68ECD020F}"/>
               </a:ext>
             </a:extLst>
           </p:cNvPr>
@@ -4418,7 +4495,7 @@
           <p:cNvPr id="2" name="Title 1">
             <a:extLst>
               <a:ext uri="{FF2B5EF4-FFF2-40B4-BE49-F238E27FC236}">
-                <a16:creationId xmlns:a16="http://schemas.microsoft.com/office/drawing/2014/main" id="{E88CB0DA-5EB7-97ED-7C9F-6A7D4641914E}"/>
+                <a16:creationId xmlns:a16="http://schemas.microsoft.com/office/drawing/2014/main" xmlns="" id="{E88CB0DA-5EB7-97ED-7C9F-6A7D4641914E}"/>
               </a:ext>
             </a:extLst>
           </p:cNvPr>
@@ -4446,7 +4523,7 @@
           <p:cNvPr id="3" name="Vertical Text Placeholder 2">
             <a:extLst>
               <a:ext uri="{FF2B5EF4-FFF2-40B4-BE49-F238E27FC236}">
-                <a16:creationId xmlns:a16="http://schemas.microsoft.com/office/drawing/2014/main" id="{009CCC96-9D79-08C3-08B0-3D537A121433}"/>
+                <a16:creationId xmlns:a16="http://schemas.microsoft.com/office/drawing/2014/main" xmlns="" id="{009CCC96-9D79-08C3-08B0-3D537A121433}"/>
               </a:ext>
             </a:extLst>
           </p:cNvPr>
@@ -4503,7 +4580,7 @@
           <p:cNvPr id="4" name="Date Placeholder 3">
             <a:extLst>
               <a:ext uri="{FF2B5EF4-FFF2-40B4-BE49-F238E27FC236}">
-                <a16:creationId xmlns:a16="http://schemas.microsoft.com/office/drawing/2014/main" id="{D96C4C39-D73E-DE86-CF8F-BDA6EA78A5B2}"/>
+                <a16:creationId xmlns:a16="http://schemas.microsoft.com/office/drawing/2014/main" xmlns="" id="{D96C4C39-D73E-DE86-CF8F-BDA6EA78A5B2}"/>
               </a:ext>
             </a:extLst>
           </p:cNvPr>
@@ -4532,7 +4609,7 @@
           <p:cNvPr id="5" name="Footer Placeholder 4">
             <a:extLst>
               <a:ext uri="{FF2B5EF4-FFF2-40B4-BE49-F238E27FC236}">
-                <a16:creationId xmlns:a16="http://schemas.microsoft.com/office/drawing/2014/main" id="{8A43EF58-BF77-C888-E9E7-D09AD774A0B2}"/>
+                <a16:creationId xmlns:a16="http://schemas.microsoft.com/office/drawing/2014/main" xmlns="" id="{8A43EF58-BF77-C888-E9E7-D09AD774A0B2}"/>
               </a:ext>
             </a:extLst>
           </p:cNvPr>
@@ -4557,7 +4634,7 @@
           <p:cNvPr id="6" name="Slide Number Placeholder 5">
             <a:extLst>
               <a:ext uri="{FF2B5EF4-FFF2-40B4-BE49-F238E27FC236}">
-                <a16:creationId xmlns:a16="http://schemas.microsoft.com/office/drawing/2014/main" id="{9A74AC31-65C4-9A4D-1E6B-897D009C09BD}"/>
+                <a16:creationId xmlns:a16="http://schemas.microsoft.com/office/drawing/2014/main" xmlns="" id="{9A74AC31-65C4-9A4D-1E6B-897D009C09BD}"/>
               </a:ext>
             </a:extLst>
           </p:cNvPr>
@@ -4616,7 +4693,7 @@
           <p:cNvPr id="2" name="Vertical Title 1">
             <a:extLst>
               <a:ext uri="{FF2B5EF4-FFF2-40B4-BE49-F238E27FC236}">
-                <a16:creationId xmlns:a16="http://schemas.microsoft.com/office/drawing/2014/main" id="{078B1510-81E3-5D1F-5133-FAB244B1BABF}"/>
+                <a16:creationId xmlns:a16="http://schemas.microsoft.com/office/drawing/2014/main" xmlns="" id="{078B1510-81E3-5D1F-5133-FAB244B1BABF}"/>
               </a:ext>
             </a:extLst>
           </p:cNvPr>
@@ -4649,7 +4726,7 @@
           <p:cNvPr id="3" name="Vertical Text Placeholder 2">
             <a:extLst>
               <a:ext uri="{FF2B5EF4-FFF2-40B4-BE49-F238E27FC236}">
-                <a16:creationId xmlns:a16="http://schemas.microsoft.com/office/drawing/2014/main" id="{7489E0B1-339F-F431-2663-8B9447674540}"/>
+                <a16:creationId xmlns:a16="http://schemas.microsoft.com/office/drawing/2014/main" xmlns="" id="{7489E0B1-339F-F431-2663-8B9447674540}"/>
               </a:ext>
             </a:extLst>
           </p:cNvPr>
@@ -4711,7 +4788,7 @@
           <p:cNvPr id="4" name="Date Placeholder 3">
             <a:extLst>
               <a:ext uri="{FF2B5EF4-FFF2-40B4-BE49-F238E27FC236}">
-                <a16:creationId xmlns:a16="http://schemas.microsoft.com/office/drawing/2014/main" id="{FF9E3D2C-2905-1229-13BF-90294D2E14F2}"/>
+                <a16:creationId xmlns:a16="http://schemas.microsoft.com/office/drawing/2014/main" xmlns="" id="{FF9E3D2C-2905-1229-13BF-90294D2E14F2}"/>
               </a:ext>
             </a:extLst>
           </p:cNvPr>
@@ -4740,7 +4817,7 @@
           <p:cNvPr id="5" name="Footer Placeholder 4">
             <a:extLst>
               <a:ext uri="{FF2B5EF4-FFF2-40B4-BE49-F238E27FC236}">
-                <a16:creationId xmlns:a16="http://schemas.microsoft.com/office/drawing/2014/main" id="{8122D9F8-BF13-E8F6-2A04-F1736835440F}"/>
+                <a16:creationId xmlns:a16="http://schemas.microsoft.com/office/drawing/2014/main" xmlns="" id="{8122D9F8-BF13-E8F6-2A04-F1736835440F}"/>
               </a:ext>
             </a:extLst>
           </p:cNvPr>
@@ -4765,7 +4842,7 @@
           <p:cNvPr id="6" name="Slide Number Placeholder 5">
             <a:extLst>
               <a:ext uri="{FF2B5EF4-FFF2-40B4-BE49-F238E27FC236}">
-                <a16:creationId xmlns:a16="http://schemas.microsoft.com/office/drawing/2014/main" id="{78801886-A25A-CA0F-31ED-72DA319B6780}"/>
+                <a16:creationId xmlns:a16="http://schemas.microsoft.com/office/drawing/2014/main" xmlns="" id="{78801886-A25A-CA0F-31ED-72DA319B6780}"/>
               </a:ext>
             </a:extLst>
           </p:cNvPr>
@@ -4824,7 +4901,7 @@
           <p:cNvPr id="2" name="Title 1">
             <a:extLst>
               <a:ext uri="{FF2B5EF4-FFF2-40B4-BE49-F238E27FC236}">
-                <a16:creationId xmlns:a16="http://schemas.microsoft.com/office/drawing/2014/main" id="{5A703261-7A2A-1A20-1FD2-2405EB76FA17}"/>
+                <a16:creationId xmlns:a16="http://schemas.microsoft.com/office/drawing/2014/main" xmlns="" id="{5A703261-7A2A-1A20-1FD2-2405EB76FA17}"/>
               </a:ext>
             </a:extLst>
           </p:cNvPr>
@@ -4852,7 +4929,7 @@
           <p:cNvPr id="3" name="Content Placeholder 2">
             <a:extLst>
               <a:ext uri="{FF2B5EF4-FFF2-40B4-BE49-F238E27FC236}">
-                <a16:creationId xmlns:a16="http://schemas.microsoft.com/office/drawing/2014/main" id="{143C4F60-1138-CFBB-34B7-0EEAFB62274F}"/>
+                <a16:creationId xmlns:a16="http://schemas.microsoft.com/office/drawing/2014/main" xmlns="" id="{143C4F60-1138-CFBB-34B7-0EEAFB62274F}"/>
               </a:ext>
             </a:extLst>
           </p:cNvPr>
@@ -4909,7 +4986,7 @@
           <p:cNvPr id="4" name="Date Placeholder 3">
             <a:extLst>
               <a:ext uri="{FF2B5EF4-FFF2-40B4-BE49-F238E27FC236}">
-                <a16:creationId xmlns:a16="http://schemas.microsoft.com/office/drawing/2014/main" id="{05990DDC-11BD-883A-37FA-AAD7EA9F7B6B}"/>
+                <a16:creationId xmlns:a16="http://schemas.microsoft.com/office/drawing/2014/main" xmlns="" id="{05990DDC-11BD-883A-37FA-AAD7EA9F7B6B}"/>
               </a:ext>
             </a:extLst>
           </p:cNvPr>
@@ -4938,7 +5015,7 @@
           <p:cNvPr id="5" name="Footer Placeholder 4">
             <a:extLst>
               <a:ext uri="{FF2B5EF4-FFF2-40B4-BE49-F238E27FC236}">
-                <a16:creationId xmlns:a16="http://schemas.microsoft.com/office/drawing/2014/main" id="{6BA5E8E3-363D-BE7C-186D-5241674CE972}"/>
+                <a16:creationId xmlns:a16="http://schemas.microsoft.com/office/drawing/2014/main" xmlns="" id="{6BA5E8E3-363D-BE7C-186D-5241674CE972}"/>
               </a:ext>
             </a:extLst>
           </p:cNvPr>
@@ -4963,7 +5040,7 @@
           <p:cNvPr id="6" name="Slide Number Placeholder 5">
             <a:extLst>
               <a:ext uri="{FF2B5EF4-FFF2-40B4-BE49-F238E27FC236}">
-                <a16:creationId xmlns:a16="http://schemas.microsoft.com/office/drawing/2014/main" id="{C23190F6-71DC-DA26-FB04-B53D0C0F9620}"/>
+                <a16:creationId xmlns:a16="http://schemas.microsoft.com/office/drawing/2014/main" xmlns="" id="{C23190F6-71DC-DA26-FB04-B53D0C0F9620}"/>
               </a:ext>
             </a:extLst>
           </p:cNvPr>
@@ -5022,7 +5099,7 @@
           <p:cNvPr id="2" name="Title 1">
             <a:extLst>
               <a:ext uri="{FF2B5EF4-FFF2-40B4-BE49-F238E27FC236}">
-                <a16:creationId xmlns:a16="http://schemas.microsoft.com/office/drawing/2014/main" id="{168C8091-A375-E165-EA17-DF6FC40AC23C}"/>
+                <a16:creationId xmlns:a16="http://schemas.microsoft.com/office/drawing/2014/main" xmlns="" id="{168C8091-A375-E165-EA17-DF6FC40AC23C}"/>
               </a:ext>
             </a:extLst>
           </p:cNvPr>
@@ -5059,7 +5136,7 @@
           <p:cNvPr id="3" name="Text Placeholder 2">
             <a:extLst>
               <a:ext uri="{FF2B5EF4-FFF2-40B4-BE49-F238E27FC236}">
-                <a16:creationId xmlns:a16="http://schemas.microsoft.com/office/drawing/2014/main" id="{771C986D-2808-36C0-1C35-EF930F8400DD}"/>
+                <a16:creationId xmlns:a16="http://schemas.microsoft.com/office/drawing/2014/main" xmlns="" id="{771C986D-2808-36C0-1C35-EF930F8400DD}"/>
               </a:ext>
             </a:extLst>
           </p:cNvPr>
@@ -5184,7 +5261,7 @@
           <p:cNvPr id="4" name="Date Placeholder 3">
             <a:extLst>
               <a:ext uri="{FF2B5EF4-FFF2-40B4-BE49-F238E27FC236}">
-                <a16:creationId xmlns:a16="http://schemas.microsoft.com/office/drawing/2014/main" id="{82249AB4-6D3D-C501-9E4C-8CBFC4AA0E8C}"/>
+                <a16:creationId xmlns:a16="http://schemas.microsoft.com/office/drawing/2014/main" xmlns="" id="{82249AB4-6D3D-C501-9E4C-8CBFC4AA0E8C}"/>
               </a:ext>
             </a:extLst>
           </p:cNvPr>
@@ -5213,7 +5290,7 @@
           <p:cNvPr id="5" name="Footer Placeholder 4">
             <a:extLst>
               <a:ext uri="{FF2B5EF4-FFF2-40B4-BE49-F238E27FC236}">
-                <a16:creationId xmlns:a16="http://schemas.microsoft.com/office/drawing/2014/main" id="{57ADA977-8970-22A0-52EA-07E0D765E635}"/>
+                <a16:creationId xmlns:a16="http://schemas.microsoft.com/office/drawing/2014/main" xmlns="" id="{57ADA977-8970-22A0-52EA-07E0D765E635}"/>
               </a:ext>
             </a:extLst>
           </p:cNvPr>
@@ -5238,7 +5315,7 @@
           <p:cNvPr id="6" name="Slide Number Placeholder 5">
             <a:extLst>
               <a:ext uri="{FF2B5EF4-FFF2-40B4-BE49-F238E27FC236}">
-                <a16:creationId xmlns:a16="http://schemas.microsoft.com/office/drawing/2014/main" id="{877C26A7-10DB-47F0-B33C-4A5AB9555B08}"/>
+                <a16:creationId xmlns:a16="http://schemas.microsoft.com/office/drawing/2014/main" xmlns="" id="{877C26A7-10DB-47F0-B33C-4A5AB9555B08}"/>
               </a:ext>
             </a:extLst>
           </p:cNvPr>
@@ -5297,7 +5374,7 @@
           <p:cNvPr id="2" name="Title 1">
             <a:extLst>
               <a:ext uri="{FF2B5EF4-FFF2-40B4-BE49-F238E27FC236}">
-                <a16:creationId xmlns:a16="http://schemas.microsoft.com/office/drawing/2014/main" id="{39FED181-A0D3-7046-7CB6-B64F8D58BD30}"/>
+                <a16:creationId xmlns:a16="http://schemas.microsoft.com/office/drawing/2014/main" xmlns="" id="{39FED181-A0D3-7046-7CB6-B64F8D58BD30}"/>
               </a:ext>
             </a:extLst>
           </p:cNvPr>
@@ -5325,7 +5402,7 @@
           <p:cNvPr id="3" name="Content Placeholder 2">
             <a:extLst>
               <a:ext uri="{FF2B5EF4-FFF2-40B4-BE49-F238E27FC236}">
-                <a16:creationId xmlns:a16="http://schemas.microsoft.com/office/drawing/2014/main" id="{AC715562-BFB8-D203-CAFD-F450316F1694}"/>
+                <a16:creationId xmlns:a16="http://schemas.microsoft.com/office/drawing/2014/main" xmlns="" id="{AC715562-BFB8-D203-CAFD-F450316F1694}"/>
               </a:ext>
             </a:extLst>
           </p:cNvPr>
@@ -5387,7 +5464,7 @@
           <p:cNvPr id="4" name="Content Placeholder 3">
             <a:extLst>
               <a:ext uri="{FF2B5EF4-FFF2-40B4-BE49-F238E27FC236}">
-                <a16:creationId xmlns:a16="http://schemas.microsoft.com/office/drawing/2014/main" id="{273D8D36-A96B-2F53-73EF-57DE6D3BDDA3}"/>
+                <a16:creationId xmlns:a16="http://schemas.microsoft.com/office/drawing/2014/main" xmlns="" id="{273D8D36-A96B-2F53-73EF-57DE6D3BDDA3}"/>
               </a:ext>
             </a:extLst>
           </p:cNvPr>
@@ -5449,7 +5526,7 @@
           <p:cNvPr id="5" name="Date Placeholder 4">
             <a:extLst>
               <a:ext uri="{FF2B5EF4-FFF2-40B4-BE49-F238E27FC236}">
-                <a16:creationId xmlns:a16="http://schemas.microsoft.com/office/drawing/2014/main" id="{B18EA4A7-27FF-4F23-E241-4D01EEFB85D1}"/>
+                <a16:creationId xmlns:a16="http://schemas.microsoft.com/office/drawing/2014/main" xmlns="" id="{B18EA4A7-27FF-4F23-E241-4D01EEFB85D1}"/>
               </a:ext>
             </a:extLst>
           </p:cNvPr>
@@ -5478,7 +5555,7 @@
           <p:cNvPr id="6" name="Footer Placeholder 5">
             <a:extLst>
               <a:ext uri="{FF2B5EF4-FFF2-40B4-BE49-F238E27FC236}">
-                <a16:creationId xmlns:a16="http://schemas.microsoft.com/office/drawing/2014/main" id="{88C920EC-C468-BB47-442B-3FD483C58DC5}"/>
+                <a16:creationId xmlns:a16="http://schemas.microsoft.com/office/drawing/2014/main" xmlns="" id="{88C920EC-C468-BB47-442B-3FD483C58DC5}"/>
               </a:ext>
             </a:extLst>
           </p:cNvPr>
@@ -5503,7 +5580,7 @@
           <p:cNvPr id="7" name="Slide Number Placeholder 6">
             <a:extLst>
               <a:ext uri="{FF2B5EF4-FFF2-40B4-BE49-F238E27FC236}">
-                <a16:creationId xmlns:a16="http://schemas.microsoft.com/office/drawing/2014/main" id="{11DCFAE9-348B-E79A-CB94-571DFD4BBD2B}"/>
+                <a16:creationId xmlns:a16="http://schemas.microsoft.com/office/drawing/2014/main" xmlns="" id="{11DCFAE9-348B-E79A-CB94-571DFD4BBD2B}"/>
               </a:ext>
             </a:extLst>
           </p:cNvPr>
@@ -5562,7 +5639,7 @@
           <p:cNvPr id="2" name="Title 1">
             <a:extLst>
               <a:ext uri="{FF2B5EF4-FFF2-40B4-BE49-F238E27FC236}">
-                <a16:creationId xmlns:a16="http://schemas.microsoft.com/office/drawing/2014/main" id="{37A6A53B-2C1E-596A-4F9C-3FDEAC52E031}"/>
+                <a16:creationId xmlns:a16="http://schemas.microsoft.com/office/drawing/2014/main" xmlns="" id="{37A6A53B-2C1E-596A-4F9C-3FDEAC52E031}"/>
               </a:ext>
             </a:extLst>
           </p:cNvPr>
@@ -5595,7 +5672,7 @@
           <p:cNvPr id="3" name="Text Placeholder 2">
             <a:extLst>
               <a:ext uri="{FF2B5EF4-FFF2-40B4-BE49-F238E27FC236}">
-                <a16:creationId xmlns:a16="http://schemas.microsoft.com/office/drawing/2014/main" id="{50C0AEBC-C970-AF2F-AFFF-E0EFE3F040A2}"/>
+                <a16:creationId xmlns:a16="http://schemas.microsoft.com/office/drawing/2014/main" xmlns="" id="{50C0AEBC-C970-AF2F-AFFF-E0EFE3F040A2}"/>
               </a:ext>
             </a:extLst>
           </p:cNvPr>
@@ -5666,7 +5743,7 @@
           <p:cNvPr id="4" name="Content Placeholder 3">
             <a:extLst>
               <a:ext uri="{FF2B5EF4-FFF2-40B4-BE49-F238E27FC236}">
-                <a16:creationId xmlns:a16="http://schemas.microsoft.com/office/drawing/2014/main" id="{B876D550-7809-D34F-A80C-60E019B4488E}"/>
+                <a16:creationId xmlns:a16="http://schemas.microsoft.com/office/drawing/2014/main" xmlns="" id="{B876D550-7809-D34F-A80C-60E019B4488E}"/>
               </a:ext>
             </a:extLst>
           </p:cNvPr>
@@ -5728,7 +5805,7 @@
           <p:cNvPr id="5" name="Text Placeholder 4">
             <a:extLst>
               <a:ext uri="{FF2B5EF4-FFF2-40B4-BE49-F238E27FC236}">
-                <a16:creationId xmlns:a16="http://schemas.microsoft.com/office/drawing/2014/main" id="{31C1DA11-0C77-EFC7-E62A-868CF00C8E03}"/>
+                <a16:creationId xmlns:a16="http://schemas.microsoft.com/office/drawing/2014/main" xmlns="" id="{31C1DA11-0C77-EFC7-E62A-868CF00C8E03}"/>
               </a:ext>
             </a:extLst>
           </p:cNvPr>
@@ -5799,7 +5876,7 @@
           <p:cNvPr id="6" name="Content Placeholder 5">
             <a:extLst>
               <a:ext uri="{FF2B5EF4-FFF2-40B4-BE49-F238E27FC236}">
-                <a16:creationId xmlns:a16="http://schemas.microsoft.com/office/drawing/2014/main" id="{390DCEEE-9289-309E-9C85-2B8EDAFA3F36}"/>
+                <a16:creationId xmlns:a16="http://schemas.microsoft.com/office/drawing/2014/main" xmlns="" id="{390DCEEE-9289-309E-9C85-2B8EDAFA3F36}"/>
               </a:ext>
             </a:extLst>
           </p:cNvPr>
@@ -5861,7 +5938,7 @@
           <p:cNvPr id="7" name="Date Placeholder 6">
             <a:extLst>
               <a:ext uri="{FF2B5EF4-FFF2-40B4-BE49-F238E27FC236}">
-                <a16:creationId xmlns:a16="http://schemas.microsoft.com/office/drawing/2014/main" id="{2A759E31-099A-0C70-D05D-33124315B453}"/>
+                <a16:creationId xmlns:a16="http://schemas.microsoft.com/office/drawing/2014/main" xmlns="" id="{2A759E31-099A-0C70-D05D-33124315B453}"/>
               </a:ext>
             </a:extLst>
           </p:cNvPr>
@@ -5890,7 +5967,7 @@
           <p:cNvPr id="8" name="Footer Placeholder 7">
             <a:extLst>
               <a:ext uri="{FF2B5EF4-FFF2-40B4-BE49-F238E27FC236}">
-                <a16:creationId xmlns:a16="http://schemas.microsoft.com/office/drawing/2014/main" id="{7B7FAFEF-BED0-B3C8-6153-14F9164EE9C8}"/>
+                <a16:creationId xmlns:a16="http://schemas.microsoft.com/office/drawing/2014/main" xmlns="" id="{7B7FAFEF-BED0-B3C8-6153-14F9164EE9C8}"/>
               </a:ext>
             </a:extLst>
           </p:cNvPr>
@@ -5915,7 +5992,7 @@
           <p:cNvPr id="9" name="Slide Number Placeholder 8">
             <a:extLst>
               <a:ext uri="{FF2B5EF4-FFF2-40B4-BE49-F238E27FC236}">
-                <a16:creationId xmlns:a16="http://schemas.microsoft.com/office/drawing/2014/main" id="{D504848C-F74E-9411-6BAA-E79E751FD01E}"/>
+                <a16:creationId xmlns:a16="http://schemas.microsoft.com/office/drawing/2014/main" xmlns="" id="{D504848C-F74E-9411-6BAA-E79E751FD01E}"/>
               </a:ext>
             </a:extLst>
           </p:cNvPr>
@@ -5974,7 +6051,7 @@
           <p:cNvPr id="2" name="Title 1">
             <a:extLst>
               <a:ext uri="{FF2B5EF4-FFF2-40B4-BE49-F238E27FC236}">
-                <a16:creationId xmlns:a16="http://schemas.microsoft.com/office/drawing/2014/main" id="{0692EDDF-020E-B50E-12A8-A708F2913A76}"/>
+                <a16:creationId xmlns:a16="http://schemas.microsoft.com/office/drawing/2014/main" xmlns="" id="{0692EDDF-020E-B50E-12A8-A708F2913A76}"/>
               </a:ext>
             </a:extLst>
           </p:cNvPr>
@@ -6002,7 +6079,7 @@
           <p:cNvPr id="3" name="Date Placeholder 2">
             <a:extLst>
               <a:ext uri="{FF2B5EF4-FFF2-40B4-BE49-F238E27FC236}">
-                <a16:creationId xmlns:a16="http://schemas.microsoft.com/office/drawing/2014/main" id="{72653D0E-18D0-7749-961F-4D518D88BC43}"/>
+                <a16:creationId xmlns:a16="http://schemas.microsoft.com/office/drawing/2014/main" xmlns="" id="{72653D0E-18D0-7749-961F-4D518D88BC43}"/>
               </a:ext>
             </a:extLst>
           </p:cNvPr>
@@ -6031,7 +6108,7 @@
           <p:cNvPr id="4" name="Footer Placeholder 3">
             <a:extLst>
               <a:ext uri="{FF2B5EF4-FFF2-40B4-BE49-F238E27FC236}">
-                <a16:creationId xmlns:a16="http://schemas.microsoft.com/office/drawing/2014/main" id="{899D2591-13FF-7CD0-8AAB-3D85AB989CA7}"/>
+                <a16:creationId xmlns:a16="http://schemas.microsoft.com/office/drawing/2014/main" xmlns="" id="{899D2591-13FF-7CD0-8AAB-3D85AB989CA7}"/>
               </a:ext>
             </a:extLst>
           </p:cNvPr>
@@ -6056,7 +6133,7 @@
           <p:cNvPr id="5" name="Slide Number Placeholder 4">
             <a:extLst>
               <a:ext uri="{FF2B5EF4-FFF2-40B4-BE49-F238E27FC236}">
-                <a16:creationId xmlns:a16="http://schemas.microsoft.com/office/drawing/2014/main" id="{AD9F9DB2-96BD-939A-42B7-E3352D7F388E}"/>
+                <a16:creationId xmlns:a16="http://schemas.microsoft.com/office/drawing/2014/main" xmlns="" id="{AD9F9DB2-96BD-939A-42B7-E3352D7F388E}"/>
               </a:ext>
             </a:extLst>
           </p:cNvPr>
@@ -6115,7 +6192,7 @@
           <p:cNvPr id="2" name="Date Placeholder 1">
             <a:extLst>
               <a:ext uri="{FF2B5EF4-FFF2-40B4-BE49-F238E27FC236}">
-                <a16:creationId xmlns:a16="http://schemas.microsoft.com/office/drawing/2014/main" id="{545F36FC-9F3E-5C4A-A087-BC968B073DF4}"/>
+                <a16:creationId xmlns:a16="http://schemas.microsoft.com/office/drawing/2014/main" xmlns="" id="{545F36FC-9F3E-5C4A-A087-BC968B073DF4}"/>
               </a:ext>
             </a:extLst>
           </p:cNvPr>
@@ -6144,7 +6221,7 @@
           <p:cNvPr id="3" name="Footer Placeholder 2">
             <a:extLst>
               <a:ext uri="{FF2B5EF4-FFF2-40B4-BE49-F238E27FC236}">
-                <a16:creationId xmlns:a16="http://schemas.microsoft.com/office/drawing/2014/main" id="{3DCFDEE5-9BEC-8738-9D61-D4B276628941}"/>
+                <a16:creationId xmlns:a16="http://schemas.microsoft.com/office/drawing/2014/main" xmlns="" id="{3DCFDEE5-9BEC-8738-9D61-D4B276628941}"/>
               </a:ext>
             </a:extLst>
           </p:cNvPr>
@@ -6169,7 +6246,7 @@
           <p:cNvPr id="4" name="Slide Number Placeholder 3">
             <a:extLst>
               <a:ext uri="{FF2B5EF4-FFF2-40B4-BE49-F238E27FC236}">
-                <a16:creationId xmlns:a16="http://schemas.microsoft.com/office/drawing/2014/main" id="{E7793B07-5A0B-5191-7BB7-B7A87066F675}"/>
+                <a16:creationId xmlns:a16="http://schemas.microsoft.com/office/drawing/2014/main" xmlns="" id="{E7793B07-5A0B-5191-7BB7-B7A87066F675}"/>
               </a:ext>
             </a:extLst>
           </p:cNvPr>
@@ -6228,7 +6305,7 @@
           <p:cNvPr id="2" name="Title 1">
             <a:extLst>
               <a:ext uri="{FF2B5EF4-FFF2-40B4-BE49-F238E27FC236}">
-                <a16:creationId xmlns:a16="http://schemas.microsoft.com/office/drawing/2014/main" id="{CAE275D9-C49E-283D-B4DA-C95C4EB937C8}"/>
+                <a16:creationId xmlns:a16="http://schemas.microsoft.com/office/drawing/2014/main" xmlns="" id="{CAE275D9-C49E-283D-B4DA-C95C4EB937C8}"/>
               </a:ext>
             </a:extLst>
           </p:cNvPr>
@@ -6265,7 +6342,7 @@
           <p:cNvPr id="3" name="Content Placeholder 2">
             <a:extLst>
               <a:ext uri="{FF2B5EF4-FFF2-40B4-BE49-F238E27FC236}">
-                <a16:creationId xmlns:a16="http://schemas.microsoft.com/office/drawing/2014/main" id="{994A145B-8063-FC3D-69F8-F09BEFED2958}"/>
+                <a16:creationId xmlns:a16="http://schemas.microsoft.com/office/drawing/2014/main" xmlns="" id="{994A145B-8063-FC3D-69F8-F09BEFED2958}"/>
               </a:ext>
             </a:extLst>
           </p:cNvPr>
@@ -6355,7 +6432,7 @@
           <p:cNvPr id="4" name="Text Placeholder 3">
             <a:extLst>
               <a:ext uri="{FF2B5EF4-FFF2-40B4-BE49-F238E27FC236}">
-                <a16:creationId xmlns:a16="http://schemas.microsoft.com/office/drawing/2014/main" id="{A4125132-F9F6-C2A6-22A9-C9F368A07CAA}"/>
+                <a16:creationId xmlns:a16="http://schemas.microsoft.com/office/drawing/2014/main" xmlns="" id="{A4125132-F9F6-C2A6-22A9-C9F368A07CAA}"/>
               </a:ext>
             </a:extLst>
           </p:cNvPr>
@@ -6426,7 +6503,7 @@
           <p:cNvPr id="5" name="Date Placeholder 4">
             <a:extLst>
               <a:ext uri="{FF2B5EF4-FFF2-40B4-BE49-F238E27FC236}">
-                <a16:creationId xmlns:a16="http://schemas.microsoft.com/office/drawing/2014/main" id="{0A4B05D7-244D-8BFD-9AD4-D5456A7E4186}"/>
+                <a16:creationId xmlns:a16="http://schemas.microsoft.com/office/drawing/2014/main" xmlns="" id="{0A4B05D7-244D-8BFD-9AD4-D5456A7E4186}"/>
               </a:ext>
             </a:extLst>
           </p:cNvPr>
@@ -6455,7 +6532,7 @@
           <p:cNvPr id="6" name="Footer Placeholder 5">
             <a:extLst>
               <a:ext uri="{FF2B5EF4-FFF2-40B4-BE49-F238E27FC236}">
-                <a16:creationId xmlns:a16="http://schemas.microsoft.com/office/drawing/2014/main" id="{AC7F08B4-45EA-86FF-3FB2-A77657C33F7E}"/>
+                <a16:creationId xmlns:a16="http://schemas.microsoft.com/office/drawing/2014/main" xmlns="" id="{AC7F08B4-45EA-86FF-3FB2-A77657C33F7E}"/>
               </a:ext>
             </a:extLst>
           </p:cNvPr>
@@ -6480,7 +6557,7 @@
           <p:cNvPr id="7" name="Slide Number Placeholder 6">
             <a:extLst>
               <a:ext uri="{FF2B5EF4-FFF2-40B4-BE49-F238E27FC236}">
-                <a16:creationId xmlns:a16="http://schemas.microsoft.com/office/drawing/2014/main" id="{9611D0B8-C793-2065-C072-E12C85FF6543}"/>
+                <a16:creationId xmlns:a16="http://schemas.microsoft.com/office/drawing/2014/main" xmlns="" id="{9611D0B8-C793-2065-C072-E12C85FF6543}"/>
               </a:ext>
             </a:extLst>
           </p:cNvPr>
@@ -6539,7 +6616,7 @@
           <p:cNvPr id="2" name="Title 1">
             <a:extLst>
               <a:ext uri="{FF2B5EF4-FFF2-40B4-BE49-F238E27FC236}">
-                <a16:creationId xmlns:a16="http://schemas.microsoft.com/office/drawing/2014/main" id="{F07ADCDE-9084-1909-178E-99066B66087A}"/>
+                <a16:creationId xmlns:a16="http://schemas.microsoft.com/office/drawing/2014/main" xmlns="" id="{F07ADCDE-9084-1909-178E-99066B66087A}"/>
               </a:ext>
             </a:extLst>
           </p:cNvPr>
@@ -6576,7 +6653,7 @@
           <p:cNvPr id="3" name="Picture Placeholder 2">
             <a:extLst>
               <a:ext uri="{FF2B5EF4-FFF2-40B4-BE49-F238E27FC236}">
-                <a16:creationId xmlns:a16="http://schemas.microsoft.com/office/drawing/2014/main" id="{A5A3892F-9DA1-751D-9334-73B94BAC3BBF}"/>
+                <a16:creationId xmlns:a16="http://schemas.microsoft.com/office/drawing/2014/main" xmlns="" id="{A5A3892F-9DA1-751D-9334-73B94BAC3BBF}"/>
               </a:ext>
             </a:extLst>
           </p:cNvPr>
@@ -6643,7 +6720,7 @@
           <p:cNvPr id="4" name="Text Placeholder 3">
             <a:extLst>
               <a:ext uri="{FF2B5EF4-FFF2-40B4-BE49-F238E27FC236}">
-                <a16:creationId xmlns:a16="http://schemas.microsoft.com/office/drawing/2014/main" id="{84F5271D-A4DF-7702-E1C1-D047FF14930B}"/>
+                <a16:creationId xmlns:a16="http://schemas.microsoft.com/office/drawing/2014/main" xmlns="" id="{84F5271D-A4DF-7702-E1C1-D047FF14930B}"/>
               </a:ext>
             </a:extLst>
           </p:cNvPr>
@@ -6714,7 +6791,7 @@
           <p:cNvPr id="5" name="Date Placeholder 4">
             <a:extLst>
               <a:ext uri="{FF2B5EF4-FFF2-40B4-BE49-F238E27FC236}">
-                <a16:creationId xmlns:a16="http://schemas.microsoft.com/office/drawing/2014/main" id="{7D4882DE-F208-C723-C675-D1012CD77FAE}"/>
+                <a16:creationId xmlns:a16="http://schemas.microsoft.com/office/drawing/2014/main" xmlns="" id="{7D4882DE-F208-C723-C675-D1012CD77FAE}"/>
               </a:ext>
             </a:extLst>
           </p:cNvPr>
@@ -6743,7 +6820,7 @@
           <p:cNvPr id="6" name="Footer Placeholder 5">
             <a:extLst>
               <a:ext uri="{FF2B5EF4-FFF2-40B4-BE49-F238E27FC236}">
-                <a16:creationId xmlns:a16="http://schemas.microsoft.com/office/drawing/2014/main" id="{FE572E3F-9644-6295-F152-B5713C7C8E4F}"/>
+                <a16:creationId xmlns:a16="http://schemas.microsoft.com/office/drawing/2014/main" xmlns="" id="{FE572E3F-9644-6295-F152-B5713C7C8E4F}"/>
               </a:ext>
             </a:extLst>
           </p:cNvPr>
@@ -6768,7 +6845,7 @@
           <p:cNvPr id="7" name="Slide Number Placeholder 6">
             <a:extLst>
               <a:ext uri="{FF2B5EF4-FFF2-40B4-BE49-F238E27FC236}">
-                <a16:creationId xmlns:a16="http://schemas.microsoft.com/office/drawing/2014/main" id="{E91C73C1-557C-EC9E-2B16-366176EC2C54}"/>
+                <a16:creationId xmlns:a16="http://schemas.microsoft.com/office/drawing/2014/main" xmlns="" id="{E91C73C1-557C-EC9E-2B16-366176EC2C54}"/>
               </a:ext>
             </a:extLst>
           </p:cNvPr>
@@ -6832,7 +6909,7 @@
           <p:cNvPr id="2" name="Title Placeholder 1">
             <a:extLst>
               <a:ext uri="{FF2B5EF4-FFF2-40B4-BE49-F238E27FC236}">
-                <a16:creationId xmlns:a16="http://schemas.microsoft.com/office/drawing/2014/main" id="{8A720C40-02CC-827D-CB0E-938E6C893AA7}"/>
+                <a16:creationId xmlns:a16="http://schemas.microsoft.com/office/drawing/2014/main" xmlns="" id="{8A720C40-02CC-827D-CB0E-938E6C893AA7}"/>
               </a:ext>
             </a:extLst>
           </p:cNvPr>
@@ -6870,7 +6947,7 @@
           <p:cNvPr id="3" name="Text Placeholder 2">
             <a:extLst>
               <a:ext uri="{FF2B5EF4-FFF2-40B4-BE49-F238E27FC236}">
-                <a16:creationId xmlns:a16="http://schemas.microsoft.com/office/drawing/2014/main" id="{BCBD1483-C69F-D59E-4D17-20AB00266ACD}"/>
+                <a16:creationId xmlns:a16="http://schemas.microsoft.com/office/drawing/2014/main" xmlns="" id="{BCBD1483-C69F-D59E-4D17-20AB00266ACD}"/>
               </a:ext>
             </a:extLst>
           </p:cNvPr>
@@ -6937,7 +7014,7 @@
           <p:cNvPr id="4" name="Date Placeholder 3">
             <a:extLst>
               <a:ext uri="{FF2B5EF4-FFF2-40B4-BE49-F238E27FC236}">
-                <a16:creationId xmlns:a16="http://schemas.microsoft.com/office/drawing/2014/main" id="{C7509A89-04EF-1821-CA96-12AC238E460C}"/>
+                <a16:creationId xmlns:a16="http://schemas.microsoft.com/office/drawing/2014/main" xmlns="" id="{C7509A89-04EF-1821-CA96-12AC238E460C}"/>
               </a:ext>
             </a:extLst>
           </p:cNvPr>
@@ -6984,7 +7061,7 @@
           <p:cNvPr id="5" name="Footer Placeholder 4">
             <a:extLst>
               <a:ext uri="{FF2B5EF4-FFF2-40B4-BE49-F238E27FC236}">
-                <a16:creationId xmlns:a16="http://schemas.microsoft.com/office/drawing/2014/main" id="{81E01CE4-69AA-5C59-D4A7-34723305F57A}"/>
+                <a16:creationId xmlns:a16="http://schemas.microsoft.com/office/drawing/2014/main" xmlns="" id="{81E01CE4-69AA-5C59-D4A7-34723305F57A}"/>
               </a:ext>
             </a:extLst>
           </p:cNvPr>
@@ -7027,7 +7104,7 @@
           <p:cNvPr id="6" name="Slide Number Placeholder 5">
             <a:extLst>
               <a:ext uri="{FF2B5EF4-FFF2-40B4-BE49-F238E27FC236}">
-                <a16:creationId xmlns:a16="http://schemas.microsoft.com/office/drawing/2014/main" id="{53E814B5-20B4-20E3-1F2F-6810D46483E7}"/>
+                <a16:creationId xmlns:a16="http://schemas.microsoft.com/office/drawing/2014/main" xmlns="" id="{53E814B5-20B4-20E3-1F2F-6810D46483E7}"/>
               </a:ext>
             </a:extLst>
           </p:cNvPr>
@@ -7403,10 +7480,10 @@
           <p:cNvPr id="8" name="Rectangle 7">
             <a:extLst>
               <a:ext uri="{FF2B5EF4-FFF2-40B4-BE49-F238E27FC236}">
-                <a16:creationId xmlns:a16="http://schemas.microsoft.com/office/drawing/2014/main" id="{B6CDA21F-E7AF-4C75-8395-33F58D5B0E45}"/>
+                <a16:creationId xmlns:a16="http://schemas.microsoft.com/office/drawing/2014/main" xmlns="" id="{B6CDA21F-E7AF-4C75-8395-33F58D5B0E45}"/>
               </a:ext>
               <a:ext uri="{C183D7F6-B498-43B3-948B-1728B52AA6E4}">
-                <adec:decorative xmlns:adec="http://schemas.microsoft.com/office/drawing/2017/decorative" val="1"/>
+                <adec:decorative xmlns:adec="http://schemas.microsoft.com/office/drawing/2017/decorative" xmlns="" val="1"/>
               </a:ext>
             </a:extLst>
           </p:cNvPr>
@@ -7416,7 +7493,7 @@
           <p:nvPr>
             <p:extLst>
               <p:ext uri="{386F3935-93C4-4BCD-93E2-E3B085C9AB24}">
-                <p16:designElem xmlns:p16="http://schemas.microsoft.com/office/powerpoint/2015/main" val="1"/>
+                <p16:designElem xmlns:p16="http://schemas.microsoft.com/office/powerpoint/2015/main" xmlns="" val="1"/>
               </p:ext>
             </p:extLst>
           </p:nvPr>
@@ -7463,10 +7540,10 @@
           <p:cNvPr id="10" name="Group 9">
             <a:extLst>
               <a:ext uri="{FF2B5EF4-FFF2-40B4-BE49-F238E27FC236}">
-                <a16:creationId xmlns:a16="http://schemas.microsoft.com/office/drawing/2014/main" id="{AE1C45F0-260A-458C-96ED-C1F6D2151219}"/>
+                <a16:creationId xmlns:a16="http://schemas.microsoft.com/office/drawing/2014/main" xmlns="" id="{AE1C45F0-260A-458C-96ED-C1F6D2151219}"/>
               </a:ext>
               <a:ext uri="{C183D7F6-B498-43B3-948B-1728B52AA6E4}">
-                <adec:decorative xmlns:adec="http://schemas.microsoft.com/office/drawing/2017/decorative" val="1"/>
+                <adec:decorative xmlns:adec="http://schemas.microsoft.com/office/drawing/2017/decorative" xmlns="" val="1"/>
               </a:ext>
             </a:extLst>
           </p:cNvPr>
@@ -7476,7 +7553,7 @@
           <p:nvPr>
             <p:extLst>
               <p:ext uri="{386F3935-93C4-4BCD-93E2-E3B085C9AB24}">
-                <p16:designElem xmlns:p16="http://schemas.microsoft.com/office/powerpoint/2015/main" val="1"/>
+                <p16:designElem xmlns:p16="http://schemas.microsoft.com/office/powerpoint/2015/main" xmlns="" val="1"/>
               </p:ext>
             </p:extLst>
           </p:nvPr>
@@ -7497,10 +7574,10 @@
             <p:cNvPr id="11" name="Rectangle 10">
               <a:extLst>
                 <a:ext uri="{FF2B5EF4-FFF2-40B4-BE49-F238E27FC236}">
-                  <a16:creationId xmlns:a16="http://schemas.microsoft.com/office/drawing/2014/main" id="{A6604B49-AD5C-4590-B051-06C8222ECD99}"/>
+                  <a16:creationId xmlns:a16="http://schemas.microsoft.com/office/drawing/2014/main" xmlns="" id="{A6604B49-AD5C-4590-B051-06C8222ECD99}"/>
                 </a:ext>
                 <a:ext uri="{C183D7F6-B498-43B3-948B-1728B52AA6E4}">
-                  <adec:decorative xmlns:adec="http://schemas.microsoft.com/office/drawing/2017/decorative" val="1"/>
+                  <adec:decorative xmlns:adec="http://schemas.microsoft.com/office/drawing/2017/decorative" xmlns="" val="1"/>
                 </a:ext>
               </a:extLst>
             </p:cNvPr>
@@ -7508,7 +7585,7 @@
             <p:nvPr>
               <p:extLst>
                 <p:ext uri="{386F3935-93C4-4BCD-93E2-E3B085C9AB24}">
-                  <p16:designElem xmlns:p16="http://schemas.microsoft.com/office/powerpoint/2015/main" val="1"/>
+                  <p16:designElem xmlns:p16="http://schemas.microsoft.com/office/powerpoint/2015/main" xmlns="" val="1"/>
                 </p:ext>
               </p:extLst>
             </p:nvPr>
@@ -7556,10 +7633,10 @@
             <p:cNvPr id="12" name="Rectangle 11">
               <a:extLst>
                 <a:ext uri="{FF2B5EF4-FFF2-40B4-BE49-F238E27FC236}">
-                  <a16:creationId xmlns:a16="http://schemas.microsoft.com/office/drawing/2014/main" id="{743ECCAF-29C5-4537-947C-7EA1292463DB}"/>
+                  <a16:creationId xmlns:a16="http://schemas.microsoft.com/office/drawing/2014/main" xmlns="" id="{743ECCAF-29C5-4537-947C-7EA1292463DB}"/>
                 </a:ext>
                 <a:ext uri="{C183D7F6-B498-43B3-948B-1728B52AA6E4}">
-                  <adec:decorative xmlns:adec="http://schemas.microsoft.com/office/drawing/2017/decorative" val="1"/>
+                  <adec:decorative xmlns:adec="http://schemas.microsoft.com/office/drawing/2017/decorative" xmlns="" val="1"/>
                 </a:ext>
               </a:extLst>
             </p:cNvPr>
@@ -7567,7 +7644,7 @@
             <p:nvPr>
               <p:extLst>
                 <p:ext uri="{386F3935-93C4-4BCD-93E2-E3B085C9AB24}">
-                  <p16:designElem xmlns:p16="http://schemas.microsoft.com/office/powerpoint/2015/main" val="1"/>
+                  <p16:designElem xmlns:p16="http://schemas.microsoft.com/office/powerpoint/2015/main" xmlns="" val="1"/>
                 </p:ext>
               </p:extLst>
             </p:nvPr>
@@ -7615,10 +7692,10 @@
             <p:cNvPr id="13" name="Rectangle 12">
               <a:extLst>
                 <a:ext uri="{FF2B5EF4-FFF2-40B4-BE49-F238E27FC236}">
-                  <a16:creationId xmlns:a16="http://schemas.microsoft.com/office/drawing/2014/main" id="{ED49787B-8DE6-4467-AD0A-8DECC6E0C2D6}"/>
+                  <a16:creationId xmlns:a16="http://schemas.microsoft.com/office/drawing/2014/main" xmlns="" id="{ED49787B-8DE6-4467-AD0A-8DECC6E0C2D6}"/>
                 </a:ext>
                 <a:ext uri="{C183D7F6-B498-43B3-948B-1728B52AA6E4}">
-                  <adec:decorative xmlns:adec="http://schemas.microsoft.com/office/drawing/2017/decorative" val="1"/>
+                  <adec:decorative xmlns:adec="http://schemas.microsoft.com/office/drawing/2017/decorative" xmlns="" val="1"/>
                 </a:ext>
               </a:extLst>
             </p:cNvPr>
@@ -7626,7 +7703,7 @@
             <p:nvPr>
               <p:extLst>
                 <p:ext uri="{386F3935-93C4-4BCD-93E2-E3B085C9AB24}">
-                  <p16:designElem xmlns:p16="http://schemas.microsoft.com/office/powerpoint/2015/main" val="1"/>
+                  <p16:designElem xmlns:p16="http://schemas.microsoft.com/office/powerpoint/2015/main" xmlns="" val="1"/>
                 </p:ext>
               </p:extLst>
             </p:nvPr>
@@ -7675,10 +7752,10 @@
           <p:cNvPr id="15" name="Rectangle 14">
             <a:extLst>
               <a:ext uri="{FF2B5EF4-FFF2-40B4-BE49-F238E27FC236}">
-                <a16:creationId xmlns:a16="http://schemas.microsoft.com/office/drawing/2014/main" id="{D5B0017B-2ECA-49AF-B397-DC140825DF8D}"/>
+                <a16:creationId xmlns:a16="http://schemas.microsoft.com/office/drawing/2014/main" xmlns="" id="{D5B0017B-2ECA-49AF-B397-DC140825DF8D}"/>
               </a:ext>
               <a:ext uri="{C183D7F6-B498-43B3-948B-1728B52AA6E4}">
-                <adec:decorative xmlns:adec="http://schemas.microsoft.com/office/drawing/2017/decorative" val="1"/>
+                <adec:decorative xmlns:adec="http://schemas.microsoft.com/office/drawing/2017/decorative" xmlns="" val="1"/>
               </a:ext>
             </a:extLst>
           </p:cNvPr>
@@ -7688,7 +7765,7 @@
           <p:nvPr>
             <p:extLst>
               <p:ext uri="{386F3935-93C4-4BCD-93E2-E3B085C9AB24}">
-                <p16:designElem xmlns:p16="http://schemas.microsoft.com/office/powerpoint/2015/main" val="1"/>
+                <p16:designElem xmlns:p16="http://schemas.microsoft.com/office/powerpoint/2015/main" xmlns="" val="1"/>
               </p:ext>
             </p:extLst>
           </p:nvPr>
@@ -7745,7 +7822,7 @@
           <p:cNvPr id="2" name="Title 1">
             <a:extLst>
               <a:ext uri="{FF2B5EF4-FFF2-40B4-BE49-F238E27FC236}">
-                <a16:creationId xmlns:a16="http://schemas.microsoft.com/office/drawing/2014/main" id="{6EADDC13-453D-5EF0-36FB-A16D90A8DC79}"/>
+                <a16:creationId xmlns:a16="http://schemas.microsoft.com/office/drawing/2014/main" xmlns="" id="{6EADDC13-453D-5EF0-36FB-A16D90A8DC79}"/>
               </a:ext>
             </a:extLst>
           </p:cNvPr>
@@ -7806,7 +7883,7 @@
           <p:cNvPr id="3" name="Subtitle 2">
             <a:extLst>
               <a:ext uri="{FF2B5EF4-FFF2-40B4-BE49-F238E27FC236}">
-                <a16:creationId xmlns:a16="http://schemas.microsoft.com/office/drawing/2014/main" id="{9748DF7A-6818-F816-E3F4-BCA00B9F0F11}"/>
+                <a16:creationId xmlns:a16="http://schemas.microsoft.com/office/drawing/2014/main" xmlns="" id="{9748DF7A-6818-F816-E3F4-BCA00B9F0F11}"/>
               </a:ext>
             </a:extLst>
           </p:cNvPr>
@@ -7929,10 +8006,10 @@
           <p:cNvPr id="17" name="Straight Connector 16">
             <a:extLst>
               <a:ext uri="{FF2B5EF4-FFF2-40B4-BE49-F238E27FC236}">
-                <a16:creationId xmlns:a16="http://schemas.microsoft.com/office/drawing/2014/main" id="{6CF1BAF6-AD41-4082-B212-8A1F9A2E8779}"/>
+                <a16:creationId xmlns:a16="http://schemas.microsoft.com/office/drawing/2014/main" xmlns="" id="{6CF1BAF6-AD41-4082-B212-8A1F9A2E8779}"/>
               </a:ext>
               <a:ext uri="{C183D7F6-B498-43B3-948B-1728B52AA6E4}">
-                <adec:decorative xmlns:adec="http://schemas.microsoft.com/office/drawing/2017/decorative" val="1"/>
+                <adec:decorative xmlns:adec="http://schemas.microsoft.com/office/drawing/2017/decorative" xmlns="" val="1"/>
               </a:ext>
             </a:extLst>
           </p:cNvPr>
@@ -7942,7 +8019,7 @@
           <p:nvPr>
             <p:extLst>
               <p:ext uri="{386F3935-93C4-4BCD-93E2-E3B085C9AB24}">
-                <p16:designElem xmlns:p16="http://schemas.microsoft.com/office/powerpoint/2015/main" val="1"/>
+                <p16:designElem xmlns:p16="http://schemas.microsoft.com/office/powerpoint/2015/main" xmlns="" val="1"/>
               </p:ext>
             </p:extLst>
           </p:nvPr>
@@ -8019,10 +8096,10 @@
           <p:cNvPr id="26" name="Rectangle 11">
             <a:extLst>
               <a:ext uri="{FF2B5EF4-FFF2-40B4-BE49-F238E27FC236}">
-                <a16:creationId xmlns:a16="http://schemas.microsoft.com/office/drawing/2014/main" id="{F5A5F1D7-F0D0-4687-9BD3-CA6A0714C634}"/>
+                <a16:creationId xmlns:a16="http://schemas.microsoft.com/office/drawing/2014/main" xmlns="" id="{F5A5F1D7-F0D0-4687-9BD3-CA6A0714C634}"/>
               </a:ext>
               <a:ext uri="{C183D7F6-B498-43B3-948B-1728B52AA6E4}">
-                <adec:decorative xmlns:adec="http://schemas.microsoft.com/office/drawing/2017/decorative" val="1"/>
+                <adec:decorative xmlns:adec="http://schemas.microsoft.com/office/drawing/2017/decorative" xmlns="" val="1"/>
               </a:ext>
             </a:extLst>
           </p:cNvPr>
@@ -8032,7 +8109,7 @@
           <p:nvPr>
             <p:extLst>
               <p:ext uri="{386F3935-93C4-4BCD-93E2-E3B085C9AB24}">
-                <p16:designElem xmlns:p16="http://schemas.microsoft.com/office/powerpoint/2015/main" val="1"/>
+                <p16:designElem xmlns:p16="http://schemas.microsoft.com/office/powerpoint/2015/main" xmlns="" val="1"/>
               </p:ext>
             </p:extLst>
           </p:nvPr>
@@ -8079,10 +8156,10 @@
           <p:cNvPr id="27" name="Group 13">
             <a:extLst>
               <a:ext uri="{FF2B5EF4-FFF2-40B4-BE49-F238E27FC236}">
-                <a16:creationId xmlns:a16="http://schemas.microsoft.com/office/drawing/2014/main" id="{AE1C45F0-260A-458C-96ED-C1F6D2151219}"/>
+                <a16:creationId xmlns:a16="http://schemas.microsoft.com/office/drawing/2014/main" xmlns="" id="{AE1C45F0-260A-458C-96ED-C1F6D2151219}"/>
               </a:ext>
               <a:ext uri="{C183D7F6-B498-43B3-948B-1728B52AA6E4}">
-                <adec:decorative xmlns:adec="http://schemas.microsoft.com/office/drawing/2017/decorative" val="1"/>
+                <adec:decorative xmlns:adec="http://schemas.microsoft.com/office/drawing/2017/decorative" xmlns="" val="1"/>
               </a:ext>
             </a:extLst>
           </p:cNvPr>
@@ -8092,7 +8169,7 @@
           <p:nvPr>
             <p:extLst>
               <p:ext uri="{386F3935-93C4-4BCD-93E2-E3B085C9AB24}">
-                <p16:designElem xmlns:p16="http://schemas.microsoft.com/office/powerpoint/2015/main" val="1"/>
+                <p16:designElem xmlns:p16="http://schemas.microsoft.com/office/powerpoint/2015/main" xmlns="" val="1"/>
               </p:ext>
             </p:extLst>
           </p:nvPr>
@@ -8113,10 +8190,10 @@
             <p:cNvPr id="28" name="Rectangle 14">
               <a:extLst>
                 <a:ext uri="{FF2B5EF4-FFF2-40B4-BE49-F238E27FC236}">
-                  <a16:creationId xmlns:a16="http://schemas.microsoft.com/office/drawing/2014/main" id="{A6604B49-AD5C-4590-B051-06C8222ECD99}"/>
+                  <a16:creationId xmlns:a16="http://schemas.microsoft.com/office/drawing/2014/main" xmlns="" id="{A6604B49-AD5C-4590-B051-06C8222ECD99}"/>
                 </a:ext>
                 <a:ext uri="{C183D7F6-B498-43B3-948B-1728B52AA6E4}">
-                  <adec:decorative xmlns:adec="http://schemas.microsoft.com/office/drawing/2017/decorative" val="1"/>
+                  <adec:decorative xmlns:adec="http://schemas.microsoft.com/office/drawing/2017/decorative" xmlns="" val="1"/>
                 </a:ext>
               </a:extLst>
             </p:cNvPr>
@@ -8124,7 +8201,7 @@
             <p:nvPr>
               <p:extLst>
                 <p:ext uri="{386F3935-93C4-4BCD-93E2-E3B085C9AB24}">
-                  <p16:designElem xmlns:p16="http://schemas.microsoft.com/office/powerpoint/2015/main" val="1"/>
+                  <p16:designElem xmlns:p16="http://schemas.microsoft.com/office/powerpoint/2015/main" xmlns="" val="1"/>
                 </p:ext>
               </p:extLst>
             </p:nvPr>
@@ -8172,10 +8249,10 @@
             <p:cNvPr id="29" name="Rectangle 15">
               <a:extLst>
                 <a:ext uri="{FF2B5EF4-FFF2-40B4-BE49-F238E27FC236}">
-                  <a16:creationId xmlns:a16="http://schemas.microsoft.com/office/drawing/2014/main" id="{743ECCAF-29C5-4537-947C-7EA1292463DB}"/>
+                  <a16:creationId xmlns:a16="http://schemas.microsoft.com/office/drawing/2014/main" xmlns="" id="{743ECCAF-29C5-4537-947C-7EA1292463DB}"/>
                 </a:ext>
                 <a:ext uri="{C183D7F6-B498-43B3-948B-1728B52AA6E4}">
-                  <adec:decorative xmlns:adec="http://schemas.microsoft.com/office/drawing/2017/decorative" val="1"/>
+                  <adec:decorative xmlns:adec="http://schemas.microsoft.com/office/drawing/2017/decorative" xmlns="" val="1"/>
                 </a:ext>
               </a:extLst>
             </p:cNvPr>
@@ -8183,7 +8260,7 @@
             <p:nvPr>
               <p:extLst>
                 <p:ext uri="{386F3935-93C4-4BCD-93E2-E3B085C9AB24}">
-                  <p16:designElem xmlns:p16="http://schemas.microsoft.com/office/powerpoint/2015/main" val="1"/>
+                  <p16:designElem xmlns:p16="http://schemas.microsoft.com/office/powerpoint/2015/main" xmlns="" val="1"/>
                 </p:ext>
               </p:extLst>
             </p:nvPr>
@@ -8231,10 +8308,10 @@
             <p:cNvPr id="17" name="Rectangle 16">
               <a:extLst>
                 <a:ext uri="{FF2B5EF4-FFF2-40B4-BE49-F238E27FC236}">
-                  <a16:creationId xmlns:a16="http://schemas.microsoft.com/office/drawing/2014/main" id="{ED49787B-8DE6-4467-AD0A-8DECC6E0C2D6}"/>
+                  <a16:creationId xmlns:a16="http://schemas.microsoft.com/office/drawing/2014/main" xmlns="" id="{ED49787B-8DE6-4467-AD0A-8DECC6E0C2D6}"/>
                 </a:ext>
                 <a:ext uri="{C183D7F6-B498-43B3-948B-1728B52AA6E4}">
-                  <adec:decorative xmlns:adec="http://schemas.microsoft.com/office/drawing/2017/decorative" val="1"/>
+                  <adec:decorative xmlns:adec="http://schemas.microsoft.com/office/drawing/2017/decorative" xmlns="" val="1"/>
                 </a:ext>
               </a:extLst>
             </p:cNvPr>
@@ -8242,7 +8319,7 @@
             <p:nvPr>
               <p:extLst>
                 <p:ext uri="{386F3935-93C4-4BCD-93E2-E3B085C9AB24}">
-                  <p16:designElem xmlns:p16="http://schemas.microsoft.com/office/powerpoint/2015/main" val="1"/>
+                  <p16:designElem xmlns:p16="http://schemas.microsoft.com/office/powerpoint/2015/main" xmlns="" val="1"/>
                 </p:ext>
               </p:extLst>
             </p:nvPr>
@@ -8291,10 +8368,10 @@
           <p:cNvPr id="19" name="Rectangle 18">
             <a:extLst>
               <a:ext uri="{FF2B5EF4-FFF2-40B4-BE49-F238E27FC236}">
-                <a16:creationId xmlns:a16="http://schemas.microsoft.com/office/drawing/2014/main" id="{D5B0017B-2ECA-49AF-B397-DC140825DF8D}"/>
+                <a16:creationId xmlns:a16="http://schemas.microsoft.com/office/drawing/2014/main" xmlns="" id="{D5B0017B-2ECA-49AF-B397-DC140825DF8D}"/>
               </a:ext>
               <a:ext uri="{C183D7F6-B498-43B3-948B-1728B52AA6E4}">
-                <adec:decorative xmlns:adec="http://schemas.microsoft.com/office/drawing/2017/decorative" val="1"/>
+                <adec:decorative xmlns:adec="http://schemas.microsoft.com/office/drawing/2017/decorative" xmlns="" val="1"/>
               </a:ext>
             </a:extLst>
           </p:cNvPr>
@@ -8304,7 +8381,7 @@
           <p:nvPr>
             <p:extLst>
               <p:ext uri="{386F3935-93C4-4BCD-93E2-E3B085C9AB24}">
-                <p16:designElem xmlns:p16="http://schemas.microsoft.com/office/powerpoint/2015/main" val="1"/>
+                <p16:designElem xmlns:p16="http://schemas.microsoft.com/office/powerpoint/2015/main" xmlns="" val="1"/>
               </p:ext>
             </p:extLst>
           </p:nvPr>
@@ -8361,7 +8438,7 @@
           <p:cNvPr id="2" name="Title 1">
             <a:extLst>
               <a:ext uri="{FF2B5EF4-FFF2-40B4-BE49-F238E27FC236}">
-                <a16:creationId xmlns:a16="http://schemas.microsoft.com/office/drawing/2014/main" id="{24F946E1-D469-438A-CE46-B1742AED9A86}"/>
+                <a16:creationId xmlns:a16="http://schemas.microsoft.com/office/drawing/2014/main" xmlns="" id="{24F946E1-D469-438A-CE46-B1742AED9A86}"/>
               </a:ext>
             </a:extLst>
           </p:cNvPr>
@@ -8396,7 +8473,7 @@
           <p:cNvPr id="3" name="Content Placeholder 2">
             <a:extLst>
               <a:ext uri="{FF2B5EF4-FFF2-40B4-BE49-F238E27FC236}">
-                <a16:creationId xmlns:a16="http://schemas.microsoft.com/office/drawing/2014/main" id="{5CB7CB0A-66D2-A03C-4973-B5733771AF2B}"/>
+                <a16:creationId xmlns:a16="http://schemas.microsoft.com/office/drawing/2014/main" xmlns="" id="{5CB7CB0A-66D2-A03C-4973-B5733771AF2B}"/>
               </a:ext>
             </a:extLst>
           </p:cNvPr>
@@ -8415,7 +8492,7 @@
         </p:spPr>
         <p:txBody>
           <a:bodyPr anchor="ctr">
-            <a:normAutofit/>
+            <a:normAutofit fontScale="92500" lnSpcReduction="20000"/>
           </a:bodyPr>
           <a:lstStyle/>
           <a:p>
@@ -8434,32 +8511,69 @@
             <a:endParaRPr lang="en-US" sz="1400" dirty="0"/>
           </a:p>
           <a:p>
-            <a:r>
-              <a:rPr lang="en-US" sz="1400" u="sng" dirty="0"/>
-              <a:t>Monthly</a:t>
-            </a:r>
-            <a:r>
-              <a:rPr lang="en-US" sz="1400" dirty="0"/>
-              <a:t>: Aggregating the data at the </a:t>
-            </a:r>
-          </a:p>
-          <a:p>
             <a:pPr marL="0" indent="0">
               <a:buNone/>
             </a:pPr>
             <a:r>
+              <a:rPr lang="en-US" sz="1400" u="sng" dirty="0"/>
+              <a:t>Monthly</a:t>
+            </a:r>
+            <a:r>
               <a:rPr lang="en-US" sz="1400" dirty="0"/>
-              <a:t>monthly level can provide insights into trends </a:t>
-            </a:r>
-          </a:p>
-          <a:p>
-            <a:pPr marL="0" indent="0">
-              <a:buNone/>
-            </a:pPr>
+              <a:t>: </a:t>
+            </a:r>
+            <a:endParaRPr lang="en-US" sz="1400" dirty="0" smtClean="0"/>
+          </a:p>
+          <a:p>
+            <a:r>
+              <a:rPr lang="en-US" sz="1400" dirty="0" smtClean="0"/>
+              <a:t>Aggregating </a:t>
+            </a:r>
             <a:r>
               <a:rPr lang="en-US" sz="1400" dirty="0"/>
-              <a:t>over time and seasonal variations.</a:t>
-            </a:r>
+              <a:t>the data at the </a:t>
+            </a:r>
+            <a:r>
+              <a:rPr lang="en-US" sz="1400" dirty="0" smtClean="0"/>
+              <a:t>monthly </a:t>
+            </a:r>
+            <a:r>
+              <a:rPr lang="en-US" sz="1400" dirty="0"/>
+              <a:t>level can provide insights into trends </a:t>
+            </a:r>
+            <a:r>
+              <a:rPr lang="en-US" sz="1400" dirty="0" smtClean="0"/>
+              <a:t>over </a:t>
+            </a:r>
+            <a:r>
+              <a:rPr lang="en-US" sz="1400" dirty="0"/>
+              <a:t>time and seasonal variations</a:t>
+            </a:r>
+            <a:r>
+              <a:rPr lang="en-US" sz="1400" dirty="0" smtClean="0"/>
+              <a:t>.</a:t>
+            </a:r>
+          </a:p>
+          <a:p>
+            <a:r>
+              <a:rPr lang="en-US" sz="1400" dirty="0" smtClean="0">
+                <a:solidFill>
+                  <a:srgbClr val="00B050"/>
+                </a:solidFill>
+              </a:rPr>
+              <a:t>Increasing trend</a:t>
+            </a:r>
+            <a:r>
+              <a:rPr lang="en-US" sz="1400" dirty="0" smtClean="0"/>
+              <a:t> of sales seen from Feb – May</a:t>
+            </a:r>
+          </a:p>
+          <a:p>
+            <a:r>
+              <a:rPr lang="en-US" sz="1400" dirty="0" smtClean="0"/>
+              <a:t>Highest sales in August month !</a:t>
+            </a:r>
+            <a:endParaRPr lang="en-US" sz="1400" dirty="0"/>
           </a:p>
           <a:p>
             <a:pPr marL="0" indent="0">
@@ -8474,32 +8588,97 @@
             <a:endParaRPr lang="en-US" sz="1400" dirty="0"/>
           </a:p>
           <a:p>
-            <a:r>
-              <a:rPr lang="en-US" sz="1400" u="sng" dirty="0"/>
-              <a:t>Quarterly</a:t>
-            </a:r>
-            <a:r>
-              <a:rPr lang="en-US" sz="1400" dirty="0"/>
-              <a:t>: Aggregating the data at the quarterly </a:t>
-            </a:r>
-          </a:p>
-          <a:p>
             <a:pPr marL="0" indent="0">
               <a:buNone/>
             </a:pPr>
             <a:r>
+              <a:rPr lang="en-US" sz="1400" u="sng" dirty="0"/>
+              <a:t>Quarterly</a:t>
+            </a:r>
+            <a:r>
               <a:rPr lang="en-US" sz="1400" dirty="0"/>
-              <a:t>level can provide a higher-level view of </a:t>
-            </a:r>
+              <a:t>: </a:t>
+            </a:r>
+            <a:endParaRPr lang="en-US" sz="1400" dirty="0" smtClean="0"/>
+          </a:p>
+          <a:p>
+            <a:r>
+              <a:rPr lang="en-US" sz="1400" dirty="0" smtClean="0"/>
+              <a:t>Aggregating </a:t>
+            </a:r>
+            <a:r>
+              <a:rPr lang="en-US" sz="1400" dirty="0"/>
+              <a:t>the data at the quarterly </a:t>
+            </a:r>
+            <a:r>
+              <a:rPr lang="en-US" sz="1400" dirty="0" smtClean="0"/>
+              <a:t>level </a:t>
+            </a:r>
+            <a:r>
+              <a:rPr lang="en-US" sz="1400" dirty="0"/>
+              <a:t>can provide a higher-level view of </a:t>
+            </a:r>
+            <a:r>
+              <a:rPr lang="en-US" sz="1400" dirty="0" smtClean="0"/>
+              <a:t>performance </a:t>
+            </a:r>
+            <a:r>
+              <a:rPr lang="en-US" sz="1400" dirty="0"/>
+              <a:t>and may be useful for reporting </a:t>
+            </a:r>
+            <a:r>
+              <a:rPr lang="en-US" sz="1400" dirty="0" smtClean="0"/>
+              <a:t>purposes</a:t>
+            </a:r>
+          </a:p>
+          <a:p>
+            <a:r>
+              <a:rPr lang="en-US" sz="1400" dirty="0" smtClean="0"/>
+              <a:t>Increasing Trend seen from </a:t>
+            </a:r>
+            <a:r>
+              <a:rPr lang="en-US" sz="1400" dirty="0" smtClean="0">
+                <a:solidFill>
+                  <a:srgbClr val="00B050"/>
+                </a:solidFill>
+              </a:rPr>
+              <a:t>Q1 to Q3</a:t>
+            </a:r>
+            <a:r>
+              <a:rPr lang="en-US" sz="1400" dirty="0" smtClean="0"/>
+              <a:t>, post that a steep </a:t>
+            </a:r>
+            <a:r>
+              <a:rPr lang="en-US" sz="1400" dirty="0" smtClean="0">
+                <a:solidFill>
+                  <a:srgbClr val="FF0000"/>
+                </a:solidFill>
+              </a:rPr>
+              <a:t>decline</a:t>
+            </a:r>
+            <a:r>
+              <a:rPr lang="en-US" sz="1400" dirty="0" smtClean="0"/>
+              <a:t> is observed as one </a:t>
+            </a:r>
+            <a:r>
+              <a:rPr lang="en-US" sz="1400" dirty="0" smtClean="0">
+                <a:solidFill>
+                  <a:srgbClr val="FF0000"/>
+                </a:solidFill>
+              </a:rPr>
+              <a:t>approached Q4</a:t>
+            </a:r>
+            <a:endParaRPr lang="en-US" sz="1400" dirty="0" smtClean="0">
+              <a:solidFill>
+                <a:srgbClr val="FF0000"/>
+              </a:solidFill>
+            </a:endParaRPr>
           </a:p>
           <a:p>
             <a:pPr marL="0" indent="0">
               <a:buNone/>
             </a:pPr>
-            <a:r>
-              <a:rPr lang="en-US" sz="1400" dirty="0"/>
-              <a:t>performance and may be useful for reporting purposes</a:t>
-            </a:r>
+            <a:endParaRPr lang="en-US" sz="1400" dirty="0"/>
           </a:p>
         </p:txBody>
       </p:sp>
@@ -8508,10 +8687,10 @@
           <p:cNvPr id="21" name="Straight Connector 20">
             <a:extLst>
               <a:ext uri="{FF2B5EF4-FFF2-40B4-BE49-F238E27FC236}">
-                <a16:creationId xmlns:a16="http://schemas.microsoft.com/office/drawing/2014/main" id="{6CF1BAF6-AD41-4082-B212-8A1F9A2E8779}"/>
+                <a16:creationId xmlns:a16="http://schemas.microsoft.com/office/drawing/2014/main" xmlns="" id="{6CF1BAF6-AD41-4082-B212-8A1F9A2E8779}"/>
               </a:ext>
               <a:ext uri="{C183D7F6-B498-43B3-948B-1728B52AA6E4}">
-                <adec:decorative xmlns:adec="http://schemas.microsoft.com/office/drawing/2017/decorative" val="1"/>
+                <adec:decorative xmlns:adec="http://schemas.microsoft.com/office/drawing/2017/decorative" xmlns="" val="1"/>
               </a:ext>
             </a:extLst>
           </p:cNvPr>
@@ -8521,7 +8700,7 @@
           <p:nvPr>
             <p:extLst>
               <p:ext uri="{386F3935-93C4-4BCD-93E2-E3B085C9AB24}">
-                <p16:designElem xmlns:p16="http://schemas.microsoft.com/office/powerpoint/2015/main" val="1"/>
+                <p16:designElem xmlns:p16="http://schemas.microsoft.com/office/powerpoint/2015/main" xmlns="" val="1"/>
               </p:ext>
             </p:extLst>
           </p:nvPr>
@@ -8560,7 +8739,7 @@
           <p:cNvPr id="9" name="Picture 8">
             <a:extLst>
               <a:ext uri="{FF2B5EF4-FFF2-40B4-BE49-F238E27FC236}">
-                <a16:creationId xmlns:a16="http://schemas.microsoft.com/office/drawing/2014/main" id="{FE822698-3AB9-4D1B-5A97-48DEF1B9C943}"/>
+                <a16:creationId xmlns:a16="http://schemas.microsoft.com/office/drawing/2014/main" xmlns="" id="{FE822698-3AB9-4D1B-5A97-48DEF1B9C943}"/>
               </a:ext>
             </a:extLst>
           </p:cNvPr>
@@ -8590,7 +8769,7 @@
           <p:cNvPr id="11" name="Picture 10">
             <a:extLst>
               <a:ext uri="{FF2B5EF4-FFF2-40B4-BE49-F238E27FC236}">
-                <a16:creationId xmlns:a16="http://schemas.microsoft.com/office/drawing/2014/main" id="{E36E1C63-4DA7-2785-0FF7-7748FB1C7900}"/>
+                <a16:creationId xmlns:a16="http://schemas.microsoft.com/office/drawing/2014/main" xmlns="" id="{E36E1C63-4DA7-2785-0FF7-7748FB1C7900}"/>
               </a:ext>
             </a:extLst>
           </p:cNvPr>
@@ -8625,6 +8804,13 @@
   <p:clrMapOvr>
     <a:masterClrMapping/>
   </p:clrMapOvr>
+  <p:timing>
+    <p:tnLst>
+      <p:par>
+        <p:cTn id="1" dur="indefinite" restart="never" nodeType="tmRoot"/>
+      </p:par>
+    </p:tnLst>
+  </p:timing>
 </p:sld>
 </file>
 
@@ -8658,10 +8844,10 @@
           <p:cNvPr id="12" name="Rectangle 11">
             <a:extLst>
               <a:ext uri="{FF2B5EF4-FFF2-40B4-BE49-F238E27FC236}">
-                <a16:creationId xmlns:a16="http://schemas.microsoft.com/office/drawing/2014/main" id="{F5A5F1D7-F0D0-4687-9BD3-CA6A0714C634}"/>
+                <a16:creationId xmlns:a16="http://schemas.microsoft.com/office/drawing/2014/main" xmlns="" id="{F5A5F1D7-F0D0-4687-9BD3-CA6A0714C634}"/>
               </a:ext>
               <a:ext uri="{C183D7F6-B498-43B3-948B-1728B52AA6E4}">
-                <adec:decorative xmlns:adec="http://schemas.microsoft.com/office/drawing/2017/decorative" val="1"/>
+                <adec:decorative xmlns:adec="http://schemas.microsoft.com/office/drawing/2017/decorative" xmlns="" val="1"/>
               </a:ext>
             </a:extLst>
           </p:cNvPr>
@@ -8671,7 +8857,7 @@
           <p:nvPr>
             <p:extLst>
               <p:ext uri="{386F3935-93C4-4BCD-93E2-E3B085C9AB24}">
-                <p16:designElem xmlns:p16="http://schemas.microsoft.com/office/powerpoint/2015/main" val="1"/>
+                <p16:designElem xmlns:p16="http://schemas.microsoft.com/office/powerpoint/2015/main" xmlns="" val="1"/>
               </p:ext>
             </p:extLst>
           </p:nvPr>
@@ -8718,10 +8904,10 @@
           <p:cNvPr id="14" name="Group 13">
             <a:extLst>
               <a:ext uri="{FF2B5EF4-FFF2-40B4-BE49-F238E27FC236}">
-                <a16:creationId xmlns:a16="http://schemas.microsoft.com/office/drawing/2014/main" id="{AE1C45F0-260A-458C-96ED-C1F6D2151219}"/>
+                <a16:creationId xmlns:a16="http://schemas.microsoft.com/office/drawing/2014/main" xmlns="" id="{AE1C45F0-260A-458C-96ED-C1F6D2151219}"/>
               </a:ext>
               <a:ext uri="{C183D7F6-B498-43B3-948B-1728B52AA6E4}">
-                <adec:decorative xmlns:adec="http://schemas.microsoft.com/office/drawing/2017/decorative" val="1"/>
+                <adec:decorative xmlns:adec="http://schemas.microsoft.com/office/drawing/2017/decorative" xmlns="" val="1"/>
               </a:ext>
             </a:extLst>
           </p:cNvPr>
@@ -8731,7 +8917,7 @@
           <p:nvPr>
             <p:extLst>
               <p:ext uri="{386F3935-93C4-4BCD-93E2-E3B085C9AB24}">
-                <p16:designElem xmlns:p16="http://schemas.microsoft.com/office/powerpoint/2015/main" val="1"/>
+                <p16:designElem xmlns:p16="http://schemas.microsoft.com/office/powerpoint/2015/main" xmlns="" val="1"/>
               </p:ext>
             </p:extLst>
           </p:nvPr>
@@ -8752,10 +8938,10 @@
             <p:cNvPr id="15" name="Rectangle 14">
               <a:extLst>
                 <a:ext uri="{FF2B5EF4-FFF2-40B4-BE49-F238E27FC236}">
-                  <a16:creationId xmlns:a16="http://schemas.microsoft.com/office/drawing/2014/main" id="{A6604B49-AD5C-4590-B051-06C8222ECD99}"/>
+                  <a16:creationId xmlns:a16="http://schemas.microsoft.com/office/drawing/2014/main" xmlns="" id="{A6604B49-AD5C-4590-B051-06C8222ECD99}"/>
                 </a:ext>
                 <a:ext uri="{C183D7F6-B498-43B3-948B-1728B52AA6E4}">
-                  <adec:decorative xmlns:adec="http://schemas.microsoft.com/office/drawing/2017/decorative" val="1"/>
+                  <adec:decorative xmlns:adec="http://schemas.microsoft.com/office/drawing/2017/decorative" xmlns="" val="1"/>
                 </a:ext>
               </a:extLst>
             </p:cNvPr>
@@ -8763,7 +8949,7 @@
             <p:nvPr>
               <p:extLst>
                 <p:ext uri="{386F3935-93C4-4BCD-93E2-E3B085C9AB24}">
-                  <p16:designElem xmlns:p16="http://schemas.microsoft.com/office/powerpoint/2015/main" val="1"/>
+                  <p16:designElem xmlns:p16="http://schemas.microsoft.com/office/powerpoint/2015/main" xmlns="" val="1"/>
                 </p:ext>
               </p:extLst>
             </p:nvPr>
@@ -8811,10 +8997,10 @@
             <p:cNvPr id="16" name="Rectangle 15">
               <a:extLst>
                 <a:ext uri="{FF2B5EF4-FFF2-40B4-BE49-F238E27FC236}">
-                  <a16:creationId xmlns:a16="http://schemas.microsoft.com/office/drawing/2014/main" id="{743ECCAF-29C5-4537-947C-7EA1292463DB}"/>
+                  <a16:creationId xmlns:a16="http://schemas.microsoft.com/office/drawing/2014/main" xmlns="" id="{743ECCAF-29C5-4537-947C-7EA1292463DB}"/>
                 </a:ext>
                 <a:ext uri="{C183D7F6-B498-43B3-948B-1728B52AA6E4}">
-                  <adec:decorative xmlns:adec="http://schemas.microsoft.com/office/drawing/2017/decorative" val="1"/>
+                  <adec:decorative xmlns:adec="http://schemas.microsoft.com/office/drawing/2017/decorative" xmlns="" val="1"/>
                 </a:ext>
               </a:extLst>
             </p:cNvPr>
@@ -8822,7 +9008,7 @@
             <p:nvPr>
               <p:extLst>
                 <p:ext uri="{386F3935-93C4-4BCD-93E2-E3B085C9AB24}">
-                  <p16:designElem xmlns:p16="http://schemas.microsoft.com/office/powerpoint/2015/main" val="1"/>
+                  <p16:designElem xmlns:p16="http://schemas.microsoft.com/office/powerpoint/2015/main" xmlns="" val="1"/>
                 </p:ext>
               </p:extLst>
             </p:nvPr>
@@ -8870,10 +9056,10 @@
             <p:cNvPr id="17" name="Rectangle 16">
               <a:extLst>
                 <a:ext uri="{FF2B5EF4-FFF2-40B4-BE49-F238E27FC236}">
-                  <a16:creationId xmlns:a16="http://schemas.microsoft.com/office/drawing/2014/main" id="{ED49787B-8DE6-4467-AD0A-8DECC6E0C2D6}"/>
+                  <a16:creationId xmlns:a16="http://schemas.microsoft.com/office/drawing/2014/main" xmlns="" id="{ED49787B-8DE6-4467-AD0A-8DECC6E0C2D6}"/>
                 </a:ext>
                 <a:ext uri="{C183D7F6-B498-43B3-948B-1728B52AA6E4}">
-                  <adec:decorative xmlns:adec="http://schemas.microsoft.com/office/drawing/2017/decorative" val="1"/>
+                  <adec:decorative xmlns:adec="http://schemas.microsoft.com/office/drawing/2017/decorative" xmlns="" val="1"/>
                 </a:ext>
               </a:extLst>
             </p:cNvPr>
@@ -8881,7 +9067,7 @@
             <p:nvPr>
               <p:extLst>
                 <p:ext uri="{386F3935-93C4-4BCD-93E2-E3B085C9AB24}">
-                  <p16:designElem xmlns:p16="http://schemas.microsoft.com/office/powerpoint/2015/main" val="1"/>
+                  <p16:designElem xmlns:p16="http://schemas.microsoft.com/office/powerpoint/2015/main" xmlns="" val="1"/>
                 </p:ext>
               </p:extLst>
             </p:nvPr>
@@ -8930,10 +9116,10 @@
           <p:cNvPr id="19" name="Rectangle 18">
             <a:extLst>
               <a:ext uri="{FF2B5EF4-FFF2-40B4-BE49-F238E27FC236}">
-                <a16:creationId xmlns:a16="http://schemas.microsoft.com/office/drawing/2014/main" id="{D5B0017B-2ECA-49AF-B397-DC140825DF8D}"/>
+                <a16:creationId xmlns:a16="http://schemas.microsoft.com/office/drawing/2014/main" xmlns="" id="{D5B0017B-2ECA-49AF-B397-DC140825DF8D}"/>
               </a:ext>
               <a:ext uri="{C183D7F6-B498-43B3-948B-1728B52AA6E4}">
-                <adec:decorative xmlns:adec="http://schemas.microsoft.com/office/drawing/2017/decorative" val="1"/>
+                <adec:decorative xmlns:adec="http://schemas.microsoft.com/office/drawing/2017/decorative" xmlns="" val="1"/>
               </a:ext>
             </a:extLst>
           </p:cNvPr>
@@ -8943,7 +9129,7 @@
           <p:nvPr>
             <p:extLst>
               <p:ext uri="{386F3935-93C4-4BCD-93E2-E3B085C9AB24}">
-                <p16:designElem xmlns:p16="http://schemas.microsoft.com/office/powerpoint/2015/main" val="1"/>
+                <p16:designElem xmlns:p16="http://schemas.microsoft.com/office/powerpoint/2015/main" xmlns="" val="1"/>
               </p:ext>
             </p:extLst>
           </p:nvPr>
@@ -9000,7 +9186,7 @@
           <p:cNvPr id="2" name="Title 1">
             <a:extLst>
               <a:ext uri="{FF2B5EF4-FFF2-40B4-BE49-F238E27FC236}">
-                <a16:creationId xmlns:a16="http://schemas.microsoft.com/office/drawing/2014/main" id="{941FB4B4-B646-CDF0-E6CF-E40646729BFC}"/>
+                <a16:creationId xmlns:a16="http://schemas.microsoft.com/office/drawing/2014/main" xmlns="" id="{941FB4B4-B646-CDF0-E6CF-E40646729BFC}"/>
               </a:ext>
             </a:extLst>
           </p:cNvPr>
@@ -9035,7 +9221,7 @@
           <p:cNvPr id="3" name="Content Placeholder 2">
             <a:extLst>
               <a:ext uri="{FF2B5EF4-FFF2-40B4-BE49-F238E27FC236}">
-                <a16:creationId xmlns:a16="http://schemas.microsoft.com/office/drawing/2014/main" id="{56E37AD2-EA8A-4CB8-F3B6-51B8B5C09AFA}"/>
+                <a16:creationId xmlns:a16="http://schemas.microsoft.com/office/drawing/2014/main" xmlns="" id="{56E37AD2-EA8A-4CB8-F3B6-51B8B5C09AFA}"/>
               </a:ext>
             </a:extLst>
           </p:cNvPr>
@@ -9070,10 +9256,10 @@
           <p:cNvPr id="21" name="Straight Connector 20">
             <a:extLst>
               <a:ext uri="{FF2B5EF4-FFF2-40B4-BE49-F238E27FC236}">
-                <a16:creationId xmlns:a16="http://schemas.microsoft.com/office/drawing/2014/main" id="{6CF1BAF6-AD41-4082-B212-8A1F9A2E8779}"/>
+                <a16:creationId xmlns:a16="http://schemas.microsoft.com/office/drawing/2014/main" xmlns="" id="{6CF1BAF6-AD41-4082-B212-8A1F9A2E8779}"/>
               </a:ext>
               <a:ext uri="{C183D7F6-B498-43B3-948B-1728B52AA6E4}">
-                <adec:decorative xmlns:adec="http://schemas.microsoft.com/office/drawing/2017/decorative" val="1"/>
+                <adec:decorative xmlns:adec="http://schemas.microsoft.com/office/drawing/2017/decorative" xmlns="" val="1"/>
               </a:ext>
             </a:extLst>
           </p:cNvPr>
@@ -9083,7 +9269,7 @@
           <p:nvPr>
             <p:extLst>
               <p:ext uri="{386F3935-93C4-4BCD-93E2-E3B085C9AB24}">
-                <p16:designElem xmlns:p16="http://schemas.microsoft.com/office/powerpoint/2015/main" val="1"/>
+                <p16:designElem xmlns:p16="http://schemas.microsoft.com/office/powerpoint/2015/main" xmlns="" val="1"/>
               </p:ext>
             </p:extLst>
           </p:nvPr>
@@ -9122,7 +9308,7 @@
           <p:cNvPr id="9" name="Picture 8">
             <a:extLst>
               <a:ext uri="{FF2B5EF4-FFF2-40B4-BE49-F238E27FC236}">
-                <a16:creationId xmlns:a16="http://schemas.microsoft.com/office/drawing/2014/main" id="{E48CEC58-4315-E386-9A56-40508BD87C42}"/>
+                <a16:creationId xmlns:a16="http://schemas.microsoft.com/office/drawing/2014/main" xmlns="" id="{E48CEC58-4315-E386-9A56-40508BD87C42}"/>
               </a:ext>
             </a:extLst>
           </p:cNvPr>
@@ -9152,7 +9338,7 @@
           <p:cNvPr id="11" name="Picture 10">
             <a:extLst>
               <a:ext uri="{FF2B5EF4-FFF2-40B4-BE49-F238E27FC236}">
-                <a16:creationId xmlns:a16="http://schemas.microsoft.com/office/drawing/2014/main" id="{F80C1391-BEF8-C4C5-7C06-6A8F120673FB}"/>
+                <a16:creationId xmlns:a16="http://schemas.microsoft.com/office/drawing/2014/main" xmlns="" id="{F80C1391-BEF8-C4C5-7C06-6A8F120673FB}"/>
               </a:ext>
             </a:extLst>
           </p:cNvPr>
@@ -9187,6 +9373,13 @@
   <p:clrMapOvr>
     <a:masterClrMapping/>
   </p:clrMapOvr>
+  <p:timing>
+    <p:tnLst>
+      <p:par>
+        <p:cTn id="1" dur="indefinite" restart="never" nodeType="tmRoot"/>
+      </p:par>
+    </p:tnLst>
+  </p:timing>
 </p:sld>
 </file>
 
@@ -9220,10 +9413,10 @@
           <p:cNvPr id="12" name="Rectangle 11">
             <a:extLst>
               <a:ext uri="{FF2B5EF4-FFF2-40B4-BE49-F238E27FC236}">
-                <a16:creationId xmlns:a16="http://schemas.microsoft.com/office/drawing/2014/main" id="{922F19F4-FE70-43DC-856F-2CE5F521DC48}"/>
+                <a16:creationId xmlns:a16="http://schemas.microsoft.com/office/drawing/2014/main" xmlns="" id="{922F19F4-FE70-43DC-856F-2CE5F521DC48}"/>
               </a:ext>
               <a:ext uri="{C183D7F6-B498-43B3-948B-1728B52AA6E4}">
-                <adec:decorative xmlns:adec="http://schemas.microsoft.com/office/drawing/2017/decorative" val="1"/>
+                <adec:decorative xmlns:adec="http://schemas.microsoft.com/office/drawing/2017/decorative" xmlns="" val="1"/>
               </a:ext>
             </a:extLst>
           </p:cNvPr>
@@ -9233,7 +9426,7 @@
           <p:nvPr>
             <p:extLst>
               <p:ext uri="{386F3935-93C4-4BCD-93E2-E3B085C9AB24}">
-                <p16:designElem xmlns:p16="http://schemas.microsoft.com/office/powerpoint/2015/main" val="1"/>
+                <p16:designElem xmlns:p16="http://schemas.microsoft.com/office/powerpoint/2015/main" xmlns="" val="1"/>
               </p:ext>
             </p:extLst>
           </p:nvPr>
@@ -9280,10 +9473,10 @@
           <p:cNvPr id="14" name="Group 13">
             <a:extLst>
               <a:ext uri="{FF2B5EF4-FFF2-40B4-BE49-F238E27FC236}">
-                <a16:creationId xmlns:a16="http://schemas.microsoft.com/office/drawing/2014/main" id="{AE1C45F0-260A-458C-96ED-C1F6D2151219}"/>
+                <a16:creationId xmlns:a16="http://schemas.microsoft.com/office/drawing/2014/main" xmlns="" id="{AE1C45F0-260A-458C-96ED-C1F6D2151219}"/>
               </a:ext>
               <a:ext uri="{C183D7F6-B498-43B3-948B-1728B52AA6E4}">
-                <adec:decorative xmlns:adec="http://schemas.microsoft.com/office/drawing/2017/decorative" val="1"/>
+                <adec:decorative xmlns:adec="http://schemas.microsoft.com/office/drawing/2017/decorative" xmlns="" val="1"/>
               </a:ext>
             </a:extLst>
           </p:cNvPr>
@@ -9293,7 +9486,7 @@
           <p:nvPr>
             <p:extLst>
               <p:ext uri="{386F3935-93C4-4BCD-93E2-E3B085C9AB24}">
-                <p16:designElem xmlns:p16="http://schemas.microsoft.com/office/powerpoint/2015/main" val="1"/>
+                <p16:designElem xmlns:p16="http://schemas.microsoft.com/office/powerpoint/2015/main" xmlns="" val="1"/>
               </p:ext>
             </p:extLst>
           </p:nvPr>
@@ -9314,10 +9507,10 @@
             <p:cNvPr id="15" name="Rectangle 14">
               <a:extLst>
                 <a:ext uri="{FF2B5EF4-FFF2-40B4-BE49-F238E27FC236}">
-                  <a16:creationId xmlns:a16="http://schemas.microsoft.com/office/drawing/2014/main" id="{A6604B49-AD5C-4590-B051-06C8222ECD99}"/>
+                  <a16:creationId xmlns:a16="http://schemas.microsoft.com/office/drawing/2014/main" xmlns="" id="{A6604B49-AD5C-4590-B051-06C8222ECD99}"/>
                 </a:ext>
                 <a:ext uri="{C183D7F6-B498-43B3-948B-1728B52AA6E4}">
-                  <adec:decorative xmlns:adec="http://schemas.microsoft.com/office/drawing/2017/decorative" val="1"/>
+                  <adec:decorative xmlns:adec="http://schemas.microsoft.com/office/drawing/2017/decorative" xmlns="" val="1"/>
                 </a:ext>
               </a:extLst>
             </p:cNvPr>
@@ -9325,7 +9518,7 @@
             <p:nvPr>
               <p:extLst>
                 <p:ext uri="{386F3935-93C4-4BCD-93E2-E3B085C9AB24}">
-                  <p16:designElem xmlns:p16="http://schemas.microsoft.com/office/powerpoint/2015/main" val="1"/>
+                  <p16:designElem xmlns:p16="http://schemas.microsoft.com/office/powerpoint/2015/main" xmlns="" val="1"/>
                 </p:ext>
               </p:extLst>
             </p:nvPr>
@@ -9373,10 +9566,10 @@
             <p:cNvPr id="16" name="Rectangle 15">
               <a:extLst>
                 <a:ext uri="{FF2B5EF4-FFF2-40B4-BE49-F238E27FC236}">
-                  <a16:creationId xmlns:a16="http://schemas.microsoft.com/office/drawing/2014/main" id="{743ECCAF-29C5-4537-947C-7EA1292463DB}"/>
+                  <a16:creationId xmlns:a16="http://schemas.microsoft.com/office/drawing/2014/main" xmlns="" id="{743ECCAF-29C5-4537-947C-7EA1292463DB}"/>
                 </a:ext>
                 <a:ext uri="{C183D7F6-B498-43B3-948B-1728B52AA6E4}">
-                  <adec:decorative xmlns:adec="http://schemas.microsoft.com/office/drawing/2017/decorative" val="1"/>
+                  <adec:decorative xmlns:adec="http://schemas.microsoft.com/office/drawing/2017/decorative" xmlns="" val="1"/>
                 </a:ext>
               </a:extLst>
             </p:cNvPr>
@@ -9384,7 +9577,7 @@
             <p:nvPr>
               <p:extLst>
                 <p:ext uri="{386F3935-93C4-4BCD-93E2-E3B085C9AB24}">
-                  <p16:designElem xmlns:p16="http://schemas.microsoft.com/office/powerpoint/2015/main" val="1"/>
+                  <p16:designElem xmlns:p16="http://schemas.microsoft.com/office/powerpoint/2015/main" xmlns="" val="1"/>
                 </p:ext>
               </p:extLst>
             </p:nvPr>
@@ -9432,10 +9625,10 @@
             <p:cNvPr id="17" name="Rectangle 16">
               <a:extLst>
                 <a:ext uri="{FF2B5EF4-FFF2-40B4-BE49-F238E27FC236}">
-                  <a16:creationId xmlns:a16="http://schemas.microsoft.com/office/drawing/2014/main" id="{ED49787B-8DE6-4467-AD0A-8DECC6E0C2D6}"/>
+                  <a16:creationId xmlns:a16="http://schemas.microsoft.com/office/drawing/2014/main" xmlns="" id="{ED49787B-8DE6-4467-AD0A-8DECC6E0C2D6}"/>
                 </a:ext>
                 <a:ext uri="{C183D7F6-B498-43B3-948B-1728B52AA6E4}">
-                  <adec:decorative xmlns:adec="http://schemas.microsoft.com/office/drawing/2017/decorative" val="1"/>
+                  <adec:decorative xmlns:adec="http://schemas.microsoft.com/office/drawing/2017/decorative" xmlns="" val="1"/>
                 </a:ext>
               </a:extLst>
             </p:cNvPr>
@@ -9443,7 +9636,7 @@
             <p:nvPr>
               <p:extLst>
                 <p:ext uri="{386F3935-93C4-4BCD-93E2-E3B085C9AB24}">
-                  <p16:designElem xmlns:p16="http://schemas.microsoft.com/office/powerpoint/2015/main" val="1"/>
+                  <p16:designElem xmlns:p16="http://schemas.microsoft.com/office/powerpoint/2015/main" xmlns="" val="1"/>
                 </p:ext>
               </p:extLst>
             </p:nvPr>
@@ -9492,10 +9685,10 @@
           <p:cNvPr id="19" name="Rectangle 18">
             <a:extLst>
               <a:ext uri="{FF2B5EF4-FFF2-40B4-BE49-F238E27FC236}">
-                <a16:creationId xmlns:a16="http://schemas.microsoft.com/office/drawing/2014/main" id="{D5B0017B-2ECA-49AF-B397-DC140825DF8D}"/>
+                <a16:creationId xmlns:a16="http://schemas.microsoft.com/office/drawing/2014/main" xmlns="" id="{D5B0017B-2ECA-49AF-B397-DC140825DF8D}"/>
               </a:ext>
               <a:ext uri="{C183D7F6-B498-43B3-948B-1728B52AA6E4}">
-                <adec:decorative xmlns:adec="http://schemas.microsoft.com/office/drawing/2017/decorative" val="1"/>
+                <adec:decorative xmlns:adec="http://schemas.microsoft.com/office/drawing/2017/decorative" xmlns="" val="1"/>
               </a:ext>
             </a:extLst>
           </p:cNvPr>
@@ -9505,7 +9698,7 @@
           <p:nvPr>
             <p:extLst>
               <p:ext uri="{386F3935-93C4-4BCD-93E2-E3B085C9AB24}">
-                <p16:designElem xmlns:p16="http://schemas.microsoft.com/office/powerpoint/2015/main" val="1"/>
+                <p16:designElem xmlns:p16="http://schemas.microsoft.com/office/powerpoint/2015/main" xmlns="" val="1"/>
               </p:ext>
             </p:extLst>
           </p:nvPr>
@@ -9562,7 +9755,7 @@
           <p:cNvPr id="2" name="Title 1">
             <a:extLst>
               <a:ext uri="{FF2B5EF4-FFF2-40B4-BE49-F238E27FC236}">
-                <a16:creationId xmlns:a16="http://schemas.microsoft.com/office/drawing/2014/main" id="{71BE5C8D-986D-43AE-2EBE-19511B164B20}"/>
+                <a16:creationId xmlns:a16="http://schemas.microsoft.com/office/drawing/2014/main" xmlns="" id="{71BE5C8D-986D-43AE-2EBE-19511B164B20}"/>
               </a:ext>
             </a:extLst>
           </p:cNvPr>
@@ -9597,7 +9790,7 @@
           <p:cNvPr id="3" name="Content Placeholder 2">
             <a:extLst>
               <a:ext uri="{FF2B5EF4-FFF2-40B4-BE49-F238E27FC236}">
-                <a16:creationId xmlns:a16="http://schemas.microsoft.com/office/drawing/2014/main" id="{A0B89BCF-B723-AC5C-7D14-ABE4D49ADBEB}"/>
+                <a16:creationId xmlns:a16="http://schemas.microsoft.com/office/drawing/2014/main" xmlns="" id="{A0B89BCF-B723-AC5C-7D14-ABE4D49ADBEB}"/>
               </a:ext>
             </a:extLst>
           </p:cNvPr>
@@ -9662,10 +9855,10 @@
           <p:cNvPr id="21" name="Rectangle 20">
             <a:extLst>
               <a:ext uri="{FF2B5EF4-FFF2-40B4-BE49-F238E27FC236}">
-                <a16:creationId xmlns:a16="http://schemas.microsoft.com/office/drawing/2014/main" id="{395ECC94-3D5E-46A7-A7A1-DE807E1563B4}"/>
+                <a16:creationId xmlns:a16="http://schemas.microsoft.com/office/drawing/2014/main" xmlns="" id="{395ECC94-3D5E-46A7-A7A1-DE807E1563B4}"/>
               </a:ext>
               <a:ext uri="{C183D7F6-B498-43B3-948B-1728B52AA6E4}">
-                <adec:decorative xmlns:adec="http://schemas.microsoft.com/office/drawing/2017/decorative" val="1"/>
+                <adec:decorative xmlns:adec="http://schemas.microsoft.com/office/drawing/2017/decorative" xmlns="" val="1"/>
               </a:ext>
             </a:extLst>
           </p:cNvPr>
@@ -9675,7 +9868,7 @@
           <p:nvPr>
             <p:extLst>
               <p:ext uri="{386F3935-93C4-4BCD-93E2-E3B085C9AB24}">
-                <p16:designElem xmlns:p16="http://schemas.microsoft.com/office/powerpoint/2015/main" val="1"/>
+                <p16:designElem xmlns:p16="http://schemas.microsoft.com/office/powerpoint/2015/main" xmlns="" val="1"/>
               </p:ext>
             </p:extLst>
           </p:nvPr>
@@ -9732,10 +9925,10 @@
           <p:cNvPr id="23" name="Rectangle 22">
             <a:extLst>
               <a:ext uri="{FF2B5EF4-FFF2-40B4-BE49-F238E27FC236}">
-                <a16:creationId xmlns:a16="http://schemas.microsoft.com/office/drawing/2014/main" id="{7E549738-9961-462D-81B7-4A7A44691102}"/>
+                <a16:creationId xmlns:a16="http://schemas.microsoft.com/office/drawing/2014/main" xmlns="" id="{7E549738-9961-462D-81B7-4A7A44691102}"/>
               </a:ext>
               <a:ext uri="{C183D7F6-B498-43B3-948B-1728B52AA6E4}">
-                <adec:decorative xmlns:adec="http://schemas.microsoft.com/office/drawing/2017/decorative" val="1"/>
+                <adec:decorative xmlns:adec="http://schemas.microsoft.com/office/drawing/2017/decorative" xmlns="" val="1"/>
               </a:ext>
             </a:extLst>
           </p:cNvPr>
@@ -9745,7 +9938,7 @@
           <p:nvPr>
             <p:extLst>
               <p:ext uri="{386F3935-93C4-4BCD-93E2-E3B085C9AB24}">
-                <p16:designElem xmlns:p16="http://schemas.microsoft.com/office/powerpoint/2015/main" val="1"/>
+                <p16:designElem xmlns:p16="http://schemas.microsoft.com/office/powerpoint/2015/main" xmlns="" val="1"/>
               </p:ext>
             </p:extLst>
           </p:nvPr>
@@ -9802,7 +9995,7 @@
           <p:cNvPr id="5" name="Picture 4">
             <a:extLst>
               <a:ext uri="{FF2B5EF4-FFF2-40B4-BE49-F238E27FC236}">
-                <a16:creationId xmlns:a16="http://schemas.microsoft.com/office/drawing/2014/main" id="{0B0EE581-C237-F92C-E3FB-F41AC617835D}"/>
+                <a16:creationId xmlns:a16="http://schemas.microsoft.com/office/drawing/2014/main" xmlns="" id="{0B0EE581-C237-F92C-E3FB-F41AC617835D}"/>
               </a:ext>
             </a:extLst>
           </p:cNvPr>
@@ -9832,10 +10025,10 @@
           <p:cNvPr id="25" name="Straight Connector 24">
             <a:extLst>
               <a:ext uri="{FF2B5EF4-FFF2-40B4-BE49-F238E27FC236}">
-                <a16:creationId xmlns:a16="http://schemas.microsoft.com/office/drawing/2014/main" id="{6CF1BAF6-AD41-4082-B212-8A1F9A2E8779}"/>
+                <a16:creationId xmlns:a16="http://schemas.microsoft.com/office/drawing/2014/main" xmlns="" id="{6CF1BAF6-AD41-4082-B212-8A1F9A2E8779}"/>
               </a:ext>
               <a:ext uri="{C183D7F6-B498-43B3-948B-1728B52AA6E4}">
-                <adec:decorative xmlns:adec="http://schemas.microsoft.com/office/drawing/2017/decorative" val="1"/>
+                <adec:decorative xmlns:adec="http://schemas.microsoft.com/office/drawing/2017/decorative" xmlns="" val="1"/>
               </a:ext>
             </a:extLst>
           </p:cNvPr>
@@ -9845,7 +10038,7 @@
           <p:nvPr>
             <p:extLst>
               <p:ext uri="{386F3935-93C4-4BCD-93E2-E3B085C9AB24}">
-                <p16:designElem xmlns:p16="http://schemas.microsoft.com/office/powerpoint/2015/main" val="1"/>
+                <p16:designElem xmlns:p16="http://schemas.microsoft.com/office/powerpoint/2015/main" xmlns="" val="1"/>
               </p:ext>
             </p:extLst>
           </p:nvPr>
@@ -9884,7 +10077,7 @@
           <p:cNvPr id="7" name="Picture 6">
             <a:extLst>
               <a:ext uri="{FF2B5EF4-FFF2-40B4-BE49-F238E27FC236}">
-                <a16:creationId xmlns:a16="http://schemas.microsoft.com/office/drawing/2014/main" id="{5FC33CC0-F993-15C6-B440-53A11CD88AFB}"/>
+                <a16:creationId xmlns:a16="http://schemas.microsoft.com/office/drawing/2014/main" xmlns="" id="{5FC33CC0-F993-15C6-B440-53A11CD88AFB}"/>
               </a:ext>
             </a:extLst>
           </p:cNvPr>
@@ -9919,6 +10112,13 @@
   <p:clrMapOvr>
     <a:masterClrMapping/>
   </p:clrMapOvr>
+  <p:timing>
+    <p:tnLst>
+      <p:par>
+        <p:cTn id="1" dur="indefinite" restart="never" nodeType="tmRoot"/>
+      </p:par>
+    </p:tnLst>
+  </p:timing>
 </p:sld>
 </file>
 
@@ -9952,10 +10152,10 @@
           <p:cNvPr id="10" name="Rectangle 9">
             <a:extLst>
               <a:ext uri="{FF2B5EF4-FFF2-40B4-BE49-F238E27FC236}">
-                <a16:creationId xmlns:a16="http://schemas.microsoft.com/office/drawing/2014/main" id="{28D31E1B-0407-4223-9642-0B642CBF57D9}"/>
+                <a16:creationId xmlns:a16="http://schemas.microsoft.com/office/drawing/2014/main" xmlns="" id="{28D31E1B-0407-4223-9642-0B642CBF57D9}"/>
               </a:ext>
               <a:ext uri="{C183D7F6-B498-43B3-948B-1728B52AA6E4}">
-                <adec:decorative xmlns:adec="http://schemas.microsoft.com/office/drawing/2017/decorative" val="1"/>
+                <adec:decorative xmlns:adec="http://schemas.microsoft.com/office/drawing/2017/decorative" xmlns="" val="1"/>
               </a:ext>
             </a:extLst>
           </p:cNvPr>
@@ -9965,7 +10165,7 @@
           <p:nvPr>
             <p:extLst>
               <p:ext uri="{386F3935-93C4-4BCD-93E2-E3B085C9AB24}">
-                <p16:designElem xmlns:p16="http://schemas.microsoft.com/office/powerpoint/2015/main" val="1"/>
+                <p16:designElem xmlns:p16="http://schemas.microsoft.com/office/powerpoint/2015/main" xmlns="" val="1"/>
               </p:ext>
             </p:extLst>
           </p:nvPr>
@@ -10012,10 +10212,10 @@
           <p:cNvPr id="12" name="Group 11">
             <a:extLst>
               <a:ext uri="{FF2B5EF4-FFF2-40B4-BE49-F238E27FC236}">
-                <a16:creationId xmlns:a16="http://schemas.microsoft.com/office/drawing/2014/main" id="{AE1C45F0-260A-458C-96ED-C1F6D2151219}"/>
+                <a16:creationId xmlns:a16="http://schemas.microsoft.com/office/drawing/2014/main" xmlns="" id="{AE1C45F0-260A-458C-96ED-C1F6D2151219}"/>
               </a:ext>
               <a:ext uri="{C183D7F6-B498-43B3-948B-1728B52AA6E4}">
-                <adec:decorative xmlns:adec="http://schemas.microsoft.com/office/drawing/2017/decorative" val="1"/>
+                <adec:decorative xmlns:adec="http://schemas.microsoft.com/office/drawing/2017/decorative" xmlns="" val="1"/>
               </a:ext>
             </a:extLst>
           </p:cNvPr>
@@ -10025,7 +10225,7 @@
           <p:nvPr>
             <p:extLst>
               <p:ext uri="{386F3935-93C4-4BCD-93E2-E3B085C9AB24}">
-                <p16:designElem xmlns:p16="http://schemas.microsoft.com/office/powerpoint/2015/main" val="1"/>
+                <p16:designElem xmlns:p16="http://schemas.microsoft.com/office/powerpoint/2015/main" xmlns="" val="1"/>
               </p:ext>
             </p:extLst>
           </p:nvPr>
@@ -10046,10 +10246,10 @@
             <p:cNvPr id="13" name="Rectangle 12">
               <a:extLst>
                 <a:ext uri="{FF2B5EF4-FFF2-40B4-BE49-F238E27FC236}">
-                  <a16:creationId xmlns:a16="http://schemas.microsoft.com/office/drawing/2014/main" id="{A6604B49-AD5C-4590-B051-06C8222ECD99}"/>
+                  <a16:creationId xmlns:a16="http://schemas.microsoft.com/office/drawing/2014/main" xmlns="" id="{A6604B49-AD5C-4590-B051-06C8222ECD99}"/>
                 </a:ext>
                 <a:ext uri="{C183D7F6-B498-43B3-948B-1728B52AA6E4}">
-                  <adec:decorative xmlns:adec="http://schemas.microsoft.com/office/drawing/2017/decorative" val="1"/>
+                  <adec:decorative xmlns:adec="http://schemas.microsoft.com/office/drawing/2017/decorative" xmlns="" val="1"/>
                 </a:ext>
               </a:extLst>
             </p:cNvPr>
@@ -10057,7 +10257,7 @@
             <p:nvPr>
               <p:extLst>
                 <p:ext uri="{386F3935-93C4-4BCD-93E2-E3B085C9AB24}">
-                  <p16:designElem xmlns:p16="http://schemas.microsoft.com/office/powerpoint/2015/main" val="1"/>
+                  <p16:designElem xmlns:p16="http://schemas.microsoft.com/office/powerpoint/2015/main" xmlns="" val="1"/>
                 </p:ext>
               </p:extLst>
             </p:nvPr>
@@ -10105,10 +10305,10 @@
             <p:cNvPr id="14" name="Rectangle 13">
               <a:extLst>
                 <a:ext uri="{FF2B5EF4-FFF2-40B4-BE49-F238E27FC236}">
-                  <a16:creationId xmlns:a16="http://schemas.microsoft.com/office/drawing/2014/main" id="{743ECCAF-29C5-4537-947C-7EA1292463DB}"/>
+                  <a16:creationId xmlns:a16="http://schemas.microsoft.com/office/drawing/2014/main" xmlns="" id="{743ECCAF-29C5-4537-947C-7EA1292463DB}"/>
                 </a:ext>
                 <a:ext uri="{C183D7F6-B498-43B3-948B-1728B52AA6E4}">
-                  <adec:decorative xmlns:adec="http://schemas.microsoft.com/office/drawing/2017/decorative" val="1"/>
+                  <adec:decorative xmlns:adec="http://schemas.microsoft.com/office/drawing/2017/decorative" xmlns="" val="1"/>
                 </a:ext>
               </a:extLst>
             </p:cNvPr>
@@ -10116,7 +10316,7 @@
             <p:nvPr>
               <p:extLst>
                 <p:ext uri="{386F3935-93C4-4BCD-93E2-E3B085C9AB24}">
-                  <p16:designElem xmlns:p16="http://schemas.microsoft.com/office/powerpoint/2015/main" val="1"/>
+                  <p16:designElem xmlns:p16="http://schemas.microsoft.com/office/powerpoint/2015/main" xmlns="" val="1"/>
                 </p:ext>
               </p:extLst>
             </p:nvPr>
@@ -10164,10 +10364,10 @@
             <p:cNvPr id="15" name="Rectangle 14">
               <a:extLst>
                 <a:ext uri="{FF2B5EF4-FFF2-40B4-BE49-F238E27FC236}">
-                  <a16:creationId xmlns:a16="http://schemas.microsoft.com/office/drawing/2014/main" id="{ED49787B-8DE6-4467-AD0A-8DECC6E0C2D6}"/>
+                  <a16:creationId xmlns:a16="http://schemas.microsoft.com/office/drawing/2014/main" xmlns="" id="{ED49787B-8DE6-4467-AD0A-8DECC6E0C2D6}"/>
                 </a:ext>
                 <a:ext uri="{C183D7F6-B498-43B3-948B-1728B52AA6E4}">
-                  <adec:decorative xmlns:adec="http://schemas.microsoft.com/office/drawing/2017/decorative" val="1"/>
+                  <adec:decorative xmlns:adec="http://schemas.microsoft.com/office/drawing/2017/decorative" xmlns="" val="1"/>
                 </a:ext>
               </a:extLst>
             </p:cNvPr>
@@ -10175,7 +10375,7 @@
             <p:nvPr>
               <p:extLst>
                 <p:ext uri="{386F3935-93C4-4BCD-93E2-E3B085C9AB24}">
-                  <p16:designElem xmlns:p16="http://schemas.microsoft.com/office/powerpoint/2015/main" val="1"/>
+                  <p16:designElem xmlns:p16="http://schemas.microsoft.com/office/powerpoint/2015/main" xmlns="" val="1"/>
                 </p:ext>
               </p:extLst>
             </p:nvPr>
@@ -10224,10 +10424,10 @@
           <p:cNvPr id="17" name="Rectangle 16">
             <a:extLst>
               <a:ext uri="{FF2B5EF4-FFF2-40B4-BE49-F238E27FC236}">
-                <a16:creationId xmlns:a16="http://schemas.microsoft.com/office/drawing/2014/main" id="{D5B0017B-2ECA-49AF-B397-DC140825DF8D}"/>
+                <a16:creationId xmlns:a16="http://schemas.microsoft.com/office/drawing/2014/main" xmlns="" id="{D5B0017B-2ECA-49AF-B397-DC140825DF8D}"/>
               </a:ext>
               <a:ext uri="{C183D7F6-B498-43B3-948B-1728B52AA6E4}">
-                <adec:decorative xmlns:adec="http://schemas.microsoft.com/office/drawing/2017/decorative" val="1"/>
+                <adec:decorative xmlns:adec="http://schemas.microsoft.com/office/drawing/2017/decorative" xmlns="" val="1"/>
               </a:ext>
             </a:extLst>
           </p:cNvPr>
@@ -10237,7 +10437,7 @@
           <p:nvPr>
             <p:extLst>
               <p:ext uri="{386F3935-93C4-4BCD-93E2-E3B085C9AB24}">
-                <p16:designElem xmlns:p16="http://schemas.microsoft.com/office/powerpoint/2015/main" val="1"/>
+                <p16:designElem xmlns:p16="http://schemas.microsoft.com/office/powerpoint/2015/main" xmlns="" val="1"/>
               </p:ext>
             </p:extLst>
           </p:nvPr>
@@ -10294,7 +10494,7 @@
           <p:cNvPr id="2" name="Title 1">
             <a:extLst>
               <a:ext uri="{FF2B5EF4-FFF2-40B4-BE49-F238E27FC236}">
-                <a16:creationId xmlns:a16="http://schemas.microsoft.com/office/drawing/2014/main" id="{C97A0566-8A25-0486-C061-094585E0058F}"/>
+                <a16:creationId xmlns:a16="http://schemas.microsoft.com/office/drawing/2014/main" xmlns="" id="{C97A0566-8A25-0486-C061-094585E0058F}"/>
               </a:ext>
             </a:extLst>
           </p:cNvPr>
@@ -10329,7 +10529,7 @@
           <p:cNvPr id="3" name="Content Placeholder 2">
             <a:extLst>
               <a:ext uri="{FF2B5EF4-FFF2-40B4-BE49-F238E27FC236}">
-                <a16:creationId xmlns:a16="http://schemas.microsoft.com/office/drawing/2014/main" id="{666F08CC-ACF5-C6D9-4554-84890F4C4A65}"/>
+                <a16:creationId xmlns:a16="http://schemas.microsoft.com/office/drawing/2014/main" xmlns="" id="{666F08CC-ACF5-C6D9-4554-84890F4C4A65}"/>
               </a:ext>
             </a:extLst>
           </p:cNvPr>
@@ -10395,10 +10595,10 @@
           <p:cNvPr id="19" name="Rectangle 18">
             <a:extLst>
               <a:ext uri="{FF2B5EF4-FFF2-40B4-BE49-F238E27FC236}">
-                <a16:creationId xmlns:a16="http://schemas.microsoft.com/office/drawing/2014/main" id="{70E96339-907C-46C3-99AC-31179B6F0EBD}"/>
+                <a16:creationId xmlns:a16="http://schemas.microsoft.com/office/drawing/2014/main" xmlns="" id="{70E96339-907C-46C3-99AC-31179B6F0EBD}"/>
               </a:ext>
               <a:ext uri="{C183D7F6-B498-43B3-948B-1728B52AA6E4}">
-                <adec:decorative xmlns:adec="http://schemas.microsoft.com/office/drawing/2017/decorative" val="1"/>
+                <adec:decorative xmlns:adec="http://schemas.microsoft.com/office/drawing/2017/decorative" xmlns="" val="1"/>
               </a:ext>
             </a:extLst>
           </p:cNvPr>
@@ -10408,7 +10608,7 @@
           <p:nvPr>
             <p:extLst>
               <p:ext uri="{386F3935-93C4-4BCD-93E2-E3B085C9AB24}">
-                <p16:designElem xmlns:p16="http://schemas.microsoft.com/office/powerpoint/2015/main" val="1"/>
+                <p16:designElem xmlns:p16="http://schemas.microsoft.com/office/powerpoint/2015/main" xmlns="" val="1"/>
               </p:ext>
             </p:extLst>
           </p:nvPr>
@@ -10465,7 +10665,7 @@
           <p:cNvPr id="5" name="Picture 4">
             <a:extLst>
               <a:ext uri="{FF2B5EF4-FFF2-40B4-BE49-F238E27FC236}">
-                <a16:creationId xmlns:a16="http://schemas.microsoft.com/office/drawing/2014/main" id="{4F64308B-B563-F92B-7D94-9B52783B7440}"/>
+                <a16:creationId xmlns:a16="http://schemas.microsoft.com/office/drawing/2014/main" xmlns="" id="{4F64308B-B563-F92B-7D94-9B52783B7440}"/>
               </a:ext>
             </a:extLst>
           </p:cNvPr>
@@ -10495,10 +10695,10 @@
           <p:cNvPr id="21" name="Straight Connector 20">
             <a:extLst>
               <a:ext uri="{FF2B5EF4-FFF2-40B4-BE49-F238E27FC236}">
-                <a16:creationId xmlns:a16="http://schemas.microsoft.com/office/drawing/2014/main" id="{6CF1BAF6-AD41-4082-B212-8A1F9A2E8779}"/>
+                <a16:creationId xmlns:a16="http://schemas.microsoft.com/office/drawing/2014/main" xmlns="" id="{6CF1BAF6-AD41-4082-B212-8A1F9A2E8779}"/>
               </a:ext>
               <a:ext uri="{C183D7F6-B498-43B3-948B-1728B52AA6E4}">
-                <adec:decorative xmlns:adec="http://schemas.microsoft.com/office/drawing/2017/decorative" val="1"/>
+                <adec:decorative xmlns:adec="http://schemas.microsoft.com/office/drawing/2017/decorative" xmlns="" val="1"/>
               </a:ext>
             </a:extLst>
           </p:cNvPr>
@@ -10508,7 +10708,7 @@
           <p:nvPr>
             <p:extLst>
               <p:ext uri="{386F3935-93C4-4BCD-93E2-E3B085C9AB24}">
-                <p16:designElem xmlns:p16="http://schemas.microsoft.com/office/powerpoint/2015/main" val="1"/>
+                <p16:designElem xmlns:p16="http://schemas.microsoft.com/office/powerpoint/2015/main" xmlns="" val="1"/>
               </p:ext>
             </p:extLst>
           </p:nvPr>
@@ -10552,6 +10752,13 @@
   <p:clrMapOvr>
     <a:masterClrMapping/>
   </p:clrMapOvr>
+  <p:timing>
+    <p:tnLst>
+      <p:par>
+        <p:cTn id="1" dur="indefinite" restart="never" nodeType="tmRoot"/>
+      </p:par>
+    </p:tnLst>
+  </p:timing>
 </p:sld>
 </file>
 
@@ -10585,10 +10792,10 @@
           <p:cNvPr id="10" name="Rectangle 9">
             <a:extLst>
               <a:ext uri="{FF2B5EF4-FFF2-40B4-BE49-F238E27FC236}">
-                <a16:creationId xmlns:a16="http://schemas.microsoft.com/office/drawing/2014/main" id="{28D31E1B-0407-4223-9642-0B642CBF57D9}"/>
+                <a16:creationId xmlns:a16="http://schemas.microsoft.com/office/drawing/2014/main" xmlns="" id="{28D31E1B-0407-4223-9642-0B642CBF57D9}"/>
               </a:ext>
               <a:ext uri="{C183D7F6-B498-43B3-948B-1728B52AA6E4}">
-                <adec:decorative xmlns:adec="http://schemas.microsoft.com/office/drawing/2017/decorative" val="1"/>
+                <adec:decorative xmlns:adec="http://schemas.microsoft.com/office/drawing/2017/decorative" xmlns="" val="1"/>
               </a:ext>
             </a:extLst>
           </p:cNvPr>
@@ -10598,7 +10805,7 @@
           <p:nvPr>
             <p:extLst>
               <p:ext uri="{386F3935-93C4-4BCD-93E2-E3B085C9AB24}">
-                <p16:designElem xmlns:p16="http://schemas.microsoft.com/office/powerpoint/2015/main" val="1"/>
+                <p16:designElem xmlns:p16="http://schemas.microsoft.com/office/powerpoint/2015/main" xmlns="" val="1"/>
               </p:ext>
             </p:extLst>
           </p:nvPr>
@@ -10645,10 +10852,10 @@
           <p:cNvPr id="12" name="Group 11">
             <a:extLst>
               <a:ext uri="{FF2B5EF4-FFF2-40B4-BE49-F238E27FC236}">
-                <a16:creationId xmlns:a16="http://schemas.microsoft.com/office/drawing/2014/main" id="{AE1C45F0-260A-458C-96ED-C1F6D2151219}"/>
+                <a16:creationId xmlns:a16="http://schemas.microsoft.com/office/drawing/2014/main" xmlns="" id="{AE1C45F0-260A-458C-96ED-C1F6D2151219}"/>
               </a:ext>
               <a:ext uri="{C183D7F6-B498-43B3-948B-1728B52AA6E4}">
-                <adec:decorative xmlns:adec="http://schemas.microsoft.com/office/drawing/2017/decorative" val="1"/>
+                <adec:decorative xmlns:adec="http://schemas.microsoft.com/office/drawing/2017/decorative" xmlns="" val="1"/>
               </a:ext>
             </a:extLst>
           </p:cNvPr>
@@ -10658,7 +10865,7 @@
           <p:nvPr>
             <p:extLst>
               <p:ext uri="{386F3935-93C4-4BCD-93E2-E3B085C9AB24}">
-                <p16:designElem xmlns:p16="http://schemas.microsoft.com/office/powerpoint/2015/main" val="1"/>
+                <p16:designElem xmlns:p16="http://schemas.microsoft.com/office/powerpoint/2015/main" xmlns="" val="1"/>
               </p:ext>
             </p:extLst>
           </p:nvPr>
@@ -10679,10 +10886,10 @@
             <p:cNvPr id="13" name="Rectangle 12">
               <a:extLst>
                 <a:ext uri="{FF2B5EF4-FFF2-40B4-BE49-F238E27FC236}">
-                  <a16:creationId xmlns:a16="http://schemas.microsoft.com/office/drawing/2014/main" id="{A6604B49-AD5C-4590-B051-06C8222ECD99}"/>
+                  <a16:creationId xmlns:a16="http://schemas.microsoft.com/office/drawing/2014/main" xmlns="" id="{A6604B49-AD5C-4590-B051-06C8222ECD99}"/>
                 </a:ext>
                 <a:ext uri="{C183D7F6-B498-43B3-948B-1728B52AA6E4}">
-                  <adec:decorative xmlns:adec="http://schemas.microsoft.com/office/drawing/2017/decorative" val="1"/>
+                  <adec:decorative xmlns:adec="http://schemas.microsoft.com/office/drawing/2017/decorative" xmlns="" val="1"/>
                 </a:ext>
               </a:extLst>
             </p:cNvPr>
@@ -10690,7 +10897,7 @@
             <p:nvPr>
               <p:extLst>
                 <p:ext uri="{386F3935-93C4-4BCD-93E2-E3B085C9AB24}">
-                  <p16:designElem xmlns:p16="http://schemas.microsoft.com/office/powerpoint/2015/main" val="1"/>
+                  <p16:designElem xmlns:p16="http://schemas.microsoft.com/office/powerpoint/2015/main" xmlns="" val="1"/>
                 </p:ext>
               </p:extLst>
             </p:nvPr>
@@ -10738,10 +10945,10 @@
             <p:cNvPr id="14" name="Rectangle 13">
               <a:extLst>
                 <a:ext uri="{FF2B5EF4-FFF2-40B4-BE49-F238E27FC236}">
-                  <a16:creationId xmlns:a16="http://schemas.microsoft.com/office/drawing/2014/main" id="{743ECCAF-29C5-4537-947C-7EA1292463DB}"/>
+                  <a16:creationId xmlns:a16="http://schemas.microsoft.com/office/drawing/2014/main" xmlns="" id="{743ECCAF-29C5-4537-947C-7EA1292463DB}"/>
                 </a:ext>
                 <a:ext uri="{C183D7F6-B498-43B3-948B-1728B52AA6E4}">
-                  <adec:decorative xmlns:adec="http://schemas.microsoft.com/office/drawing/2017/decorative" val="1"/>
+                  <adec:decorative xmlns:adec="http://schemas.microsoft.com/office/drawing/2017/decorative" xmlns="" val="1"/>
                 </a:ext>
               </a:extLst>
             </p:cNvPr>
@@ -10749,7 +10956,7 @@
             <p:nvPr>
               <p:extLst>
                 <p:ext uri="{386F3935-93C4-4BCD-93E2-E3B085C9AB24}">
-                  <p16:designElem xmlns:p16="http://schemas.microsoft.com/office/powerpoint/2015/main" val="1"/>
+                  <p16:designElem xmlns:p16="http://schemas.microsoft.com/office/powerpoint/2015/main" xmlns="" val="1"/>
                 </p:ext>
               </p:extLst>
             </p:nvPr>
@@ -10797,10 +11004,10 @@
             <p:cNvPr id="15" name="Rectangle 14">
               <a:extLst>
                 <a:ext uri="{FF2B5EF4-FFF2-40B4-BE49-F238E27FC236}">
-                  <a16:creationId xmlns:a16="http://schemas.microsoft.com/office/drawing/2014/main" id="{ED49787B-8DE6-4467-AD0A-8DECC6E0C2D6}"/>
+                  <a16:creationId xmlns:a16="http://schemas.microsoft.com/office/drawing/2014/main" xmlns="" id="{ED49787B-8DE6-4467-AD0A-8DECC6E0C2D6}"/>
                 </a:ext>
                 <a:ext uri="{C183D7F6-B498-43B3-948B-1728B52AA6E4}">
-                  <adec:decorative xmlns:adec="http://schemas.microsoft.com/office/drawing/2017/decorative" val="1"/>
+                  <adec:decorative xmlns:adec="http://schemas.microsoft.com/office/drawing/2017/decorative" xmlns="" val="1"/>
                 </a:ext>
               </a:extLst>
             </p:cNvPr>
@@ -10808,7 +11015,7 @@
             <p:nvPr>
               <p:extLst>
                 <p:ext uri="{386F3935-93C4-4BCD-93E2-E3B085C9AB24}">
-                  <p16:designElem xmlns:p16="http://schemas.microsoft.com/office/powerpoint/2015/main" val="1"/>
+                  <p16:designElem xmlns:p16="http://schemas.microsoft.com/office/powerpoint/2015/main" xmlns="" val="1"/>
                 </p:ext>
               </p:extLst>
             </p:nvPr>
@@ -10857,10 +11064,10 @@
           <p:cNvPr id="17" name="Rectangle 16">
             <a:extLst>
               <a:ext uri="{FF2B5EF4-FFF2-40B4-BE49-F238E27FC236}">
-                <a16:creationId xmlns:a16="http://schemas.microsoft.com/office/drawing/2014/main" id="{D5B0017B-2ECA-49AF-B397-DC140825DF8D}"/>
+                <a16:creationId xmlns:a16="http://schemas.microsoft.com/office/drawing/2014/main" xmlns="" id="{D5B0017B-2ECA-49AF-B397-DC140825DF8D}"/>
               </a:ext>
               <a:ext uri="{C183D7F6-B498-43B3-948B-1728B52AA6E4}">
-                <adec:decorative xmlns:adec="http://schemas.microsoft.com/office/drawing/2017/decorative" val="1"/>
+                <adec:decorative xmlns:adec="http://schemas.microsoft.com/office/drawing/2017/decorative" xmlns="" val="1"/>
               </a:ext>
             </a:extLst>
           </p:cNvPr>
@@ -10870,7 +11077,7 @@
           <p:nvPr>
             <p:extLst>
               <p:ext uri="{386F3935-93C4-4BCD-93E2-E3B085C9AB24}">
-                <p16:designElem xmlns:p16="http://schemas.microsoft.com/office/powerpoint/2015/main" val="1"/>
+                <p16:designElem xmlns:p16="http://schemas.microsoft.com/office/powerpoint/2015/main" xmlns="" val="1"/>
               </p:ext>
             </p:extLst>
           </p:nvPr>
@@ -10927,7 +11134,7 @@
           <p:cNvPr id="2" name="Title 1">
             <a:extLst>
               <a:ext uri="{FF2B5EF4-FFF2-40B4-BE49-F238E27FC236}">
-                <a16:creationId xmlns:a16="http://schemas.microsoft.com/office/drawing/2014/main" id="{D4D4ECC4-BE0C-D1C7-4D6E-939B17F16093}"/>
+                <a16:creationId xmlns:a16="http://schemas.microsoft.com/office/drawing/2014/main" xmlns="" id="{D4D4ECC4-BE0C-D1C7-4D6E-939B17F16093}"/>
               </a:ext>
             </a:extLst>
           </p:cNvPr>
@@ -10962,7 +11169,7 @@
           <p:cNvPr id="3" name="Content Placeholder 2">
             <a:extLst>
               <a:ext uri="{FF2B5EF4-FFF2-40B4-BE49-F238E27FC236}">
-                <a16:creationId xmlns:a16="http://schemas.microsoft.com/office/drawing/2014/main" id="{62424227-519F-646D-CD8F-637BCCC89371}"/>
+                <a16:creationId xmlns:a16="http://schemas.microsoft.com/office/drawing/2014/main" xmlns="" id="{62424227-519F-646D-CD8F-637BCCC89371}"/>
               </a:ext>
             </a:extLst>
           </p:cNvPr>
@@ -11015,10 +11222,10 @@
           <p:cNvPr id="19" name="Rectangle 18">
             <a:extLst>
               <a:ext uri="{FF2B5EF4-FFF2-40B4-BE49-F238E27FC236}">
-                <a16:creationId xmlns:a16="http://schemas.microsoft.com/office/drawing/2014/main" id="{70E96339-907C-46C3-99AC-31179B6F0EBD}"/>
+                <a16:creationId xmlns:a16="http://schemas.microsoft.com/office/drawing/2014/main" xmlns="" id="{70E96339-907C-46C3-99AC-31179B6F0EBD}"/>
               </a:ext>
               <a:ext uri="{C183D7F6-B498-43B3-948B-1728B52AA6E4}">
-                <adec:decorative xmlns:adec="http://schemas.microsoft.com/office/drawing/2017/decorative" val="1"/>
+                <adec:decorative xmlns:adec="http://schemas.microsoft.com/office/drawing/2017/decorative" xmlns="" val="1"/>
               </a:ext>
             </a:extLst>
           </p:cNvPr>
@@ -11028,7 +11235,7 @@
           <p:nvPr>
             <p:extLst>
               <p:ext uri="{386F3935-93C4-4BCD-93E2-E3B085C9AB24}">
-                <p16:designElem xmlns:p16="http://schemas.microsoft.com/office/powerpoint/2015/main" val="1"/>
+                <p16:designElem xmlns:p16="http://schemas.microsoft.com/office/powerpoint/2015/main" xmlns="" val="1"/>
               </p:ext>
             </p:extLst>
           </p:nvPr>
@@ -11085,10 +11292,10 @@
           <p:cNvPr id="21" name="Straight Connector 20">
             <a:extLst>
               <a:ext uri="{FF2B5EF4-FFF2-40B4-BE49-F238E27FC236}">
-                <a16:creationId xmlns:a16="http://schemas.microsoft.com/office/drawing/2014/main" id="{6CF1BAF6-AD41-4082-B212-8A1F9A2E8779}"/>
+                <a16:creationId xmlns:a16="http://schemas.microsoft.com/office/drawing/2014/main" xmlns="" id="{6CF1BAF6-AD41-4082-B212-8A1F9A2E8779}"/>
               </a:ext>
               <a:ext uri="{C183D7F6-B498-43B3-948B-1728B52AA6E4}">
-                <adec:decorative xmlns:adec="http://schemas.microsoft.com/office/drawing/2017/decorative" val="1"/>
+                <adec:decorative xmlns:adec="http://schemas.microsoft.com/office/drawing/2017/decorative" xmlns="" val="1"/>
               </a:ext>
             </a:extLst>
           </p:cNvPr>
@@ -11098,7 +11305,7 @@
           <p:nvPr>
             <p:extLst>
               <p:ext uri="{386F3935-93C4-4BCD-93E2-E3B085C9AB24}">
-                <p16:designElem xmlns:p16="http://schemas.microsoft.com/office/powerpoint/2015/main" val="1"/>
+                <p16:designElem xmlns:p16="http://schemas.microsoft.com/office/powerpoint/2015/main" xmlns="" val="1"/>
               </p:ext>
             </p:extLst>
           </p:nvPr>
@@ -11137,7 +11344,7 @@
           <p:cNvPr id="9" name="Picture 8">
             <a:extLst>
               <a:ext uri="{FF2B5EF4-FFF2-40B4-BE49-F238E27FC236}">
-                <a16:creationId xmlns:a16="http://schemas.microsoft.com/office/drawing/2014/main" id="{4E415E61-5E07-5D4F-ACD8-8AF59637A565}"/>
+                <a16:creationId xmlns:a16="http://schemas.microsoft.com/office/drawing/2014/main" xmlns="" id="{4E415E61-5E07-5D4F-ACD8-8AF59637A565}"/>
               </a:ext>
             </a:extLst>
           </p:cNvPr>
@@ -11167,7 +11374,7 @@
           <p:cNvPr id="16" name="Picture 15">
             <a:extLst>
               <a:ext uri="{FF2B5EF4-FFF2-40B4-BE49-F238E27FC236}">
-                <a16:creationId xmlns:a16="http://schemas.microsoft.com/office/drawing/2014/main" id="{BD634800-EE60-73CF-F798-4DAC052C417D}"/>
+                <a16:creationId xmlns:a16="http://schemas.microsoft.com/office/drawing/2014/main" xmlns="" id="{BD634800-EE60-73CF-F798-4DAC052C417D}"/>
               </a:ext>
             </a:extLst>
           </p:cNvPr>
@@ -11202,6 +11409,13 @@
   <p:clrMapOvr>
     <a:masterClrMapping/>
   </p:clrMapOvr>
+  <p:timing>
+    <p:tnLst>
+      <p:par>
+        <p:cTn id="1" dur="indefinite" restart="never" nodeType="tmRoot"/>
+      </p:par>
+    </p:tnLst>
+  </p:timing>
 </p:sld>
 </file>
 
@@ -11235,10 +11449,10 @@
           <p:cNvPr id="10" name="Rectangle 9">
             <a:extLst>
               <a:ext uri="{FF2B5EF4-FFF2-40B4-BE49-F238E27FC236}">
-                <a16:creationId xmlns:a16="http://schemas.microsoft.com/office/drawing/2014/main" id="{28D31E1B-0407-4223-9642-0B642CBF57D9}"/>
+                <a16:creationId xmlns:a16="http://schemas.microsoft.com/office/drawing/2014/main" xmlns="" id="{28D31E1B-0407-4223-9642-0B642CBF57D9}"/>
               </a:ext>
               <a:ext uri="{C183D7F6-B498-43B3-948B-1728B52AA6E4}">
-                <adec:decorative xmlns:adec="http://schemas.microsoft.com/office/drawing/2017/decorative" val="1"/>
+                <adec:decorative xmlns:adec="http://schemas.microsoft.com/office/drawing/2017/decorative" xmlns="" val="1"/>
               </a:ext>
             </a:extLst>
           </p:cNvPr>
@@ -11248,7 +11462,7 @@
           <p:nvPr>
             <p:extLst>
               <p:ext uri="{386F3935-93C4-4BCD-93E2-E3B085C9AB24}">
-                <p16:designElem xmlns:p16="http://schemas.microsoft.com/office/powerpoint/2015/main" val="1"/>
+                <p16:designElem xmlns:p16="http://schemas.microsoft.com/office/powerpoint/2015/main" xmlns="" val="1"/>
               </p:ext>
             </p:extLst>
           </p:nvPr>
@@ -11295,10 +11509,10 @@
           <p:cNvPr id="12" name="Group 11">
             <a:extLst>
               <a:ext uri="{FF2B5EF4-FFF2-40B4-BE49-F238E27FC236}">
-                <a16:creationId xmlns:a16="http://schemas.microsoft.com/office/drawing/2014/main" id="{AE1C45F0-260A-458C-96ED-C1F6D2151219}"/>
+                <a16:creationId xmlns:a16="http://schemas.microsoft.com/office/drawing/2014/main" xmlns="" id="{AE1C45F0-260A-458C-96ED-C1F6D2151219}"/>
               </a:ext>
               <a:ext uri="{C183D7F6-B498-43B3-948B-1728B52AA6E4}">
-                <adec:decorative xmlns:adec="http://schemas.microsoft.com/office/drawing/2017/decorative" val="1"/>
+                <adec:decorative xmlns:adec="http://schemas.microsoft.com/office/drawing/2017/decorative" xmlns="" val="1"/>
               </a:ext>
             </a:extLst>
           </p:cNvPr>
@@ -11308,7 +11522,7 @@
           <p:nvPr>
             <p:extLst>
               <p:ext uri="{386F3935-93C4-4BCD-93E2-E3B085C9AB24}">
-                <p16:designElem xmlns:p16="http://schemas.microsoft.com/office/powerpoint/2015/main" val="1"/>
+                <p16:designElem xmlns:p16="http://schemas.microsoft.com/office/powerpoint/2015/main" xmlns="" val="1"/>
               </p:ext>
             </p:extLst>
           </p:nvPr>
@@ -11329,10 +11543,10 @@
             <p:cNvPr id="13" name="Rectangle 12">
               <a:extLst>
                 <a:ext uri="{FF2B5EF4-FFF2-40B4-BE49-F238E27FC236}">
-                  <a16:creationId xmlns:a16="http://schemas.microsoft.com/office/drawing/2014/main" id="{A6604B49-AD5C-4590-B051-06C8222ECD99}"/>
+                  <a16:creationId xmlns:a16="http://schemas.microsoft.com/office/drawing/2014/main" xmlns="" id="{A6604B49-AD5C-4590-B051-06C8222ECD99}"/>
                 </a:ext>
                 <a:ext uri="{C183D7F6-B498-43B3-948B-1728B52AA6E4}">
-                  <adec:decorative xmlns:adec="http://schemas.microsoft.com/office/drawing/2017/decorative" val="1"/>
+                  <adec:decorative xmlns:adec="http://schemas.microsoft.com/office/drawing/2017/decorative" xmlns="" val="1"/>
                 </a:ext>
               </a:extLst>
             </p:cNvPr>
@@ -11340,7 +11554,7 @@
             <p:nvPr>
               <p:extLst>
                 <p:ext uri="{386F3935-93C4-4BCD-93E2-E3B085C9AB24}">
-                  <p16:designElem xmlns:p16="http://schemas.microsoft.com/office/powerpoint/2015/main" val="1"/>
+                  <p16:designElem xmlns:p16="http://schemas.microsoft.com/office/powerpoint/2015/main" xmlns="" val="1"/>
                 </p:ext>
               </p:extLst>
             </p:nvPr>
@@ -11388,10 +11602,10 @@
             <p:cNvPr id="14" name="Rectangle 13">
               <a:extLst>
                 <a:ext uri="{FF2B5EF4-FFF2-40B4-BE49-F238E27FC236}">
-                  <a16:creationId xmlns:a16="http://schemas.microsoft.com/office/drawing/2014/main" id="{743ECCAF-29C5-4537-947C-7EA1292463DB}"/>
+                  <a16:creationId xmlns:a16="http://schemas.microsoft.com/office/drawing/2014/main" xmlns="" id="{743ECCAF-29C5-4537-947C-7EA1292463DB}"/>
                 </a:ext>
                 <a:ext uri="{C183D7F6-B498-43B3-948B-1728B52AA6E4}">
-                  <adec:decorative xmlns:adec="http://schemas.microsoft.com/office/drawing/2017/decorative" val="1"/>
+                  <adec:decorative xmlns:adec="http://schemas.microsoft.com/office/drawing/2017/decorative" xmlns="" val="1"/>
                 </a:ext>
               </a:extLst>
             </p:cNvPr>
@@ -11399,7 +11613,7 @@
             <p:nvPr>
               <p:extLst>
                 <p:ext uri="{386F3935-93C4-4BCD-93E2-E3B085C9AB24}">
-                  <p16:designElem xmlns:p16="http://schemas.microsoft.com/office/powerpoint/2015/main" val="1"/>
+                  <p16:designElem xmlns:p16="http://schemas.microsoft.com/office/powerpoint/2015/main" xmlns="" val="1"/>
                 </p:ext>
               </p:extLst>
             </p:nvPr>
@@ -11447,10 +11661,10 @@
             <p:cNvPr id="15" name="Rectangle 14">
               <a:extLst>
                 <a:ext uri="{FF2B5EF4-FFF2-40B4-BE49-F238E27FC236}">
-                  <a16:creationId xmlns:a16="http://schemas.microsoft.com/office/drawing/2014/main" id="{ED49787B-8DE6-4467-AD0A-8DECC6E0C2D6}"/>
+                  <a16:creationId xmlns:a16="http://schemas.microsoft.com/office/drawing/2014/main" xmlns="" id="{ED49787B-8DE6-4467-AD0A-8DECC6E0C2D6}"/>
                 </a:ext>
                 <a:ext uri="{C183D7F6-B498-43B3-948B-1728B52AA6E4}">
-                  <adec:decorative xmlns:adec="http://schemas.microsoft.com/office/drawing/2017/decorative" val="1"/>
+                  <adec:decorative xmlns:adec="http://schemas.microsoft.com/office/drawing/2017/decorative" xmlns="" val="1"/>
                 </a:ext>
               </a:extLst>
             </p:cNvPr>
@@ -11458,7 +11672,7 @@
             <p:nvPr>
               <p:extLst>
                 <p:ext uri="{386F3935-93C4-4BCD-93E2-E3B085C9AB24}">
-                  <p16:designElem xmlns:p16="http://schemas.microsoft.com/office/powerpoint/2015/main" val="1"/>
+                  <p16:designElem xmlns:p16="http://schemas.microsoft.com/office/powerpoint/2015/main" xmlns="" val="1"/>
                 </p:ext>
               </p:extLst>
             </p:nvPr>
@@ -11507,10 +11721,10 @@
           <p:cNvPr id="17" name="Rectangle 16">
             <a:extLst>
               <a:ext uri="{FF2B5EF4-FFF2-40B4-BE49-F238E27FC236}">
-                <a16:creationId xmlns:a16="http://schemas.microsoft.com/office/drawing/2014/main" id="{D5B0017B-2ECA-49AF-B397-DC140825DF8D}"/>
+                <a16:creationId xmlns:a16="http://schemas.microsoft.com/office/drawing/2014/main" xmlns="" id="{D5B0017B-2ECA-49AF-B397-DC140825DF8D}"/>
               </a:ext>
               <a:ext uri="{C183D7F6-B498-43B3-948B-1728B52AA6E4}">
-                <adec:decorative xmlns:adec="http://schemas.microsoft.com/office/drawing/2017/decorative" val="1"/>
+                <adec:decorative xmlns:adec="http://schemas.microsoft.com/office/drawing/2017/decorative" xmlns="" val="1"/>
               </a:ext>
             </a:extLst>
           </p:cNvPr>
@@ -11520,7 +11734,7 @@
           <p:nvPr>
             <p:extLst>
               <p:ext uri="{386F3935-93C4-4BCD-93E2-E3B085C9AB24}">
-                <p16:designElem xmlns:p16="http://schemas.microsoft.com/office/powerpoint/2015/main" val="1"/>
+                <p16:designElem xmlns:p16="http://schemas.microsoft.com/office/powerpoint/2015/main" xmlns="" val="1"/>
               </p:ext>
             </p:extLst>
           </p:nvPr>
@@ -11577,7 +11791,7 @@
           <p:cNvPr id="2" name="Title 1">
             <a:extLst>
               <a:ext uri="{FF2B5EF4-FFF2-40B4-BE49-F238E27FC236}">
-                <a16:creationId xmlns:a16="http://schemas.microsoft.com/office/drawing/2014/main" id="{6A2E8E2C-B8FE-31CA-59D7-977E5A700781}"/>
+                <a16:creationId xmlns:a16="http://schemas.microsoft.com/office/drawing/2014/main" xmlns="" id="{6A2E8E2C-B8FE-31CA-59D7-977E5A700781}"/>
               </a:ext>
             </a:extLst>
           </p:cNvPr>
@@ -11612,7 +11826,7 @@
           <p:cNvPr id="3" name="Content Placeholder 2">
             <a:extLst>
               <a:ext uri="{FF2B5EF4-FFF2-40B4-BE49-F238E27FC236}">
-                <a16:creationId xmlns:a16="http://schemas.microsoft.com/office/drawing/2014/main" id="{832602FE-66B4-5768-2E44-02EAD9DF27ED}"/>
+                <a16:creationId xmlns:a16="http://schemas.microsoft.com/office/drawing/2014/main" xmlns="" id="{832602FE-66B4-5768-2E44-02EAD9DF27ED}"/>
               </a:ext>
             </a:extLst>
           </p:cNvPr>
@@ -11695,10 +11909,10 @@
           <p:cNvPr id="19" name="Rectangle 18">
             <a:extLst>
               <a:ext uri="{FF2B5EF4-FFF2-40B4-BE49-F238E27FC236}">
-                <a16:creationId xmlns:a16="http://schemas.microsoft.com/office/drawing/2014/main" id="{70E96339-907C-46C3-99AC-31179B6F0EBD}"/>
+                <a16:creationId xmlns:a16="http://schemas.microsoft.com/office/drawing/2014/main" xmlns="" id="{70E96339-907C-46C3-99AC-31179B6F0EBD}"/>
               </a:ext>
               <a:ext uri="{C183D7F6-B498-43B3-948B-1728B52AA6E4}">
-                <adec:decorative xmlns:adec="http://schemas.microsoft.com/office/drawing/2017/decorative" val="1"/>
+                <adec:decorative xmlns:adec="http://schemas.microsoft.com/office/drawing/2017/decorative" xmlns="" val="1"/>
               </a:ext>
             </a:extLst>
           </p:cNvPr>
@@ -11708,7 +11922,7 @@
           <p:nvPr>
             <p:extLst>
               <p:ext uri="{386F3935-93C4-4BCD-93E2-E3B085C9AB24}">
-                <p16:designElem xmlns:p16="http://schemas.microsoft.com/office/powerpoint/2015/main" val="1"/>
+                <p16:designElem xmlns:p16="http://schemas.microsoft.com/office/powerpoint/2015/main" xmlns="" val="1"/>
               </p:ext>
             </p:extLst>
           </p:nvPr>
@@ -11765,10 +11979,10 @@
           <p:cNvPr id="21" name="Straight Connector 20">
             <a:extLst>
               <a:ext uri="{FF2B5EF4-FFF2-40B4-BE49-F238E27FC236}">
-                <a16:creationId xmlns:a16="http://schemas.microsoft.com/office/drawing/2014/main" id="{6CF1BAF6-AD41-4082-B212-8A1F9A2E8779}"/>
+                <a16:creationId xmlns:a16="http://schemas.microsoft.com/office/drawing/2014/main" xmlns="" id="{6CF1BAF6-AD41-4082-B212-8A1F9A2E8779}"/>
               </a:ext>
               <a:ext uri="{C183D7F6-B498-43B3-948B-1728B52AA6E4}">
-                <adec:decorative xmlns:adec="http://schemas.microsoft.com/office/drawing/2017/decorative" val="1"/>
+                <adec:decorative xmlns:adec="http://schemas.microsoft.com/office/drawing/2017/decorative" xmlns="" val="1"/>
               </a:ext>
             </a:extLst>
           </p:cNvPr>
@@ -11778,7 +11992,7 @@
           <p:nvPr>
             <p:extLst>
               <p:ext uri="{386F3935-93C4-4BCD-93E2-E3B085C9AB24}">
-                <p16:designElem xmlns:p16="http://schemas.microsoft.com/office/powerpoint/2015/main" val="1"/>
+                <p16:designElem xmlns:p16="http://schemas.microsoft.com/office/powerpoint/2015/main" xmlns="" val="1"/>
               </p:ext>
             </p:extLst>
           </p:nvPr>
@@ -11817,7 +12031,7 @@
           <p:cNvPr id="7" name="Picture 6">
             <a:extLst>
               <a:ext uri="{FF2B5EF4-FFF2-40B4-BE49-F238E27FC236}">
-                <a16:creationId xmlns:a16="http://schemas.microsoft.com/office/drawing/2014/main" id="{FCEC9426-0747-E004-036A-DE37271F5CD9}"/>
+                <a16:creationId xmlns:a16="http://schemas.microsoft.com/office/drawing/2014/main" xmlns="" id="{FCEC9426-0747-E004-036A-DE37271F5CD9}"/>
               </a:ext>
             </a:extLst>
           </p:cNvPr>
@@ -11847,7 +12061,7 @@
           <p:cNvPr id="9" name="Picture 8">
             <a:extLst>
               <a:ext uri="{FF2B5EF4-FFF2-40B4-BE49-F238E27FC236}">
-                <a16:creationId xmlns:a16="http://schemas.microsoft.com/office/drawing/2014/main" id="{834FE2C3-D911-7665-0181-DF88FE9A9216}"/>
+                <a16:creationId xmlns:a16="http://schemas.microsoft.com/office/drawing/2014/main" xmlns="" id="{834FE2C3-D911-7665-0181-DF88FE9A9216}"/>
               </a:ext>
             </a:extLst>
           </p:cNvPr>
@@ -11882,6 +12096,13 @@
   <p:clrMapOvr>
     <a:masterClrMapping/>
   </p:clrMapOvr>
+  <p:timing>
+    <p:tnLst>
+      <p:par>
+        <p:cTn id="1" dur="indefinite" restart="never" nodeType="tmRoot"/>
+      </p:par>
+    </p:tnLst>
+  </p:timing>
 </p:sld>
 </file>
 
@@ -11915,10 +12136,10 @@
           <p:cNvPr id="10" name="Rectangle 9">
             <a:extLst>
               <a:ext uri="{FF2B5EF4-FFF2-40B4-BE49-F238E27FC236}">
-                <a16:creationId xmlns:a16="http://schemas.microsoft.com/office/drawing/2014/main" id="{28D31E1B-0407-4223-9642-0B642CBF57D9}"/>
+                <a16:creationId xmlns:a16="http://schemas.microsoft.com/office/drawing/2014/main" xmlns="" id="{28D31E1B-0407-4223-9642-0B642CBF57D9}"/>
               </a:ext>
               <a:ext uri="{C183D7F6-B498-43B3-948B-1728B52AA6E4}">
-                <adec:decorative xmlns:adec="http://schemas.microsoft.com/office/drawing/2017/decorative" val="1"/>
+                <adec:decorative xmlns:adec="http://schemas.microsoft.com/office/drawing/2017/decorative" xmlns="" val="1"/>
               </a:ext>
             </a:extLst>
           </p:cNvPr>
@@ -11928,7 +12149,7 @@
           <p:nvPr>
             <p:extLst>
               <p:ext uri="{386F3935-93C4-4BCD-93E2-E3B085C9AB24}">
-                <p16:designElem xmlns:p16="http://schemas.microsoft.com/office/powerpoint/2015/main" val="1"/>
+                <p16:designElem xmlns:p16="http://schemas.microsoft.com/office/powerpoint/2015/main" xmlns="" val="1"/>
               </p:ext>
             </p:extLst>
           </p:nvPr>
@@ -11975,10 +12196,10 @@
           <p:cNvPr id="12" name="Group 11">
             <a:extLst>
               <a:ext uri="{FF2B5EF4-FFF2-40B4-BE49-F238E27FC236}">
-                <a16:creationId xmlns:a16="http://schemas.microsoft.com/office/drawing/2014/main" id="{AE1C45F0-260A-458C-96ED-C1F6D2151219}"/>
+                <a16:creationId xmlns:a16="http://schemas.microsoft.com/office/drawing/2014/main" xmlns="" id="{AE1C45F0-260A-458C-96ED-C1F6D2151219}"/>
               </a:ext>
               <a:ext uri="{C183D7F6-B498-43B3-948B-1728B52AA6E4}">
-                <adec:decorative xmlns:adec="http://schemas.microsoft.com/office/drawing/2017/decorative" val="1"/>
+                <adec:decorative xmlns:adec="http://schemas.microsoft.com/office/drawing/2017/decorative" xmlns="" val="1"/>
               </a:ext>
             </a:extLst>
           </p:cNvPr>
@@ -11988,7 +12209,7 @@
           <p:nvPr>
             <p:extLst>
               <p:ext uri="{386F3935-93C4-4BCD-93E2-E3B085C9AB24}">
-                <p16:designElem xmlns:p16="http://schemas.microsoft.com/office/powerpoint/2015/main" val="1"/>
+                <p16:designElem xmlns:p16="http://schemas.microsoft.com/office/powerpoint/2015/main" xmlns="" val="1"/>
               </p:ext>
             </p:extLst>
           </p:nvPr>
@@ -12009,10 +12230,10 @@
             <p:cNvPr id="13" name="Rectangle 12">
               <a:extLst>
                 <a:ext uri="{FF2B5EF4-FFF2-40B4-BE49-F238E27FC236}">
-                  <a16:creationId xmlns:a16="http://schemas.microsoft.com/office/drawing/2014/main" id="{A6604B49-AD5C-4590-B051-06C8222ECD99}"/>
+                  <a16:creationId xmlns:a16="http://schemas.microsoft.com/office/drawing/2014/main" xmlns="" id="{A6604B49-AD5C-4590-B051-06C8222ECD99}"/>
                 </a:ext>
                 <a:ext uri="{C183D7F6-B498-43B3-948B-1728B52AA6E4}">
-                  <adec:decorative xmlns:adec="http://schemas.microsoft.com/office/drawing/2017/decorative" val="1"/>
+                  <adec:decorative xmlns:adec="http://schemas.microsoft.com/office/drawing/2017/decorative" xmlns="" val="1"/>
                 </a:ext>
               </a:extLst>
             </p:cNvPr>
@@ -12020,7 +12241,7 @@
             <p:nvPr>
               <p:extLst>
                 <p:ext uri="{386F3935-93C4-4BCD-93E2-E3B085C9AB24}">
-                  <p16:designElem xmlns:p16="http://schemas.microsoft.com/office/powerpoint/2015/main" val="1"/>
+                  <p16:designElem xmlns:p16="http://schemas.microsoft.com/office/powerpoint/2015/main" xmlns="" val="1"/>
                 </p:ext>
               </p:extLst>
             </p:nvPr>
@@ -12068,10 +12289,10 @@
             <p:cNvPr id="14" name="Rectangle 13">
               <a:extLst>
                 <a:ext uri="{FF2B5EF4-FFF2-40B4-BE49-F238E27FC236}">
-                  <a16:creationId xmlns:a16="http://schemas.microsoft.com/office/drawing/2014/main" id="{743ECCAF-29C5-4537-947C-7EA1292463DB}"/>
+                  <a16:creationId xmlns:a16="http://schemas.microsoft.com/office/drawing/2014/main" xmlns="" id="{743ECCAF-29C5-4537-947C-7EA1292463DB}"/>
                 </a:ext>
                 <a:ext uri="{C183D7F6-B498-43B3-948B-1728B52AA6E4}">
-                  <adec:decorative xmlns:adec="http://schemas.microsoft.com/office/drawing/2017/decorative" val="1"/>
+                  <adec:decorative xmlns:adec="http://schemas.microsoft.com/office/drawing/2017/decorative" xmlns="" val="1"/>
                 </a:ext>
               </a:extLst>
             </p:cNvPr>
@@ -12079,7 +12300,7 @@
             <p:nvPr>
               <p:extLst>
                 <p:ext uri="{386F3935-93C4-4BCD-93E2-E3B085C9AB24}">
-                  <p16:designElem xmlns:p16="http://schemas.microsoft.com/office/powerpoint/2015/main" val="1"/>
+                  <p16:designElem xmlns:p16="http://schemas.microsoft.com/office/powerpoint/2015/main" xmlns="" val="1"/>
                 </p:ext>
               </p:extLst>
             </p:nvPr>
@@ -12127,10 +12348,10 @@
             <p:cNvPr id="15" name="Rectangle 14">
               <a:extLst>
                 <a:ext uri="{FF2B5EF4-FFF2-40B4-BE49-F238E27FC236}">
-                  <a16:creationId xmlns:a16="http://schemas.microsoft.com/office/drawing/2014/main" id="{ED49787B-8DE6-4467-AD0A-8DECC6E0C2D6}"/>
+                  <a16:creationId xmlns:a16="http://schemas.microsoft.com/office/drawing/2014/main" xmlns="" id="{ED49787B-8DE6-4467-AD0A-8DECC6E0C2D6}"/>
                 </a:ext>
                 <a:ext uri="{C183D7F6-B498-43B3-948B-1728B52AA6E4}">
-                  <adec:decorative xmlns:adec="http://schemas.microsoft.com/office/drawing/2017/decorative" val="1"/>
+                  <adec:decorative xmlns:adec="http://schemas.microsoft.com/office/drawing/2017/decorative" xmlns="" val="1"/>
                 </a:ext>
               </a:extLst>
             </p:cNvPr>
@@ -12138,7 +12359,7 @@
             <p:nvPr>
               <p:extLst>
                 <p:ext uri="{386F3935-93C4-4BCD-93E2-E3B085C9AB24}">
-                  <p16:designElem xmlns:p16="http://schemas.microsoft.com/office/powerpoint/2015/main" val="1"/>
+                  <p16:designElem xmlns:p16="http://schemas.microsoft.com/office/powerpoint/2015/main" xmlns="" val="1"/>
                 </p:ext>
               </p:extLst>
             </p:nvPr>
@@ -12187,10 +12408,10 @@
           <p:cNvPr id="17" name="Rectangle 16">
             <a:extLst>
               <a:ext uri="{FF2B5EF4-FFF2-40B4-BE49-F238E27FC236}">
-                <a16:creationId xmlns:a16="http://schemas.microsoft.com/office/drawing/2014/main" id="{D5B0017B-2ECA-49AF-B397-DC140825DF8D}"/>
+                <a16:creationId xmlns:a16="http://schemas.microsoft.com/office/drawing/2014/main" xmlns="" id="{D5B0017B-2ECA-49AF-B397-DC140825DF8D}"/>
               </a:ext>
               <a:ext uri="{C183D7F6-B498-43B3-948B-1728B52AA6E4}">
-                <adec:decorative xmlns:adec="http://schemas.microsoft.com/office/drawing/2017/decorative" val="1"/>
+                <adec:decorative xmlns:adec="http://schemas.microsoft.com/office/drawing/2017/decorative" xmlns="" val="1"/>
               </a:ext>
             </a:extLst>
           </p:cNvPr>
@@ -12200,7 +12421,7 @@
           <p:nvPr>
             <p:extLst>
               <p:ext uri="{386F3935-93C4-4BCD-93E2-E3B085C9AB24}">
-                <p16:designElem xmlns:p16="http://schemas.microsoft.com/office/powerpoint/2015/main" val="1"/>
+                <p16:designElem xmlns:p16="http://schemas.microsoft.com/office/powerpoint/2015/main" xmlns="" val="1"/>
               </p:ext>
             </p:extLst>
           </p:nvPr>
@@ -12257,7 +12478,7 @@
           <p:cNvPr id="2" name="Title 1">
             <a:extLst>
               <a:ext uri="{FF2B5EF4-FFF2-40B4-BE49-F238E27FC236}">
-                <a16:creationId xmlns:a16="http://schemas.microsoft.com/office/drawing/2014/main" id="{7E55C43B-41DC-C94A-209E-D890836472F8}"/>
+                <a16:creationId xmlns:a16="http://schemas.microsoft.com/office/drawing/2014/main" xmlns="" id="{7E55C43B-41DC-C94A-209E-D890836472F8}"/>
               </a:ext>
             </a:extLst>
           </p:cNvPr>
@@ -12292,7 +12513,7 @@
           <p:cNvPr id="3" name="Content Placeholder 2">
             <a:extLst>
               <a:ext uri="{FF2B5EF4-FFF2-40B4-BE49-F238E27FC236}">
-                <a16:creationId xmlns:a16="http://schemas.microsoft.com/office/drawing/2014/main" id="{731EFDEA-188A-75B1-3700-502EFB19CD2D}"/>
+                <a16:creationId xmlns:a16="http://schemas.microsoft.com/office/drawing/2014/main" xmlns="" id="{731EFDEA-188A-75B1-3700-502EFB19CD2D}"/>
               </a:ext>
             </a:extLst>
           </p:cNvPr>
@@ -12349,10 +12570,10 @@
           <p:cNvPr id="19" name="Rectangle 18">
             <a:extLst>
               <a:ext uri="{FF2B5EF4-FFF2-40B4-BE49-F238E27FC236}">
-                <a16:creationId xmlns:a16="http://schemas.microsoft.com/office/drawing/2014/main" id="{70E96339-907C-46C3-99AC-31179B6F0EBD}"/>
+                <a16:creationId xmlns:a16="http://schemas.microsoft.com/office/drawing/2014/main" xmlns="" id="{70E96339-907C-46C3-99AC-31179B6F0EBD}"/>
               </a:ext>
               <a:ext uri="{C183D7F6-B498-43B3-948B-1728B52AA6E4}">
-                <adec:decorative xmlns:adec="http://schemas.microsoft.com/office/drawing/2017/decorative" val="1"/>
+                <adec:decorative xmlns:adec="http://schemas.microsoft.com/office/drawing/2017/decorative" xmlns="" val="1"/>
               </a:ext>
             </a:extLst>
           </p:cNvPr>
@@ -12362,7 +12583,7 @@
           <p:nvPr>
             <p:extLst>
               <p:ext uri="{386F3935-93C4-4BCD-93E2-E3B085C9AB24}">
-                <p16:designElem xmlns:p16="http://schemas.microsoft.com/office/powerpoint/2015/main" val="1"/>
+                <p16:designElem xmlns:p16="http://schemas.microsoft.com/office/powerpoint/2015/main" xmlns="" val="1"/>
               </p:ext>
             </p:extLst>
           </p:nvPr>
@@ -12419,10 +12640,10 @@
           <p:cNvPr id="21" name="Straight Connector 20">
             <a:extLst>
               <a:ext uri="{FF2B5EF4-FFF2-40B4-BE49-F238E27FC236}">
-                <a16:creationId xmlns:a16="http://schemas.microsoft.com/office/drawing/2014/main" id="{6CF1BAF6-AD41-4082-B212-8A1F9A2E8779}"/>
+                <a16:creationId xmlns:a16="http://schemas.microsoft.com/office/drawing/2014/main" xmlns="" id="{6CF1BAF6-AD41-4082-B212-8A1F9A2E8779}"/>
               </a:ext>
               <a:ext uri="{C183D7F6-B498-43B3-948B-1728B52AA6E4}">
-                <adec:decorative xmlns:adec="http://schemas.microsoft.com/office/drawing/2017/decorative" val="1"/>
+                <adec:decorative xmlns:adec="http://schemas.microsoft.com/office/drawing/2017/decorative" xmlns="" val="1"/>
               </a:ext>
             </a:extLst>
           </p:cNvPr>
@@ -12432,7 +12653,7 @@
           <p:nvPr>
             <p:extLst>
               <p:ext uri="{386F3935-93C4-4BCD-93E2-E3B085C9AB24}">
-                <p16:designElem xmlns:p16="http://schemas.microsoft.com/office/powerpoint/2015/main" val="1"/>
+                <p16:designElem xmlns:p16="http://schemas.microsoft.com/office/powerpoint/2015/main" xmlns="" val="1"/>
               </p:ext>
             </p:extLst>
           </p:nvPr>
@@ -12471,7 +12692,7 @@
           <p:cNvPr id="7" name="Picture 6">
             <a:extLst>
               <a:ext uri="{FF2B5EF4-FFF2-40B4-BE49-F238E27FC236}">
-                <a16:creationId xmlns:a16="http://schemas.microsoft.com/office/drawing/2014/main" id="{03283AA2-8934-98B5-E03A-51C8FBD1BF9B}"/>
+                <a16:creationId xmlns:a16="http://schemas.microsoft.com/office/drawing/2014/main" xmlns="" id="{03283AA2-8934-98B5-E03A-51C8FBD1BF9B}"/>
               </a:ext>
             </a:extLst>
           </p:cNvPr>
@@ -12501,7 +12722,7 @@
           <p:cNvPr id="9" name="Picture 8">
             <a:extLst>
               <a:ext uri="{FF2B5EF4-FFF2-40B4-BE49-F238E27FC236}">
-                <a16:creationId xmlns:a16="http://schemas.microsoft.com/office/drawing/2014/main" id="{4C7E3AA8-30DC-6752-B5F2-1C5C0D413F7D}"/>
+                <a16:creationId xmlns:a16="http://schemas.microsoft.com/office/drawing/2014/main" xmlns="" id="{4C7E3AA8-30DC-6752-B5F2-1C5C0D413F7D}"/>
               </a:ext>
             </a:extLst>
           </p:cNvPr>
@@ -12531,7 +12752,7 @@
           <p:cNvPr id="16" name="Picture 15">
             <a:extLst>
               <a:ext uri="{FF2B5EF4-FFF2-40B4-BE49-F238E27FC236}">
-                <a16:creationId xmlns:a16="http://schemas.microsoft.com/office/drawing/2014/main" id="{7A04409B-CCDD-ECD3-8B19-D18740F01DBD}"/>
+                <a16:creationId xmlns:a16="http://schemas.microsoft.com/office/drawing/2014/main" xmlns="" id="{7A04409B-CCDD-ECD3-8B19-D18740F01DBD}"/>
               </a:ext>
             </a:extLst>
           </p:cNvPr>
@@ -12566,6 +12787,13 @@
   <p:clrMapOvr>
     <a:masterClrMapping/>
   </p:clrMapOvr>
+  <p:timing>
+    <p:tnLst>
+      <p:par>
+        <p:cTn id="1" dur="indefinite" restart="never" nodeType="tmRoot"/>
+      </p:par>
+    </p:tnLst>
+  </p:timing>
 </p:sld>
 </file>
 
@@ -12599,10 +12827,10 @@
           <p:cNvPr id="26" name="Rectangle 25">
             <a:extLst>
               <a:ext uri="{FF2B5EF4-FFF2-40B4-BE49-F238E27FC236}">
-                <a16:creationId xmlns:a16="http://schemas.microsoft.com/office/drawing/2014/main" id="{85861AFF-3522-4704-9245-9C78B6945854}"/>
+                <a16:creationId xmlns:a16="http://schemas.microsoft.com/office/drawing/2014/main" xmlns="" id="{85861AFF-3522-4704-9245-9C78B6945854}"/>
               </a:ext>
               <a:ext uri="{C183D7F6-B498-43B3-948B-1728B52AA6E4}">
-                <adec:decorative xmlns:adec="http://schemas.microsoft.com/office/drawing/2017/decorative" val="1"/>
+                <adec:decorative xmlns:adec="http://schemas.microsoft.com/office/drawing/2017/decorative" xmlns="" val="1"/>
               </a:ext>
             </a:extLst>
           </p:cNvPr>
@@ -12612,7 +12840,7 @@
           <p:nvPr>
             <p:extLst>
               <p:ext uri="{386F3935-93C4-4BCD-93E2-E3B085C9AB24}">
-                <p16:designElem xmlns:p16="http://schemas.microsoft.com/office/powerpoint/2015/main" val="1"/>
+                <p16:designElem xmlns:p16="http://schemas.microsoft.com/office/powerpoint/2015/main" xmlns="" val="1"/>
               </p:ext>
             </p:extLst>
           </p:nvPr>
@@ -12659,10 +12887,10 @@
           <p:cNvPr id="28" name="Group 27">
             <a:extLst>
               <a:ext uri="{FF2B5EF4-FFF2-40B4-BE49-F238E27FC236}">
-                <a16:creationId xmlns:a16="http://schemas.microsoft.com/office/drawing/2014/main" id="{AE1C45F0-260A-458C-96ED-C1F6D2151219}"/>
+                <a16:creationId xmlns:a16="http://schemas.microsoft.com/office/drawing/2014/main" xmlns="" id="{AE1C45F0-260A-458C-96ED-C1F6D2151219}"/>
               </a:ext>
               <a:ext uri="{C183D7F6-B498-43B3-948B-1728B52AA6E4}">
-                <adec:decorative xmlns:adec="http://schemas.microsoft.com/office/drawing/2017/decorative" val="1"/>
+                <adec:decorative xmlns:adec="http://schemas.microsoft.com/office/drawing/2017/decorative" xmlns="" val="1"/>
               </a:ext>
             </a:extLst>
           </p:cNvPr>
@@ -12672,7 +12900,7 @@
           <p:nvPr>
             <p:extLst>
               <p:ext uri="{386F3935-93C4-4BCD-93E2-E3B085C9AB24}">
-                <p16:designElem xmlns:p16="http://schemas.microsoft.com/office/powerpoint/2015/main" val="1"/>
+                <p16:designElem xmlns:p16="http://schemas.microsoft.com/office/powerpoint/2015/main" xmlns="" val="1"/>
               </p:ext>
             </p:extLst>
           </p:nvPr>
@@ -12693,10 +12921,10 @@
             <p:cNvPr id="29" name="Rectangle 28">
               <a:extLst>
                 <a:ext uri="{FF2B5EF4-FFF2-40B4-BE49-F238E27FC236}">
-                  <a16:creationId xmlns:a16="http://schemas.microsoft.com/office/drawing/2014/main" id="{A6604B49-AD5C-4590-B051-06C8222ECD99}"/>
+                  <a16:creationId xmlns:a16="http://schemas.microsoft.com/office/drawing/2014/main" xmlns="" id="{A6604B49-AD5C-4590-B051-06C8222ECD99}"/>
                 </a:ext>
                 <a:ext uri="{C183D7F6-B498-43B3-948B-1728B52AA6E4}">
-                  <adec:decorative xmlns:adec="http://schemas.microsoft.com/office/drawing/2017/decorative" val="1"/>
+                  <adec:decorative xmlns:adec="http://schemas.microsoft.com/office/drawing/2017/decorative" xmlns="" val="1"/>
                 </a:ext>
               </a:extLst>
             </p:cNvPr>
@@ -12704,7 +12932,7 @@
             <p:nvPr>
               <p:extLst>
                 <p:ext uri="{386F3935-93C4-4BCD-93E2-E3B085C9AB24}">
-                  <p16:designElem xmlns:p16="http://schemas.microsoft.com/office/powerpoint/2015/main" val="1"/>
+                  <p16:designElem xmlns:p16="http://schemas.microsoft.com/office/powerpoint/2015/main" xmlns="" val="1"/>
                 </p:ext>
               </p:extLst>
             </p:nvPr>
@@ -12752,10 +12980,10 @@
             <p:cNvPr id="30" name="Rectangle 29">
               <a:extLst>
                 <a:ext uri="{FF2B5EF4-FFF2-40B4-BE49-F238E27FC236}">
-                  <a16:creationId xmlns:a16="http://schemas.microsoft.com/office/drawing/2014/main" id="{743ECCAF-29C5-4537-947C-7EA1292463DB}"/>
+                  <a16:creationId xmlns:a16="http://schemas.microsoft.com/office/drawing/2014/main" xmlns="" id="{743ECCAF-29C5-4537-947C-7EA1292463DB}"/>
                 </a:ext>
                 <a:ext uri="{C183D7F6-B498-43B3-948B-1728B52AA6E4}">
-                  <adec:decorative xmlns:adec="http://schemas.microsoft.com/office/drawing/2017/decorative" val="1"/>
+                  <adec:decorative xmlns:adec="http://schemas.microsoft.com/office/drawing/2017/decorative" xmlns="" val="1"/>
                 </a:ext>
               </a:extLst>
             </p:cNvPr>
@@ -12763,7 +12991,7 @@
             <p:nvPr>
               <p:extLst>
                 <p:ext uri="{386F3935-93C4-4BCD-93E2-E3B085C9AB24}">
-                  <p16:designElem xmlns:p16="http://schemas.microsoft.com/office/powerpoint/2015/main" val="1"/>
+                  <p16:designElem xmlns:p16="http://schemas.microsoft.com/office/powerpoint/2015/main" xmlns="" val="1"/>
                 </p:ext>
               </p:extLst>
             </p:nvPr>
@@ -12811,10 +13039,10 @@
             <p:cNvPr id="31" name="Rectangle 30">
               <a:extLst>
                 <a:ext uri="{FF2B5EF4-FFF2-40B4-BE49-F238E27FC236}">
-                  <a16:creationId xmlns:a16="http://schemas.microsoft.com/office/drawing/2014/main" id="{ED49787B-8DE6-4467-AD0A-8DECC6E0C2D6}"/>
+                  <a16:creationId xmlns:a16="http://schemas.microsoft.com/office/drawing/2014/main" xmlns="" id="{ED49787B-8DE6-4467-AD0A-8DECC6E0C2D6}"/>
                 </a:ext>
                 <a:ext uri="{C183D7F6-B498-43B3-948B-1728B52AA6E4}">
-                  <adec:decorative xmlns:adec="http://schemas.microsoft.com/office/drawing/2017/decorative" val="1"/>
+                  <adec:decorative xmlns:adec="http://schemas.microsoft.com/office/drawing/2017/decorative" xmlns="" val="1"/>
                 </a:ext>
               </a:extLst>
             </p:cNvPr>
@@ -12822,7 +13050,7 @@
             <p:nvPr>
               <p:extLst>
                 <p:ext uri="{386F3935-93C4-4BCD-93E2-E3B085C9AB24}">
-                  <p16:designElem xmlns:p16="http://schemas.microsoft.com/office/powerpoint/2015/main" val="1"/>
+                  <p16:designElem xmlns:p16="http://schemas.microsoft.com/office/powerpoint/2015/main" xmlns="" val="1"/>
                 </p:ext>
               </p:extLst>
             </p:nvPr>
@@ -12871,10 +13099,10 @@
           <p:cNvPr id="33" name="Rectangle 32">
             <a:extLst>
               <a:ext uri="{FF2B5EF4-FFF2-40B4-BE49-F238E27FC236}">
-                <a16:creationId xmlns:a16="http://schemas.microsoft.com/office/drawing/2014/main" id="{D5B0017B-2ECA-49AF-B397-DC140825DF8D}"/>
+                <a16:creationId xmlns:a16="http://schemas.microsoft.com/office/drawing/2014/main" xmlns="" id="{D5B0017B-2ECA-49AF-B397-DC140825DF8D}"/>
               </a:ext>
               <a:ext uri="{C183D7F6-B498-43B3-948B-1728B52AA6E4}">
-                <adec:decorative xmlns:adec="http://schemas.microsoft.com/office/drawing/2017/decorative" val="1"/>
+                <adec:decorative xmlns:adec="http://schemas.microsoft.com/office/drawing/2017/decorative" xmlns="" val="1"/>
               </a:ext>
             </a:extLst>
           </p:cNvPr>
@@ -12884,7 +13112,7 @@
           <p:nvPr>
             <p:extLst>
               <p:ext uri="{386F3935-93C4-4BCD-93E2-E3B085C9AB24}">
-                <p16:designElem xmlns:p16="http://schemas.microsoft.com/office/powerpoint/2015/main" val="1"/>
+                <p16:designElem xmlns:p16="http://schemas.microsoft.com/office/powerpoint/2015/main" xmlns="" val="1"/>
               </p:ext>
             </p:extLst>
           </p:nvPr>
@@ -12941,7 +13169,7 @@
           <p:cNvPr id="2" name="Title 1">
             <a:extLst>
               <a:ext uri="{FF2B5EF4-FFF2-40B4-BE49-F238E27FC236}">
-                <a16:creationId xmlns:a16="http://schemas.microsoft.com/office/drawing/2014/main" id="{C18DFF57-E206-E63E-5CFB-238CC5CB25E8}"/>
+                <a16:creationId xmlns:a16="http://schemas.microsoft.com/office/drawing/2014/main" xmlns="" id="{C18DFF57-E206-E63E-5CFB-238CC5CB25E8}"/>
               </a:ext>
             </a:extLst>
           </p:cNvPr>
@@ -12976,7 +13204,7 @@
           <p:cNvPr id="13" name="Content Placeholder 12">
             <a:extLst>
               <a:ext uri="{FF2B5EF4-FFF2-40B4-BE49-F238E27FC236}">
-                <a16:creationId xmlns:a16="http://schemas.microsoft.com/office/drawing/2014/main" id="{8D8FBDE3-2B3E-68FE-47E7-E36822BB877B}"/>
+                <a16:creationId xmlns:a16="http://schemas.microsoft.com/office/drawing/2014/main" xmlns="" id="{8D8FBDE3-2B3E-68FE-47E7-E36822BB877B}"/>
               </a:ext>
             </a:extLst>
           </p:cNvPr>
@@ -13064,10 +13292,10 @@
           <p:cNvPr id="35" name="Rectangle 34">
             <a:extLst>
               <a:ext uri="{FF2B5EF4-FFF2-40B4-BE49-F238E27FC236}">
-                <a16:creationId xmlns:a16="http://schemas.microsoft.com/office/drawing/2014/main" id="{DF909CAE-F41A-4061-A316-864DC2A710A2}"/>
+                <a16:creationId xmlns:a16="http://schemas.microsoft.com/office/drawing/2014/main" xmlns="" id="{DF909CAE-F41A-4061-A316-864DC2A710A2}"/>
               </a:ext>
               <a:ext uri="{C183D7F6-B498-43B3-948B-1728B52AA6E4}">
-                <adec:decorative xmlns:adec="http://schemas.microsoft.com/office/drawing/2017/decorative" val="1"/>
+                <adec:decorative xmlns:adec="http://schemas.microsoft.com/office/drawing/2017/decorative" xmlns="" val="1"/>
               </a:ext>
             </a:extLst>
           </p:cNvPr>
@@ -13077,7 +13305,7 @@
           <p:nvPr>
             <p:extLst>
               <p:ext uri="{386F3935-93C4-4BCD-93E2-E3B085C9AB24}">
-                <p16:designElem xmlns:p16="http://schemas.microsoft.com/office/powerpoint/2015/main" val="1"/>
+                <p16:designElem xmlns:p16="http://schemas.microsoft.com/office/powerpoint/2015/main" xmlns="" val="1"/>
               </p:ext>
             </p:extLst>
           </p:nvPr>
@@ -13134,7 +13362,7 @@
           <p:cNvPr id="21" name="Picture 20">
             <a:extLst>
               <a:ext uri="{FF2B5EF4-FFF2-40B4-BE49-F238E27FC236}">
-                <a16:creationId xmlns:a16="http://schemas.microsoft.com/office/drawing/2014/main" id="{C47D765B-3617-AB67-60D1-BB61416CF4CD}"/>
+                <a16:creationId xmlns:a16="http://schemas.microsoft.com/office/drawing/2014/main" xmlns="" id="{C47D765B-3617-AB67-60D1-BB61416CF4CD}"/>
               </a:ext>
             </a:extLst>
           </p:cNvPr>
@@ -13164,7 +13392,7 @@
           <p:cNvPr id="19" name="Picture 18">
             <a:extLst>
               <a:ext uri="{FF2B5EF4-FFF2-40B4-BE49-F238E27FC236}">
-                <a16:creationId xmlns:a16="http://schemas.microsoft.com/office/drawing/2014/main" id="{196EBD11-3288-B0BC-C29E-D1BD2C7F2588}"/>
+                <a16:creationId xmlns:a16="http://schemas.microsoft.com/office/drawing/2014/main" xmlns="" id="{196EBD11-3288-B0BC-C29E-D1BD2C7F2588}"/>
               </a:ext>
             </a:extLst>
           </p:cNvPr>
@@ -13194,7 +13422,7 @@
           <p:cNvPr id="17" name="Picture 16">
             <a:extLst>
               <a:ext uri="{FF2B5EF4-FFF2-40B4-BE49-F238E27FC236}">
-                <a16:creationId xmlns:a16="http://schemas.microsoft.com/office/drawing/2014/main" id="{B031C021-B113-5AD0-D522-ADDDA479C419}"/>
+                <a16:creationId xmlns:a16="http://schemas.microsoft.com/office/drawing/2014/main" xmlns="" id="{B031C021-B113-5AD0-D522-ADDDA479C419}"/>
               </a:ext>
             </a:extLst>
           </p:cNvPr>
@@ -13224,7 +13452,7 @@
           <p:cNvPr id="15" name="Picture 14">
             <a:extLst>
               <a:ext uri="{FF2B5EF4-FFF2-40B4-BE49-F238E27FC236}">
-                <a16:creationId xmlns:a16="http://schemas.microsoft.com/office/drawing/2014/main" id="{141F4F87-C996-BD24-B52D-9EB6468C0DC4}"/>
+                <a16:creationId xmlns:a16="http://schemas.microsoft.com/office/drawing/2014/main" xmlns="" id="{141F4F87-C996-BD24-B52D-9EB6468C0DC4}"/>
               </a:ext>
             </a:extLst>
           </p:cNvPr>
@@ -13254,10 +13482,10 @@
           <p:cNvPr id="37" name="Straight Connector 36">
             <a:extLst>
               <a:ext uri="{FF2B5EF4-FFF2-40B4-BE49-F238E27FC236}">
-                <a16:creationId xmlns:a16="http://schemas.microsoft.com/office/drawing/2014/main" id="{6CF1BAF6-AD41-4082-B212-8A1F9A2E8779}"/>
+                <a16:creationId xmlns:a16="http://schemas.microsoft.com/office/drawing/2014/main" xmlns="" id="{6CF1BAF6-AD41-4082-B212-8A1F9A2E8779}"/>
               </a:ext>
               <a:ext uri="{C183D7F6-B498-43B3-948B-1728B52AA6E4}">
-                <adec:decorative xmlns:adec="http://schemas.microsoft.com/office/drawing/2017/decorative" val="1"/>
+                <adec:decorative xmlns:adec="http://schemas.microsoft.com/office/drawing/2017/decorative" xmlns="" val="1"/>
               </a:ext>
             </a:extLst>
           </p:cNvPr>
@@ -13267,7 +13495,7 @@
           <p:nvPr>
             <p:extLst>
               <p:ext uri="{386F3935-93C4-4BCD-93E2-E3B085C9AB24}">
-                <p16:designElem xmlns:p16="http://schemas.microsoft.com/office/powerpoint/2015/main" val="1"/>
+                <p16:designElem xmlns:p16="http://schemas.microsoft.com/office/powerpoint/2015/main" xmlns="" val="1"/>
               </p:ext>
             </p:extLst>
           </p:nvPr>
@@ -13311,6 +13539,13 @@
   <p:clrMapOvr>
     <a:masterClrMapping/>
   </p:clrMapOvr>
+  <p:timing>
+    <p:tnLst>
+      <p:par>
+        <p:cTn id="1" dur="indefinite" restart="never" nodeType="tmRoot"/>
+      </p:par>
+    </p:tnLst>
+  </p:timing>
 </p:sld>
 </file>
 
@@ -13336,7 +13571,7 @@
           <p:cNvPr id="2" name="Title 1">
             <a:extLst>
               <a:ext uri="{FF2B5EF4-FFF2-40B4-BE49-F238E27FC236}">
-                <a16:creationId xmlns:a16="http://schemas.microsoft.com/office/drawing/2014/main" id="{5442A29E-FA7A-C9B0-0513-A90236504486}"/>
+                <a16:creationId xmlns:a16="http://schemas.microsoft.com/office/drawing/2014/main" xmlns="" id="{5442A29E-FA7A-C9B0-0513-A90236504486}"/>
               </a:ext>
             </a:extLst>
           </p:cNvPr>
@@ -13372,7 +13607,7 @@
           <p:cNvPr id="3" name="Content Placeholder 2">
             <a:extLst>
               <a:ext uri="{FF2B5EF4-FFF2-40B4-BE49-F238E27FC236}">
-                <a16:creationId xmlns:a16="http://schemas.microsoft.com/office/drawing/2014/main" id="{5AB5A20A-515B-FC56-E91D-9712265AD293}"/>
+                <a16:creationId xmlns:a16="http://schemas.microsoft.com/office/drawing/2014/main" xmlns="" id="{5AB5A20A-515B-FC56-E91D-9712265AD293}"/>
               </a:ext>
             </a:extLst>
           </p:cNvPr>
@@ -13396,7 +13631,7 @@
           <a:lstStyle/>
           <a:p>
             <a:r>
-              <a:rPr lang="en-US" sz="2200" dirty="0"/>
+              <a:rPr lang="en-US" sz="2200" u="sng" dirty="0"/>
               <a:t>Cluster 0 - Low Lifetime Monetary, Low Lifetime Frequency, and High Lifetime Recency</a:t>
             </a:r>
           </a:p>
@@ -13423,7 +13658,7 @@
           </a:p>
           <a:p>
             <a:r>
-              <a:rPr lang="en-US" sz="2200" dirty="0"/>
+              <a:rPr lang="en-US" sz="2200" u="sng" dirty="0"/>
               <a:t>Cluster 1 - High Lifetime Monetary, High Lifetime Frequency, and Low Lifetime Recency</a:t>
             </a:r>
           </a:p>
@@ -13457,7 +13692,7 @@
           </a:p>
           <a:p>
             <a:r>
-              <a:rPr lang="en-US" sz="2200" dirty="0"/>
+              <a:rPr lang="en-US" sz="2200" u="sng" dirty="0"/>
               <a:t>Cluster 2 - A higher Lifetime Monetary, Low Lifetime Frequency, Low Lifetime Recency</a:t>
             </a:r>
           </a:p>
@@ -13498,7 +13733,7 @@
           </a:p>
           <a:p>
             <a:r>
-              <a:rPr lang="en-US" sz="2200" dirty="0"/>
+              <a:rPr lang="en-US" sz="2200" u="sng" dirty="0"/>
               <a:t>Cluster 3 - Low Lifetime Monetary, High Lifetime Frequency, Low Lifetime Recency (Potential High Value Future)</a:t>
             </a:r>
           </a:p>
@@ -13555,6 +13790,13 @@
   <p:clrMapOvr>
     <a:masterClrMapping/>
   </p:clrMapOvr>
+  <p:timing>
+    <p:tnLst>
+      <p:par>
+        <p:cTn id="1" dur="indefinite" restart="never" nodeType="tmRoot"/>
+      </p:par>
+    </p:tnLst>
+  </p:timing>
 </p:sld>
 </file>
 
@@ -13588,10 +13830,10 @@
           <p:cNvPr id="16" name="Rectangle 15">
             <a:extLst>
               <a:ext uri="{FF2B5EF4-FFF2-40B4-BE49-F238E27FC236}">
-                <a16:creationId xmlns:a16="http://schemas.microsoft.com/office/drawing/2014/main" id="{56E9B3E6-E277-4D68-BA48-9CB43FFBD6E2}"/>
+                <a16:creationId xmlns:a16="http://schemas.microsoft.com/office/drawing/2014/main" xmlns="" id="{56E9B3E6-E277-4D68-BA48-9CB43FFBD6E2}"/>
               </a:ext>
               <a:ext uri="{C183D7F6-B498-43B3-948B-1728B52AA6E4}">
-                <adec:decorative xmlns:adec="http://schemas.microsoft.com/office/drawing/2017/decorative" val="1"/>
+                <adec:decorative xmlns:adec="http://schemas.microsoft.com/office/drawing/2017/decorative" xmlns="" val="1"/>
               </a:ext>
             </a:extLst>
           </p:cNvPr>
@@ -13601,7 +13843,7 @@
           <p:nvPr>
             <p:extLst>
               <p:ext uri="{386F3935-93C4-4BCD-93E2-E3B085C9AB24}">
-                <p16:designElem xmlns:p16="http://schemas.microsoft.com/office/powerpoint/2015/main" val="1"/>
+                <p16:designElem xmlns:p16="http://schemas.microsoft.com/office/powerpoint/2015/main" xmlns="" val="1"/>
               </p:ext>
             </p:extLst>
           </p:nvPr>
@@ -13648,10 +13890,10 @@
           <p:cNvPr id="18" name="Group 17">
             <a:extLst>
               <a:ext uri="{FF2B5EF4-FFF2-40B4-BE49-F238E27FC236}">
-                <a16:creationId xmlns:a16="http://schemas.microsoft.com/office/drawing/2014/main" id="{AE1C45F0-260A-458C-96ED-C1F6D2151219}"/>
+                <a16:creationId xmlns:a16="http://schemas.microsoft.com/office/drawing/2014/main" xmlns="" id="{AE1C45F0-260A-458C-96ED-C1F6D2151219}"/>
               </a:ext>
               <a:ext uri="{C183D7F6-B498-43B3-948B-1728B52AA6E4}">
-                <adec:decorative xmlns:adec="http://schemas.microsoft.com/office/drawing/2017/decorative" val="1"/>
+                <adec:decorative xmlns:adec="http://schemas.microsoft.com/office/drawing/2017/decorative" xmlns="" val="1"/>
               </a:ext>
             </a:extLst>
           </p:cNvPr>
@@ -13661,7 +13903,7 @@
           <p:nvPr>
             <p:extLst>
               <p:ext uri="{386F3935-93C4-4BCD-93E2-E3B085C9AB24}">
-                <p16:designElem xmlns:p16="http://schemas.microsoft.com/office/powerpoint/2015/main" val="1"/>
+                <p16:designElem xmlns:p16="http://schemas.microsoft.com/office/powerpoint/2015/main" xmlns="" val="1"/>
               </p:ext>
             </p:extLst>
           </p:nvPr>
@@ -13682,10 +13924,10 @@
             <p:cNvPr id="19" name="Rectangle 18">
               <a:extLst>
                 <a:ext uri="{FF2B5EF4-FFF2-40B4-BE49-F238E27FC236}">
-                  <a16:creationId xmlns:a16="http://schemas.microsoft.com/office/drawing/2014/main" id="{A6604B49-AD5C-4590-B051-06C8222ECD99}"/>
+                  <a16:creationId xmlns:a16="http://schemas.microsoft.com/office/drawing/2014/main" xmlns="" id="{A6604B49-AD5C-4590-B051-06C8222ECD99}"/>
                 </a:ext>
                 <a:ext uri="{C183D7F6-B498-43B3-948B-1728B52AA6E4}">
-                  <adec:decorative xmlns:adec="http://schemas.microsoft.com/office/drawing/2017/decorative" val="1"/>
+                  <adec:decorative xmlns:adec="http://schemas.microsoft.com/office/drawing/2017/decorative" xmlns="" val="1"/>
                 </a:ext>
               </a:extLst>
             </p:cNvPr>
@@ -13693,7 +13935,7 @@
             <p:nvPr>
               <p:extLst>
                 <p:ext uri="{386F3935-93C4-4BCD-93E2-E3B085C9AB24}">
-                  <p16:designElem xmlns:p16="http://schemas.microsoft.com/office/powerpoint/2015/main" val="1"/>
+                  <p16:designElem xmlns:p16="http://schemas.microsoft.com/office/powerpoint/2015/main" xmlns="" val="1"/>
                 </p:ext>
               </p:extLst>
             </p:nvPr>
@@ -13741,10 +13983,10 @@
             <p:cNvPr id="20" name="Rectangle 19">
               <a:extLst>
                 <a:ext uri="{FF2B5EF4-FFF2-40B4-BE49-F238E27FC236}">
-                  <a16:creationId xmlns:a16="http://schemas.microsoft.com/office/drawing/2014/main" id="{743ECCAF-29C5-4537-947C-7EA1292463DB}"/>
+                  <a16:creationId xmlns:a16="http://schemas.microsoft.com/office/drawing/2014/main" xmlns="" id="{743ECCAF-29C5-4537-947C-7EA1292463DB}"/>
                 </a:ext>
                 <a:ext uri="{C183D7F6-B498-43B3-948B-1728B52AA6E4}">
-                  <adec:decorative xmlns:adec="http://schemas.microsoft.com/office/drawing/2017/decorative" val="1"/>
+                  <adec:decorative xmlns:adec="http://schemas.microsoft.com/office/drawing/2017/decorative" xmlns="" val="1"/>
                 </a:ext>
               </a:extLst>
             </p:cNvPr>
@@ -13752,7 +13994,7 @@
             <p:nvPr>
               <p:extLst>
                 <p:ext uri="{386F3935-93C4-4BCD-93E2-E3B085C9AB24}">
-                  <p16:designElem xmlns:p16="http://schemas.microsoft.com/office/powerpoint/2015/main" val="1"/>
+                  <p16:designElem xmlns:p16="http://schemas.microsoft.com/office/powerpoint/2015/main" xmlns="" val="1"/>
                 </p:ext>
               </p:extLst>
             </p:nvPr>
@@ -13800,10 +14042,10 @@
             <p:cNvPr id="21" name="Rectangle 20">
               <a:extLst>
                 <a:ext uri="{FF2B5EF4-FFF2-40B4-BE49-F238E27FC236}">
-                  <a16:creationId xmlns:a16="http://schemas.microsoft.com/office/drawing/2014/main" id="{ED49787B-8DE6-4467-AD0A-8DECC6E0C2D6}"/>
+                  <a16:creationId xmlns:a16="http://schemas.microsoft.com/office/drawing/2014/main" xmlns="" id="{ED49787B-8DE6-4467-AD0A-8DECC6E0C2D6}"/>
                 </a:ext>
                 <a:ext uri="{C183D7F6-B498-43B3-948B-1728B52AA6E4}">
-                  <adec:decorative xmlns:adec="http://schemas.microsoft.com/office/drawing/2017/decorative" val="1"/>
+                  <adec:decorative xmlns:adec="http://schemas.microsoft.com/office/drawing/2017/decorative" xmlns="" val="1"/>
                 </a:ext>
               </a:extLst>
             </p:cNvPr>
@@ -13811,7 +14053,7 @@
             <p:nvPr>
               <p:extLst>
                 <p:ext uri="{386F3935-93C4-4BCD-93E2-E3B085C9AB24}">
-                  <p16:designElem xmlns:p16="http://schemas.microsoft.com/office/powerpoint/2015/main" val="1"/>
+                  <p16:designElem xmlns:p16="http://schemas.microsoft.com/office/powerpoint/2015/main" xmlns="" val="1"/>
                 </p:ext>
               </p:extLst>
             </p:nvPr>
@@ -13860,10 +14102,10 @@
           <p:cNvPr id="23" name="Rectangle 22">
             <a:extLst>
               <a:ext uri="{FF2B5EF4-FFF2-40B4-BE49-F238E27FC236}">
-                <a16:creationId xmlns:a16="http://schemas.microsoft.com/office/drawing/2014/main" id="{D5B0017B-2ECA-49AF-B397-DC140825DF8D}"/>
+                <a16:creationId xmlns:a16="http://schemas.microsoft.com/office/drawing/2014/main" xmlns="" id="{D5B0017B-2ECA-49AF-B397-DC140825DF8D}"/>
               </a:ext>
               <a:ext uri="{C183D7F6-B498-43B3-948B-1728B52AA6E4}">
-                <adec:decorative xmlns:adec="http://schemas.microsoft.com/office/drawing/2017/decorative" val="1"/>
+                <adec:decorative xmlns:adec="http://schemas.microsoft.com/office/drawing/2017/decorative" xmlns="" val="1"/>
               </a:ext>
             </a:extLst>
           </p:cNvPr>
@@ -13873,7 +14115,7 @@
           <p:nvPr>
             <p:extLst>
               <p:ext uri="{386F3935-93C4-4BCD-93E2-E3B085C9AB24}">
-                <p16:designElem xmlns:p16="http://schemas.microsoft.com/office/powerpoint/2015/main" val="1"/>
+                <p16:designElem xmlns:p16="http://schemas.microsoft.com/office/powerpoint/2015/main" xmlns="" val="1"/>
               </p:ext>
             </p:extLst>
           </p:nvPr>
@@ -13930,7 +14172,7 @@
           <p:cNvPr id="2" name="Title 1">
             <a:extLst>
               <a:ext uri="{FF2B5EF4-FFF2-40B4-BE49-F238E27FC236}">
-                <a16:creationId xmlns:a16="http://schemas.microsoft.com/office/drawing/2014/main" id="{9D77063A-A21D-047C-CE0A-B3B4078BFAAB}"/>
+                <a16:creationId xmlns:a16="http://schemas.microsoft.com/office/drawing/2014/main" xmlns="" id="{9D77063A-A21D-047C-CE0A-B3B4078BFAAB}"/>
               </a:ext>
             </a:extLst>
           </p:cNvPr>
@@ -13965,10 +14207,10 @@
           <p:cNvPr id="25" name="Straight Connector 24">
             <a:extLst>
               <a:ext uri="{FF2B5EF4-FFF2-40B4-BE49-F238E27FC236}">
-                <a16:creationId xmlns:a16="http://schemas.microsoft.com/office/drawing/2014/main" id="{6CF1BAF6-AD41-4082-B212-8A1F9A2E8779}"/>
+                <a16:creationId xmlns:a16="http://schemas.microsoft.com/office/drawing/2014/main" xmlns="" id="{6CF1BAF6-AD41-4082-B212-8A1F9A2E8779}"/>
               </a:ext>
               <a:ext uri="{C183D7F6-B498-43B3-948B-1728B52AA6E4}">
-                <adec:decorative xmlns:adec="http://schemas.microsoft.com/office/drawing/2017/decorative" val="1"/>
+                <adec:decorative xmlns:adec="http://schemas.microsoft.com/office/drawing/2017/decorative" xmlns="" val="1"/>
               </a:ext>
             </a:extLst>
           </p:cNvPr>
@@ -13978,7 +14220,7 @@
           <p:nvPr>
             <p:extLst>
               <p:ext uri="{386F3935-93C4-4BCD-93E2-E3B085C9AB24}">
-                <p16:designElem xmlns:p16="http://schemas.microsoft.com/office/powerpoint/2015/main" val="1"/>
+                <p16:designElem xmlns:p16="http://schemas.microsoft.com/office/powerpoint/2015/main" xmlns="" val="1"/>
               </p:ext>
             </p:extLst>
           </p:nvPr>
@@ -14017,7 +14259,7 @@
           <p:cNvPr id="5" name="Content Placeholder 2">
             <a:extLst>
               <a:ext uri="{FF2B5EF4-FFF2-40B4-BE49-F238E27FC236}">
-                <a16:creationId xmlns:a16="http://schemas.microsoft.com/office/drawing/2014/main" id="{6DB548D3-7B4C-7A9D-AA0B-685A56723BF7}"/>
+                <a16:creationId xmlns:a16="http://schemas.microsoft.com/office/drawing/2014/main" xmlns="" id="{6DB548D3-7B4C-7A9D-AA0B-685A56723BF7}"/>
               </a:ext>
             </a:extLst>
           </p:cNvPr>
@@ -14086,10 +14328,10 @@
           <p:cNvPr id="24" name="Rectangle 11">
             <a:extLst>
               <a:ext uri="{FF2B5EF4-FFF2-40B4-BE49-F238E27FC236}">
-                <a16:creationId xmlns:a16="http://schemas.microsoft.com/office/drawing/2014/main" id="{922F19F4-FE70-43DC-856F-2CE5F521DC48}"/>
+                <a16:creationId xmlns:a16="http://schemas.microsoft.com/office/drawing/2014/main" xmlns="" id="{922F19F4-FE70-43DC-856F-2CE5F521DC48}"/>
               </a:ext>
               <a:ext uri="{C183D7F6-B498-43B3-948B-1728B52AA6E4}">
-                <adec:decorative xmlns:adec="http://schemas.microsoft.com/office/drawing/2017/decorative" val="1"/>
+                <adec:decorative xmlns:adec="http://schemas.microsoft.com/office/drawing/2017/decorative" xmlns="" val="1"/>
               </a:ext>
             </a:extLst>
           </p:cNvPr>
@@ -14099,7 +14341,7 @@
           <p:nvPr>
             <p:extLst>
               <p:ext uri="{386F3935-93C4-4BCD-93E2-E3B085C9AB24}">
-                <p16:designElem xmlns:p16="http://schemas.microsoft.com/office/powerpoint/2015/main" val="1"/>
+                <p16:designElem xmlns:p16="http://schemas.microsoft.com/office/powerpoint/2015/main" xmlns="" val="1"/>
               </p:ext>
             </p:extLst>
           </p:nvPr>
@@ -14146,10 +14388,10 @@
           <p:cNvPr id="26" name="Group 13">
             <a:extLst>
               <a:ext uri="{FF2B5EF4-FFF2-40B4-BE49-F238E27FC236}">
-                <a16:creationId xmlns:a16="http://schemas.microsoft.com/office/drawing/2014/main" id="{AE1C45F0-260A-458C-96ED-C1F6D2151219}"/>
+                <a16:creationId xmlns:a16="http://schemas.microsoft.com/office/drawing/2014/main" xmlns="" id="{AE1C45F0-260A-458C-96ED-C1F6D2151219}"/>
               </a:ext>
               <a:ext uri="{C183D7F6-B498-43B3-948B-1728B52AA6E4}">
-                <adec:decorative xmlns:adec="http://schemas.microsoft.com/office/drawing/2017/decorative" val="1"/>
+                <adec:decorative xmlns:adec="http://schemas.microsoft.com/office/drawing/2017/decorative" xmlns="" val="1"/>
               </a:ext>
             </a:extLst>
           </p:cNvPr>
@@ -14159,7 +14401,7 @@
           <p:nvPr>
             <p:extLst>
               <p:ext uri="{386F3935-93C4-4BCD-93E2-E3B085C9AB24}">
-                <p16:designElem xmlns:p16="http://schemas.microsoft.com/office/powerpoint/2015/main" val="1"/>
+                <p16:designElem xmlns:p16="http://schemas.microsoft.com/office/powerpoint/2015/main" xmlns="" val="1"/>
               </p:ext>
             </p:extLst>
           </p:nvPr>
@@ -14180,10 +14422,10 @@
             <p:cNvPr id="15" name="Rectangle 14">
               <a:extLst>
                 <a:ext uri="{FF2B5EF4-FFF2-40B4-BE49-F238E27FC236}">
-                  <a16:creationId xmlns:a16="http://schemas.microsoft.com/office/drawing/2014/main" id="{A6604B49-AD5C-4590-B051-06C8222ECD99}"/>
+                  <a16:creationId xmlns:a16="http://schemas.microsoft.com/office/drawing/2014/main" xmlns="" id="{A6604B49-AD5C-4590-B051-06C8222ECD99}"/>
                 </a:ext>
                 <a:ext uri="{C183D7F6-B498-43B3-948B-1728B52AA6E4}">
-                  <adec:decorative xmlns:adec="http://schemas.microsoft.com/office/drawing/2017/decorative" val="1"/>
+                  <adec:decorative xmlns:adec="http://schemas.microsoft.com/office/drawing/2017/decorative" xmlns="" val="1"/>
                 </a:ext>
               </a:extLst>
             </p:cNvPr>
@@ -14191,7 +14433,7 @@
             <p:nvPr>
               <p:extLst>
                 <p:ext uri="{386F3935-93C4-4BCD-93E2-E3B085C9AB24}">
-                  <p16:designElem xmlns:p16="http://schemas.microsoft.com/office/powerpoint/2015/main" val="1"/>
+                  <p16:designElem xmlns:p16="http://schemas.microsoft.com/office/powerpoint/2015/main" xmlns="" val="1"/>
                 </p:ext>
               </p:extLst>
             </p:nvPr>
@@ -14239,10 +14481,10 @@
             <p:cNvPr id="27" name="Rectangle 15">
               <a:extLst>
                 <a:ext uri="{FF2B5EF4-FFF2-40B4-BE49-F238E27FC236}">
-                  <a16:creationId xmlns:a16="http://schemas.microsoft.com/office/drawing/2014/main" id="{743ECCAF-29C5-4537-947C-7EA1292463DB}"/>
+                  <a16:creationId xmlns:a16="http://schemas.microsoft.com/office/drawing/2014/main" xmlns="" id="{743ECCAF-29C5-4537-947C-7EA1292463DB}"/>
                 </a:ext>
                 <a:ext uri="{C183D7F6-B498-43B3-948B-1728B52AA6E4}">
-                  <adec:decorative xmlns:adec="http://schemas.microsoft.com/office/drawing/2017/decorative" val="1"/>
+                  <adec:decorative xmlns:adec="http://schemas.microsoft.com/office/drawing/2017/decorative" xmlns="" val="1"/>
                 </a:ext>
               </a:extLst>
             </p:cNvPr>
@@ -14250,7 +14492,7 @@
             <p:nvPr>
               <p:extLst>
                 <p:ext uri="{386F3935-93C4-4BCD-93E2-E3B085C9AB24}">
-                  <p16:designElem xmlns:p16="http://schemas.microsoft.com/office/powerpoint/2015/main" val="1"/>
+                  <p16:designElem xmlns:p16="http://schemas.microsoft.com/office/powerpoint/2015/main" xmlns="" val="1"/>
                 </p:ext>
               </p:extLst>
             </p:nvPr>
@@ -14298,10 +14540,10 @@
             <p:cNvPr id="28" name="Rectangle 16">
               <a:extLst>
                 <a:ext uri="{FF2B5EF4-FFF2-40B4-BE49-F238E27FC236}">
-                  <a16:creationId xmlns:a16="http://schemas.microsoft.com/office/drawing/2014/main" id="{ED49787B-8DE6-4467-AD0A-8DECC6E0C2D6}"/>
+                  <a16:creationId xmlns:a16="http://schemas.microsoft.com/office/drawing/2014/main" xmlns="" id="{ED49787B-8DE6-4467-AD0A-8DECC6E0C2D6}"/>
                 </a:ext>
                 <a:ext uri="{C183D7F6-B498-43B3-948B-1728B52AA6E4}">
-                  <adec:decorative xmlns:adec="http://schemas.microsoft.com/office/drawing/2017/decorative" val="1"/>
+                  <adec:decorative xmlns:adec="http://schemas.microsoft.com/office/drawing/2017/decorative" xmlns="" val="1"/>
                 </a:ext>
               </a:extLst>
             </p:cNvPr>
@@ -14309,7 +14551,7 @@
             <p:nvPr>
               <p:extLst>
                 <p:ext uri="{386F3935-93C4-4BCD-93E2-E3B085C9AB24}">
-                  <p16:designElem xmlns:p16="http://schemas.microsoft.com/office/powerpoint/2015/main" val="1"/>
+                  <p16:designElem xmlns:p16="http://schemas.microsoft.com/office/powerpoint/2015/main" xmlns="" val="1"/>
                 </p:ext>
               </p:extLst>
             </p:nvPr>
@@ -14358,10 +14600,10 @@
           <p:cNvPr id="29" name="Rectangle 18">
             <a:extLst>
               <a:ext uri="{FF2B5EF4-FFF2-40B4-BE49-F238E27FC236}">
-                <a16:creationId xmlns:a16="http://schemas.microsoft.com/office/drawing/2014/main" id="{D5B0017B-2ECA-49AF-B397-DC140825DF8D}"/>
+                <a16:creationId xmlns:a16="http://schemas.microsoft.com/office/drawing/2014/main" xmlns="" id="{D5B0017B-2ECA-49AF-B397-DC140825DF8D}"/>
               </a:ext>
               <a:ext uri="{C183D7F6-B498-43B3-948B-1728B52AA6E4}">
-                <adec:decorative xmlns:adec="http://schemas.microsoft.com/office/drawing/2017/decorative" val="1"/>
+                <adec:decorative xmlns:adec="http://schemas.microsoft.com/office/drawing/2017/decorative" xmlns="" val="1"/>
               </a:ext>
             </a:extLst>
           </p:cNvPr>
@@ -14371,7 +14613,7 @@
           <p:nvPr>
             <p:extLst>
               <p:ext uri="{386F3935-93C4-4BCD-93E2-E3B085C9AB24}">
-                <p16:designElem xmlns:p16="http://schemas.microsoft.com/office/powerpoint/2015/main" val="1"/>
+                <p16:designElem xmlns:p16="http://schemas.microsoft.com/office/powerpoint/2015/main" xmlns="" val="1"/>
               </p:ext>
             </p:extLst>
           </p:nvPr>
@@ -14428,7 +14670,7 @@
           <p:cNvPr id="2" name="Title 1">
             <a:extLst>
               <a:ext uri="{FF2B5EF4-FFF2-40B4-BE49-F238E27FC236}">
-                <a16:creationId xmlns:a16="http://schemas.microsoft.com/office/drawing/2014/main" id="{6C1B8E84-99E5-D5FA-0300-C5966057792F}"/>
+                <a16:creationId xmlns:a16="http://schemas.microsoft.com/office/drawing/2014/main" xmlns="" id="{6C1B8E84-99E5-D5FA-0300-C5966057792F}"/>
               </a:ext>
             </a:extLst>
           </p:cNvPr>
@@ -14463,7 +14705,7 @@
           <p:cNvPr id="3" name="Content Placeholder 2">
             <a:extLst>
               <a:ext uri="{FF2B5EF4-FFF2-40B4-BE49-F238E27FC236}">
-                <a16:creationId xmlns:a16="http://schemas.microsoft.com/office/drawing/2014/main" id="{03E01B7E-B171-7E40-7E85-BD157809724F}"/>
+                <a16:creationId xmlns:a16="http://schemas.microsoft.com/office/drawing/2014/main" xmlns="" id="{03E01B7E-B171-7E40-7E85-BD157809724F}"/>
               </a:ext>
             </a:extLst>
           </p:cNvPr>
@@ -14611,10 +14853,10 @@
           <p:cNvPr id="30" name="Rectangle 20">
             <a:extLst>
               <a:ext uri="{FF2B5EF4-FFF2-40B4-BE49-F238E27FC236}">
-                <a16:creationId xmlns:a16="http://schemas.microsoft.com/office/drawing/2014/main" id="{395ECC94-3D5E-46A7-A7A1-DE807E1563B4}"/>
+                <a16:creationId xmlns:a16="http://schemas.microsoft.com/office/drawing/2014/main" xmlns="" id="{395ECC94-3D5E-46A7-A7A1-DE807E1563B4}"/>
               </a:ext>
               <a:ext uri="{C183D7F6-B498-43B3-948B-1728B52AA6E4}">
-                <adec:decorative xmlns:adec="http://schemas.microsoft.com/office/drawing/2017/decorative" val="1"/>
+                <adec:decorative xmlns:adec="http://schemas.microsoft.com/office/drawing/2017/decorative" xmlns="" val="1"/>
               </a:ext>
             </a:extLst>
           </p:cNvPr>
@@ -14624,7 +14866,7 @@
           <p:nvPr>
             <p:extLst>
               <p:ext uri="{386F3935-93C4-4BCD-93E2-E3B085C9AB24}">
-                <p16:designElem xmlns:p16="http://schemas.microsoft.com/office/powerpoint/2015/main" val="1"/>
+                <p16:designElem xmlns:p16="http://schemas.microsoft.com/office/powerpoint/2015/main" xmlns="" val="1"/>
               </p:ext>
             </p:extLst>
           </p:nvPr>
@@ -14681,7 +14923,7 @@
           <p:cNvPr id="7" name="Picture 6">
             <a:extLst>
               <a:ext uri="{FF2B5EF4-FFF2-40B4-BE49-F238E27FC236}">
-                <a16:creationId xmlns:a16="http://schemas.microsoft.com/office/drawing/2014/main" id="{0B137816-9ABB-6179-2C33-8E9AB110906A}"/>
+                <a16:creationId xmlns:a16="http://schemas.microsoft.com/office/drawing/2014/main" xmlns="" id="{0B137816-9ABB-6179-2C33-8E9AB110906A}"/>
               </a:ext>
             </a:extLst>
           </p:cNvPr>
@@ -14711,10 +14953,10 @@
           <p:cNvPr id="23" name="Rectangle 22">
             <a:extLst>
               <a:ext uri="{FF2B5EF4-FFF2-40B4-BE49-F238E27FC236}">
-                <a16:creationId xmlns:a16="http://schemas.microsoft.com/office/drawing/2014/main" id="{7E549738-9961-462D-81B7-4A7A44691102}"/>
+                <a16:creationId xmlns:a16="http://schemas.microsoft.com/office/drawing/2014/main" xmlns="" id="{7E549738-9961-462D-81B7-4A7A44691102}"/>
               </a:ext>
               <a:ext uri="{C183D7F6-B498-43B3-948B-1728B52AA6E4}">
-                <adec:decorative xmlns:adec="http://schemas.microsoft.com/office/drawing/2017/decorative" val="1"/>
+                <adec:decorative xmlns:adec="http://schemas.microsoft.com/office/drawing/2017/decorative" xmlns="" val="1"/>
               </a:ext>
             </a:extLst>
           </p:cNvPr>
@@ -14724,7 +14966,7 @@
           <p:nvPr>
             <p:extLst>
               <p:ext uri="{386F3935-93C4-4BCD-93E2-E3B085C9AB24}">
-                <p16:designElem xmlns:p16="http://schemas.microsoft.com/office/powerpoint/2015/main" val="1"/>
+                <p16:designElem xmlns:p16="http://schemas.microsoft.com/office/powerpoint/2015/main" xmlns="" val="1"/>
               </p:ext>
             </p:extLst>
           </p:nvPr>
@@ -14781,7 +15023,7 @@
           <p:cNvPr id="5" name="Picture 4">
             <a:extLst>
               <a:ext uri="{FF2B5EF4-FFF2-40B4-BE49-F238E27FC236}">
-                <a16:creationId xmlns:a16="http://schemas.microsoft.com/office/drawing/2014/main" id="{B23A4F80-520B-D47D-9227-8FBB654FA06D}"/>
+                <a16:creationId xmlns:a16="http://schemas.microsoft.com/office/drawing/2014/main" xmlns="" id="{B23A4F80-520B-D47D-9227-8FBB654FA06D}"/>
               </a:ext>
             </a:extLst>
           </p:cNvPr>
@@ -14811,10 +15053,10 @@
           <p:cNvPr id="25" name="Straight Connector 24">
             <a:extLst>
               <a:ext uri="{FF2B5EF4-FFF2-40B4-BE49-F238E27FC236}">
-                <a16:creationId xmlns:a16="http://schemas.microsoft.com/office/drawing/2014/main" id="{6CF1BAF6-AD41-4082-B212-8A1F9A2E8779}"/>
+                <a16:creationId xmlns:a16="http://schemas.microsoft.com/office/drawing/2014/main" xmlns="" id="{6CF1BAF6-AD41-4082-B212-8A1F9A2E8779}"/>
               </a:ext>
               <a:ext uri="{C183D7F6-B498-43B3-948B-1728B52AA6E4}">
-                <adec:decorative xmlns:adec="http://schemas.microsoft.com/office/drawing/2017/decorative" val="1"/>
+                <adec:decorative xmlns:adec="http://schemas.microsoft.com/office/drawing/2017/decorative" xmlns="" val="1"/>
               </a:ext>
             </a:extLst>
           </p:cNvPr>
@@ -14824,7 +15066,7 @@
           <p:nvPr>
             <p:extLst>
               <p:ext uri="{386F3935-93C4-4BCD-93E2-E3B085C9AB24}">
-                <p16:designElem xmlns:p16="http://schemas.microsoft.com/office/powerpoint/2015/main" val="1"/>
+                <p16:designElem xmlns:p16="http://schemas.microsoft.com/office/powerpoint/2015/main" xmlns="" val="1"/>
               </p:ext>
             </p:extLst>
           </p:nvPr>
@@ -14901,10 +15143,10 @@
           <p:cNvPr id="27" name="Rectangle 16">
             <a:extLst>
               <a:ext uri="{FF2B5EF4-FFF2-40B4-BE49-F238E27FC236}">
-                <a16:creationId xmlns:a16="http://schemas.microsoft.com/office/drawing/2014/main" id="{922F19F4-FE70-43DC-856F-2CE5F521DC48}"/>
+                <a16:creationId xmlns:a16="http://schemas.microsoft.com/office/drawing/2014/main" xmlns="" id="{922F19F4-FE70-43DC-856F-2CE5F521DC48}"/>
               </a:ext>
               <a:ext uri="{C183D7F6-B498-43B3-948B-1728B52AA6E4}">
-                <adec:decorative xmlns:adec="http://schemas.microsoft.com/office/drawing/2017/decorative" val="1"/>
+                <adec:decorative xmlns:adec="http://schemas.microsoft.com/office/drawing/2017/decorative" xmlns="" val="1"/>
               </a:ext>
             </a:extLst>
           </p:cNvPr>
@@ -14914,7 +15156,7 @@
           <p:nvPr>
             <p:extLst>
               <p:ext uri="{386F3935-93C4-4BCD-93E2-E3B085C9AB24}">
-                <p16:designElem xmlns:p16="http://schemas.microsoft.com/office/powerpoint/2015/main" val="1"/>
+                <p16:designElem xmlns:p16="http://schemas.microsoft.com/office/powerpoint/2015/main" xmlns="" val="1"/>
               </p:ext>
             </p:extLst>
           </p:nvPr>
@@ -14961,10 +15203,10 @@
           <p:cNvPr id="29" name="Group 18">
             <a:extLst>
               <a:ext uri="{FF2B5EF4-FFF2-40B4-BE49-F238E27FC236}">
-                <a16:creationId xmlns:a16="http://schemas.microsoft.com/office/drawing/2014/main" id="{AE1C45F0-260A-458C-96ED-C1F6D2151219}"/>
+                <a16:creationId xmlns:a16="http://schemas.microsoft.com/office/drawing/2014/main" xmlns="" id="{AE1C45F0-260A-458C-96ED-C1F6D2151219}"/>
               </a:ext>
               <a:ext uri="{C183D7F6-B498-43B3-948B-1728B52AA6E4}">
-                <adec:decorative xmlns:adec="http://schemas.microsoft.com/office/drawing/2017/decorative" val="1"/>
+                <adec:decorative xmlns:adec="http://schemas.microsoft.com/office/drawing/2017/decorative" xmlns="" val="1"/>
               </a:ext>
             </a:extLst>
           </p:cNvPr>
@@ -14974,7 +15216,7 @@
           <p:nvPr>
             <p:extLst>
               <p:ext uri="{386F3935-93C4-4BCD-93E2-E3B085C9AB24}">
-                <p16:designElem xmlns:p16="http://schemas.microsoft.com/office/powerpoint/2015/main" val="1"/>
+                <p16:designElem xmlns:p16="http://schemas.microsoft.com/office/powerpoint/2015/main" xmlns="" val="1"/>
               </p:ext>
             </p:extLst>
           </p:nvPr>
@@ -14995,10 +15237,10 @@
             <p:cNvPr id="31" name="Rectangle 19">
               <a:extLst>
                 <a:ext uri="{FF2B5EF4-FFF2-40B4-BE49-F238E27FC236}">
-                  <a16:creationId xmlns:a16="http://schemas.microsoft.com/office/drawing/2014/main" id="{A6604B49-AD5C-4590-B051-06C8222ECD99}"/>
+                  <a16:creationId xmlns:a16="http://schemas.microsoft.com/office/drawing/2014/main" xmlns="" id="{A6604B49-AD5C-4590-B051-06C8222ECD99}"/>
                 </a:ext>
                 <a:ext uri="{C183D7F6-B498-43B3-948B-1728B52AA6E4}">
-                  <adec:decorative xmlns:adec="http://schemas.microsoft.com/office/drawing/2017/decorative" val="1"/>
+                  <adec:decorative xmlns:adec="http://schemas.microsoft.com/office/drawing/2017/decorative" xmlns="" val="1"/>
                 </a:ext>
               </a:extLst>
             </p:cNvPr>
@@ -15006,7 +15248,7 @@
             <p:nvPr>
               <p:extLst>
                 <p:ext uri="{386F3935-93C4-4BCD-93E2-E3B085C9AB24}">
-                  <p16:designElem xmlns:p16="http://schemas.microsoft.com/office/powerpoint/2015/main" val="1"/>
+                  <p16:designElem xmlns:p16="http://schemas.microsoft.com/office/powerpoint/2015/main" xmlns="" val="1"/>
                 </p:ext>
               </p:extLst>
             </p:nvPr>
@@ -15054,10 +15296,10 @@
             <p:cNvPr id="32" name="Rectangle 20">
               <a:extLst>
                 <a:ext uri="{FF2B5EF4-FFF2-40B4-BE49-F238E27FC236}">
-                  <a16:creationId xmlns:a16="http://schemas.microsoft.com/office/drawing/2014/main" id="{743ECCAF-29C5-4537-947C-7EA1292463DB}"/>
+                  <a16:creationId xmlns:a16="http://schemas.microsoft.com/office/drawing/2014/main" xmlns="" id="{743ECCAF-29C5-4537-947C-7EA1292463DB}"/>
                 </a:ext>
                 <a:ext uri="{C183D7F6-B498-43B3-948B-1728B52AA6E4}">
-                  <adec:decorative xmlns:adec="http://schemas.microsoft.com/office/drawing/2017/decorative" val="1"/>
+                  <adec:decorative xmlns:adec="http://schemas.microsoft.com/office/drawing/2017/decorative" xmlns="" val="1"/>
                 </a:ext>
               </a:extLst>
             </p:cNvPr>
@@ -15065,7 +15307,7 @@
             <p:nvPr>
               <p:extLst>
                 <p:ext uri="{386F3935-93C4-4BCD-93E2-E3B085C9AB24}">
-                  <p16:designElem xmlns:p16="http://schemas.microsoft.com/office/powerpoint/2015/main" val="1"/>
+                  <p16:designElem xmlns:p16="http://schemas.microsoft.com/office/powerpoint/2015/main" xmlns="" val="1"/>
                 </p:ext>
               </p:extLst>
             </p:nvPr>
@@ -15113,10 +15355,10 @@
             <p:cNvPr id="22" name="Rectangle 21">
               <a:extLst>
                 <a:ext uri="{FF2B5EF4-FFF2-40B4-BE49-F238E27FC236}">
-                  <a16:creationId xmlns:a16="http://schemas.microsoft.com/office/drawing/2014/main" id="{ED49787B-8DE6-4467-AD0A-8DECC6E0C2D6}"/>
+                  <a16:creationId xmlns:a16="http://schemas.microsoft.com/office/drawing/2014/main" xmlns="" id="{ED49787B-8DE6-4467-AD0A-8DECC6E0C2D6}"/>
                 </a:ext>
                 <a:ext uri="{C183D7F6-B498-43B3-948B-1728B52AA6E4}">
-                  <adec:decorative xmlns:adec="http://schemas.microsoft.com/office/drawing/2017/decorative" val="1"/>
+                  <adec:decorative xmlns:adec="http://schemas.microsoft.com/office/drawing/2017/decorative" xmlns="" val="1"/>
                 </a:ext>
               </a:extLst>
             </p:cNvPr>
@@ -15124,7 +15366,7 @@
             <p:nvPr>
               <p:extLst>
                 <p:ext uri="{386F3935-93C4-4BCD-93E2-E3B085C9AB24}">
-                  <p16:designElem xmlns:p16="http://schemas.microsoft.com/office/powerpoint/2015/main" val="1"/>
+                  <p16:designElem xmlns:p16="http://schemas.microsoft.com/office/powerpoint/2015/main" xmlns="" val="1"/>
                 </p:ext>
               </p:extLst>
             </p:nvPr>
@@ -15173,10 +15415,10 @@
           <p:cNvPr id="24" name="Rectangle 23">
             <a:extLst>
               <a:ext uri="{FF2B5EF4-FFF2-40B4-BE49-F238E27FC236}">
-                <a16:creationId xmlns:a16="http://schemas.microsoft.com/office/drawing/2014/main" id="{D5B0017B-2ECA-49AF-B397-DC140825DF8D}"/>
+                <a16:creationId xmlns:a16="http://schemas.microsoft.com/office/drawing/2014/main" xmlns="" id="{D5B0017B-2ECA-49AF-B397-DC140825DF8D}"/>
               </a:ext>
               <a:ext uri="{C183D7F6-B498-43B3-948B-1728B52AA6E4}">
-                <adec:decorative xmlns:adec="http://schemas.microsoft.com/office/drawing/2017/decorative" val="1"/>
+                <adec:decorative xmlns:adec="http://schemas.microsoft.com/office/drawing/2017/decorative" xmlns="" val="1"/>
               </a:ext>
             </a:extLst>
           </p:cNvPr>
@@ -15186,7 +15428,7 @@
           <p:nvPr>
             <p:extLst>
               <p:ext uri="{386F3935-93C4-4BCD-93E2-E3B085C9AB24}">
-                <p16:designElem xmlns:p16="http://schemas.microsoft.com/office/powerpoint/2015/main" val="1"/>
+                <p16:designElem xmlns:p16="http://schemas.microsoft.com/office/powerpoint/2015/main" xmlns="" val="1"/>
               </p:ext>
             </p:extLst>
           </p:nvPr>
@@ -15243,7 +15485,7 @@
           <p:cNvPr id="2" name="Title 1">
             <a:extLst>
               <a:ext uri="{FF2B5EF4-FFF2-40B4-BE49-F238E27FC236}">
-                <a16:creationId xmlns:a16="http://schemas.microsoft.com/office/drawing/2014/main" id="{31DDB634-99C4-E498-9EC1-DF276F166A37}"/>
+                <a16:creationId xmlns:a16="http://schemas.microsoft.com/office/drawing/2014/main" xmlns="" id="{31DDB634-99C4-E498-9EC1-DF276F166A37}"/>
               </a:ext>
             </a:extLst>
           </p:cNvPr>
@@ -15278,7 +15520,7 @@
           <p:cNvPr id="3" name="Content Placeholder 2">
             <a:extLst>
               <a:ext uri="{FF2B5EF4-FFF2-40B4-BE49-F238E27FC236}">
-                <a16:creationId xmlns:a16="http://schemas.microsoft.com/office/drawing/2014/main" id="{38EC73E6-4705-8D0B-F77C-7B06EE73EC1B}"/>
+                <a16:creationId xmlns:a16="http://schemas.microsoft.com/office/drawing/2014/main" xmlns="" id="{38EC73E6-4705-8D0B-F77C-7B06EE73EC1B}"/>
               </a:ext>
             </a:extLst>
           </p:cNvPr>
@@ -15346,10 +15588,10 @@
           <p:cNvPr id="26" name="Rectangle 25">
             <a:extLst>
               <a:ext uri="{FF2B5EF4-FFF2-40B4-BE49-F238E27FC236}">
-                <a16:creationId xmlns:a16="http://schemas.microsoft.com/office/drawing/2014/main" id="{395ECC94-3D5E-46A7-A7A1-DE807E1563B4}"/>
+                <a16:creationId xmlns:a16="http://schemas.microsoft.com/office/drawing/2014/main" xmlns="" id="{395ECC94-3D5E-46A7-A7A1-DE807E1563B4}"/>
               </a:ext>
               <a:ext uri="{C183D7F6-B498-43B3-948B-1728B52AA6E4}">
-                <adec:decorative xmlns:adec="http://schemas.microsoft.com/office/drawing/2017/decorative" val="1"/>
+                <adec:decorative xmlns:adec="http://schemas.microsoft.com/office/drawing/2017/decorative" xmlns="" val="1"/>
               </a:ext>
             </a:extLst>
           </p:cNvPr>
@@ -15359,7 +15601,7 @@
           <p:nvPr>
             <p:extLst>
               <p:ext uri="{386F3935-93C4-4BCD-93E2-E3B085C9AB24}">
-                <p16:designElem xmlns:p16="http://schemas.microsoft.com/office/powerpoint/2015/main" val="1"/>
+                <p16:designElem xmlns:p16="http://schemas.microsoft.com/office/powerpoint/2015/main" xmlns="" val="1"/>
               </p:ext>
             </p:extLst>
           </p:nvPr>
@@ -15416,7 +15658,7 @@
           <p:cNvPr id="7" name="Picture 6">
             <a:extLst>
               <a:ext uri="{FF2B5EF4-FFF2-40B4-BE49-F238E27FC236}">
-                <a16:creationId xmlns:a16="http://schemas.microsoft.com/office/drawing/2014/main" id="{D4241E4B-73EE-2541-A2FA-D4DEB8207028}"/>
+                <a16:creationId xmlns:a16="http://schemas.microsoft.com/office/drawing/2014/main" xmlns="" id="{D4241E4B-73EE-2541-A2FA-D4DEB8207028}"/>
               </a:ext>
             </a:extLst>
           </p:cNvPr>
@@ -15446,10 +15688,10 @@
           <p:cNvPr id="28" name="Rectangle 27">
             <a:extLst>
               <a:ext uri="{FF2B5EF4-FFF2-40B4-BE49-F238E27FC236}">
-                <a16:creationId xmlns:a16="http://schemas.microsoft.com/office/drawing/2014/main" id="{7E549738-9961-462D-81B7-4A7A44691102}"/>
+                <a16:creationId xmlns:a16="http://schemas.microsoft.com/office/drawing/2014/main" xmlns="" id="{7E549738-9961-462D-81B7-4A7A44691102}"/>
               </a:ext>
               <a:ext uri="{C183D7F6-B498-43B3-948B-1728B52AA6E4}">
-                <adec:decorative xmlns:adec="http://schemas.microsoft.com/office/drawing/2017/decorative" val="1"/>
+                <adec:decorative xmlns:adec="http://schemas.microsoft.com/office/drawing/2017/decorative" xmlns="" val="1"/>
               </a:ext>
             </a:extLst>
           </p:cNvPr>
@@ -15459,7 +15701,7 @@
           <p:nvPr>
             <p:extLst>
               <p:ext uri="{386F3935-93C4-4BCD-93E2-E3B085C9AB24}">
-                <p16:designElem xmlns:p16="http://schemas.microsoft.com/office/powerpoint/2015/main" val="1"/>
+                <p16:designElem xmlns:p16="http://schemas.microsoft.com/office/powerpoint/2015/main" xmlns="" val="1"/>
               </p:ext>
             </p:extLst>
           </p:nvPr>
@@ -15516,7 +15758,7 @@
           <p:cNvPr id="5" name="Picture 4">
             <a:extLst>
               <a:ext uri="{FF2B5EF4-FFF2-40B4-BE49-F238E27FC236}">
-                <a16:creationId xmlns:a16="http://schemas.microsoft.com/office/drawing/2014/main" id="{9276DF85-142E-195B-0F7E-576AE5CB7F49}"/>
+                <a16:creationId xmlns:a16="http://schemas.microsoft.com/office/drawing/2014/main" xmlns="" id="{9276DF85-142E-195B-0F7E-576AE5CB7F49}"/>
               </a:ext>
             </a:extLst>
           </p:cNvPr>
@@ -15546,10 +15788,10 @@
           <p:cNvPr id="30" name="Straight Connector 29">
             <a:extLst>
               <a:ext uri="{FF2B5EF4-FFF2-40B4-BE49-F238E27FC236}">
-                <a16:creationId xmlns:a16="http://schemas.microsoft.com/office/drawing/2014/main" id="{6CF1BAF6-AD41-4082-B212-8A1F9A2E8779}"/>
+                <a16:creationId xmlns:a16="http://schemas.microsoft.com/office/drawing/2014/main" xmlns="" id="{6CF1BAF6-AD41-4082-B212-8A1F9A2E8779}"/>
               </a:ext>
               <a:ext uri="{C183D7F6-B498-43B3-948B-1728B52AA6E4}">
-                <adec:decorative xmlns:adec="http://schemas.microsoft.com/office/drawing/2017/decorative" val="1"/>
+                <adec:decorative xmlns:adec="http://schemas.microsoft.com/office/drawing/2017/decorative" xmlns="" val="1"/>
               </a:ext>
             </a:extLst>
           </p:cNvPr>
@@ -15559,7 +15801,7 @@
           <p:nvPr>
             <p:extLst>
               <p:ext uri="{386F3935-93C4-4BCD-93E2-E3B085C9AB24}">
-                <p16:designElem xmlns:p16="http://schemas.microsoft.com/office/powerpoint/2015/main" val="1"/>
+                <p16:designElem xmlns:p16="http://schemas.microsoft.com/office/powerpoint/2015/main" xmlns="" val="1"/>
               </p:ext>
             </p:extLst>
           </p:nvPr>
@@ -15628,7 +15870,7 @@
           <p:cNvPr id="3" name="Content Placeholder 2">
             <a:extLst>
               <a:ext uri="{FF2B5EF4-FFF2-40B4-BE49-F238E27FC236}">
-                <a16:creationId xmlns:a16="http://schemas.microsoft.com/office/drawing/2014/main" id="{5629A74D-3E90-E08F-90DC-7BEF84B94B13}"/>
+                <a16:creationId xmlns:a16="http://schemas.microsoft.com/office/drawing/2014/main" xmlns="" id="{5629A74D-3E90-E08F-90DC-7BEF84B94B13}"/>
               </a:ext>
             </a:extLst>
           </p:cNvPr>
@@ -15784,7 +16026,7 @@
           <p:cNvPr id="5" name="Picture 4">
             <a:extLst>
               <a:ext uri="{FF2B5EF4-FFF2-40B4-BE49-F238E27FC236}">
-                <a16:creationId xmlns:a16="http://schemas.microsoft.com/office/drawing/2014/main" id="{72976066-7A8C-6D29-BA7A-379F03A154B5}"/>
+                <a16:creationId xmlns:a16="http://schemas.microsoft.com/office/drawing/2014/main" xmlns="" id="{72976066-7A8C-6D29-BA7A-379F03A154B5}"/>
               </a:ext>
             </a:extLst>
           </p:cNvPr>
@@ -15814,7 +16056,7 @@
           <p:cNvPr id="7" name="Picture 6">
             <a:extLst>
               <a:ext uri="{FF2B5EF4-FFF2-40B4-BE49-F238E27FC236}">
-                <a16:creationId xmlns:a16="http://schemas.microsoft.com/office/drawing/2014/main" id="{6BCEDCBD-21DC-116A-14C9-52427238D1B3}"/>
+                <a16:creationId xmlns:a16="http://schemas.microsoft.com/office/drawing/2014/main" xmlns="" id="{6BCEDCBD-21DC-116A-14C9-52427238D1B3}"/>
               </a:ext>
             </a:extLst>
           </p:cNvPr>
@@ -15882,10 +16124,10 @@
           <p:cNvPr id="12" name="Rectangle 11">
             <a:extLst>
               <a:ext uri="{FF2B5EF4-FFF2-40B4-BE49-F238E27FC236}">
-                <a16:creationId xmlns:a16="http://schemas.microsoft.com/office/drawing/2014/main" id="{922F19F4-FE70-43DC-856F-2CE5F521DC48}"/>
+                <a16:creationId xmlns:a16="http://schemas.microsoft.com/office/drawing/2014/main" xmlns="" id="{922F19F4-FE70-43DC-856F-2CE5F521DC48}"/>
               </a:ext>
               <a:ext uri="{C183D7F6-B498-43B3-948B-1728B52AA6E4}">
-                <adec:decorative xmlns:adec="http://schemas.microsoft.com/office/drawing/2017/decorative" val="1"/>
+                <adec:decorative xmlns:adec="http://schemas.microsoft.com/office/drawing/2017/decorative" xmlns="" val="1"/>
               </a:ext>
             </a:extLst>
           </p:cNvPr>
@@ -15895,7 +16137,7 @@
           <p:nvPr>
             <p:extLst>
               <p:ext uri="{386F3935-93C4-4BCD-93E2-E3B085C9AB24}">
-                <p16:designElem xmlns:p16="http://schemas.microsoft.com/office/powerpoint/2015/main" val="1"/>
+                <p16:designElem xmlns:p16="http://schemas.microsoft.com/office/powerpoint/2015/main" xmlns="" val="1"/>
               </p:ext>
             </p:extLst>
           </p:nvPr>
@@ -15942,10 +16184,10 @@
           <p:cNvPr id="14" name="Group 13">
             <a:extLst>
               <a:ext uri="{FF2B5EF4-FFF2-40B4-BE49-F238E27FC236}">
-                <a16:creationId xmlns:a16="http://schemas.microsoft.com/office/drawing/2014/main" id="{AE1C45F0-260A-458C-96ED-C1F6D2151219}"/>
+                <a16:creationId xmlns:a16="http://schemas.microsoft.com/office/drawing/2014/main" xmlns="" id="{AE1C45F0-260A-458C-96ED-C1F6D2151219}"/>
               </a:ext>
               <a:ext uri="{C183D7F6-B498-43B3-948B-1728B52AA6E4}">
-                <adec:decorative xmlns:adec="http://schemas.microsoft.com/office/drawing/2017/decorative" val="1"/>
+                <adec:decorative xmlns:adec="http://schemas.microsoft.com/office/drawing/2017/decorative" xmlns="" val="1"/>
               </a:ext>
             </a:extLst>
           </p:cNvPr>
@@ -15955,7 +16197,7 @@
           <p:nvPr>
             <p:extLst>
               <p:ext uri="{386F3935-93C4-4BCD-93E2-E3B085C9AB24}">
-                <p16:designElem xmlns:p16="http://schemas.microsoft.com/office/powerpoint/2015/main" val="1"/>
+                <p16:designElem xmlns:p16="http://schemas.microsoft.com/office/powerpoint/2015/main" xmlns="" val="1"/>
               </p:ext>
             </p:extLst>
           </p:nvPr>
@@ -15976,10 +16218,10 @@
             <p:cNvPr id="15" name="Rectangle 14">
               <a:extLst>
                 <a:ext uri="{FF2B5EF4-FFF2-40B4-BE49-F238E27FC236}">
-                  <a16:creationId xmlns:a16="http://schemas.microsoft.com/office/drawing/2014/main" id="{A6604B49-AD5C-4590-B051-06C8222ECD99}"/>
+                  <a16:creationId xmlns:a16="http://schemas.microsoft.com/office/drawing/2014/main" xmlns="" id="{A6604B49-AD5C-4590-B051-06C8222ECD99}"/>
                 </a:ext>
                 <a:ext uri="{C183D7F6-B498-43B3-948B-1728B52AA6E4}">
-                  <adec:decorative xmlns:adec="http://schemas.microsoft.com/office/drawing/2017/decorative" val="1"/>
+                  <adec:decorative xmlns:adec="http://schemas.microsoft.com/office/drawing/2017/decorative" xmlns="" val="1"/>
                 </a:ext>
               </a:extLst>
             </p:cNvPr>
@@ -15987,7 +16229,7 @@
             <p:nvPr>
               <p:extLst>
                 <p:ext uri="{386F3935-93C4-4BCD-93E2-E3B085C9AB24}">
-                  <p16:designElem xmlns:p16="http://schemas.microsoft.com/office/powerpoint/2015/main" val="1"/>
+                  <p16:designElem xmlns:p16="http://schemas.microsoft.com/office/powerpoint/2015/main" xmlns="" val="1"/>
                 </p:ext>
               </p:extLst>
             </p:nvPr>
@@ -16035,10 +16277,10 @@
             <p:cNvPr id="16" name="Rectangle 15">
               <a:extLst>
                 <a:ext uri="{FF2B5EF4-FFF2-40B4-BE49-F238E27FC236}">
-                  <a16:creationId xmlns:a16="http://schemas.microsoft.com/office/drawing/2014/main" id="{743ECCAF-29C5-4537-947C-7EA1292463DB}"/>
+                  <a16:creationId xmlns:a16="http://schemas.microsoft.com/office/drawing/2014/main" xmlns="" id="{743ECCAF-29C5-4537-947C-7EA1292463DB}"/>
                 </a:ext>
                 <a:ext uri="{C183D7F6-B498-43B3-948B-1728B52AA6E4}">
-                  <adec:decorative xmlns:adec="http://schemas.microsoft.com/office/drawing/2017/decorative" val="1"/>
+                  <adec:decorative xmlns:adec="http://schemas.microsoft.com/office/drawing/2017/decorative" xmlns="" val="1"/>
                 </a:ext>
               </a:extLst>
             </p:cNvPr>
@@ -16046,7 +16288,7 @@
             <p:nvPr>
               <p:extLst>
                 <p:ext uri="{386F3935-93C4-4BCD-93E2-E3B085C9AB24}">
-                  <p16:designElem xmlns:p16="http://schemas.microsoft.com/office/powerpoint/2015/main" val="1"/>
+                  <p16:designElem xmlns:p16="http://schemas.microsoft.com/office/powerpoint/2015/main" xmlns="" val="1"/>
                 </p:ext>
               </p:extLst>
             </p:nvPr>
@@ -16094,10 +16336,10 @@
             <p:cNvPr id="17" name="Rectangle 16">
               <a:extLst>
                 <a:ext uri="{FF2B5EF4-FFF2-40B4-BE49-F238E27FC236}">
-                  <a16:creationId xmlns:a16="http://schemas.microsoft.com/office/drawing/2014/main" id="{ED49787B-8DE6-4467-AD0A-8DECC6E0C2D6}"/>
+                  <a16:creationId xmlns:a16="http://schemas.microsoft.com/office/drawing/2014/main" xmlns="" id="{ED49787B-8DE6-4467-AD0A-8DECC6E0C2D6}"/>
                 </a:ext>
                 <a:ext uri="{C183D7F6-B498-43B3-948B-1728B52AA6E4}">
-                  <adec:decorative xmlns:adec="http://schemas.microsoft.com/office/drawing/2017/decorative" val="1"/>
+                  <adec:decorative xmlns:adec="http://schemas.microsoft.com/office/drawing/2017/decorative" xmlns="" val="1"/>
                 </a:ext>
               </a:extLst>
             </p:cNvPr>
@@ -16105,7 +16347,7 @@
             <p:nvPr>
               <p:extLst>
                 <p:ext uri="{386F3935-93C4-4BCD-93E2-E3B085C9AB24}">
-                  <p16:designElem xmlns:p16="http://schemas.microsoft.com/office/powerpoint/2015/main" val="1"/>
+                  <p16:designElem xmlns:p16="http://schemas.microsoft.com/office/powerpoint/2015/main" xmlns="" val="1"/>
                 </p:ext>
               </p:extLst>
             </p:nvPr>
@@ -16154,10 +16396,10 @@
           <p:cNvPr id="19" name="Rectangle 18">
             <a:extLst>
               <a:ext uri="{FF2B5EF4-FFF2-40B4-BE49-F238E27FC236}">
-                <a16:creationId xmlns:a16="http://schemas.microsoft.com/office/drawing/2014/main" id="{D5B0017B-2ECA-49AF-B397-DC140825DF8D}"/>
+                <a16:creationId xmlns:a16="http://schemas.microsoft.com/office/drawing/2014/main" xmlns="" id="{D5B0017B-2ECA-49AF-B397-DC140825DF8D}"/>
               </a:ext>
               <a:ext uri="{C183D7F6-B498-43B3-948B-1728B52AA6E4}">
-                <adec:decorative xmlns:adec="http://schemas.microsoft.com/office/drawing/2017/decorative" val="1"/>
+                <adec:decorative xmlns:adec="http://schemas.microsoft.com/office/drawing/2017/decorative" xmlns="" val="1"/>
               </a:ext>
             </a:extLst>
           </p:cNvPr>
@@ -16167,7 +16409,7 @@
           <p:nvPr>
             <p:extLst>
               <p:ext uri="{386F3935-93C4-4BCD-93E2-E3B085C9AB24}">
-                <p16:designElem xmlns:p16="http://schemas.microsoft.com/office/powerpoint/2015/main" val="1"/>
+                <p16:designElem xmlns:p16="http://schemas.microsoft.com/office/powerpoint/2015/main" xmlns="" val="1"/>
               </p:ext>
             </p:extLst>
           </p:nvPr>
@@ -16224,7 +16466,7 @@
           <p:cNvPr id="2" name="Title 1">
             <a:extLst>
               <a:ext uri="{FF2B5EF4-FFF2-40B4-BE49-F238E27FC236}">
-                <a16:creationId xmlns:a16="http://schemas.microsoft.com/office/drawing/2014/main" id="{509108F3-326F-B1FA-685E-773506E72E44}"/>
+                <a16:creationId xmlns:a16="http://schemas.microsoft.com/office/drawing/2014/main" xmlns="" id="{509108F3-326F-B1FA-685E-773506E72E44}"/>
               </a:ext>
             </a:extLst>
           </p:cNvPr>
@@ -16259,7 +16501,7 @@
           <p:cNvPr id="3" name="Content Placeholder 2">
             <a:extLst>
               <a:ext uri="{FF2B5EF4-FFF2-40B4-BE49-F238E27FC236}">
-                <a16:creationId xmlns:a16="http://schemas.microsoft.com/office/drawing/2014/main" id="{CC66EBF9-B4B2-E54C-27A7-0E3BAD2C3464}"/>
+                <a16:creationId xmlns:a16="http://schemas.microsoft.com/office/drawing/2014/main" xmlns="" id="{CC66EBF9-B4B2-E54C-27A7-0E3BAD2C3464}"/>
               </a:ext>
             </a:extLst>
           </p:cNvPr>
@@ -16330,10 +16572,10 @@
           <p:cNvPr id="21" name="Rectangle 20">
             <a:extLst>
               <a:ext uri="{FF2B5EF4-FFF2-40B4-BE49-F238E27FC236}">
-                <a16:creationId xmlns:a16="http://schemas.microsoft.com/office/drawing/2014/main" id="{395ECC94-3D5E-46A7-A7A1-DE807E1563B4}"/>
+                <a16:creationId xmlns:a16="http://schemas.microsoft.com/office/drawing/2014/main" xmlns="" id="{395ECC94-3D5E-46A7-A7A1-DE807E1563B4}"/>
               </a:ext>
               <a:ext uri="{C183D7F6-B498-43B3-948B-1728B52AA6E4}">
-                <adec:decorative xmlns:adec="http://schemas.microsoft.com/office/drawing/2017/decorative" val="1"/>
+                <adec:decorative xmlns:adec="http://schemas.microsoft.com/office/drawing/2017/decorative" xmlns="" val="1"/>
               </a:ext>
             </a:extLst>
           </p:cNvPr>
@@ -16343,7 +16585,7 @@
           <p:nvPr>
             <p:extLst>
               <p:ext uri="{386F3935-93C4-4BCD-93E2-E3B085C9AB24}">
-                <p16:designElem xmlns:p16="http://schemas.microsoft.com/office/powerpoint/2015/main" val="1"/>
+                <p16:designElem xmlns:p16="http://schemas.microsoft.com/office/powerpoint/2015/main" xmlns="" val="1"/>
               </p:ext>
             </p:extLst>
           </p:nvPr>
@@ -16400,7 +16642,7 @@
           <p:cNvPr id="5" name="Picture 4">
             <a:extLst>
               <a:ext uri="{FF2B5EF4-FFF2-40B4-BE49-F238E27FC236}">
-                <a16:creationId xmlns:a16="http://schemas.microsoft.com/office/drawing/2014/main" id="{99BDB09E-A658-53A5-5517-58CA3513C680}"/>
+                <a16:creationId xmlns:a16="http://schemas.microsoft.com/office/drawing/2014/main" xmlns="" id="{99BDB09E-A658-53A5-5517-58CA3513C680}"/>
               </a:ext>
             </a:extLst>
           </p:cNvPr>
@@ -16430,10 +16672,10 @@
           <p:cNvPr id="23" name="Rectangle 22">
             <a:extLst>
               <a:ext uri="{FF2B5EF4-FFF2-40B4-BE49-F238E27FC236}">
-                <a16:creationId xmlns:a16="http://schemas.microsoft.com/office/drawing/2014/main" id="{7E549738-9961-462D-81B7-4A7A44691102}"/>
+                <a16:creationId xmlns:a16="http://schemas.microsoft.com/office/drawing/2014/main" xmlns="" id="{7E549738-9961-462D-81B7-4A7A44691102}"/>
               </a:ext>
               <a:ext uri="{C183D7F6-B498-43B3-948B-1728B52AA6E4}">
-                <adec:decorative xmlns:adec="http://schemas.microsoft.com/office/drawing/2017/decorative" val="1"/>
+                <adec:decorative xmlns:adec="http://schemas.microsoft.com/office/drawing/2017/decorative" xmlns="" val="1"/>
               </a:ext>
             </a:extLst>
           </p:cNvPr>
@@ -16443,7 +16685,7 @@
           <p:nvPr>
             <p:extLst>
               <p:ext uri="{386F3935-93C4-4BCD-93E2-E3B085C9AB24}">
-                <p16:designElem xmlns:p16="http://schemas.microsoft.com/office/powerpoint/2015/main" val="1"/>
+                <p16:designElem xmlns:p16="http://schemas.microsoft.com/office/powerpoint/2015/main" xmlns="" val="1"/>
               </p:ext>
             </p:extLst>
           </p:nvPr>
@@ -16500,7 +16742,7 @@
           <p:cNvPr id="7" name="Picture 6">
             <a:extLst>
               <a:ext uri="{FF2B5EF4-FFF2-40B4-BE49-F238E27FC236}">
-                <a16:creationId xmlns:a16="http://schemas.microsoft.com/office/drawing/2014/main" id="{8FFEFD6B-F61D-07B0-E6F2-738169312BB4}"/>
+                <a16:creationId xmlns:a16="http://schemas.microsoft.com/office/drawing/2014/main" xmlns="" id="{8FFEFD6B-F61D-07B0-E6F2-738169312BB4}"/>
               </a:ext>
             </a:extLst>
           </p:cNvPr>
@@ -16530,10 +16772,10 @@
           <p:cNvPr id="25" name="Straight Connector 24">
             <a:extLst>
               <a:ext uri="{FF2B5EF4-FFF2-40B4-BE49-F238E27FC236}">
-                <a16:creationId xmlns:a16="http://schemas.microsoft.com/office/drawing/2014/main" id="{6CF1BAF6-AD41-4082-B212-8A1F9A2E8779}"/>
+                <a16:creationId xmlns:a16="http://schemas.microsoft.com/office/drawing/2014/main" xmlns="" id="{6CF1BAF6-AD41-4082-B212-8A1F9A2E8779}"/>
               </a:ext>
               <a:ext uri="{C183D7F6-B498-43B3-948B-1728B52AA6E4}">
-                <adec:decorative xmlns:adec="http://schemas.microsoft.com/office/drawing/2017/decorative" val="1"/>
+                <adec:decorative xmlns:adec="http://schemas.microsoft.com/office/drawing/2017/decorative" xmlns="" val="1"/>
               </a:ext>
             </a:extLst>
           </p:cNvPr>
@@ -16543,7 +16785,7 @@
           <p:nvPr>
             <p:extLst>
               <p:ext uri="{386F3935-93C4-4BCD-93E2-E3B085C9AB24}">
-                <p16:designElem xmlns:p16="http://schemas.microsoft.com/office/powerpoint/2015/main" val="1"/>
+                <p16:designElem xmlns:p16="http://schemas.microsoft.com/office/powerpoint/2015/main" xmlns="" val="1"/>
               </p:ext>
             </p:extLst>
           </p:nvPr>
@@ -16620,10 +16862,10 @@
           <p:cNvPr id="12" name="Rectangle 11">
             <a:extLst>
               <a:ext uri="{FF2B5EF4-FFF2-40B4-BE49-F238E27FC236}">
-                <a16:creationId xmlns:a16="http://schemas.microsoft.com/office/drawing/2014/main" id="{922F19F4-FE70-43DC-856F-2CE5F521DC48}"/>
+                <a16:creationId xmlns:a16="http://schemas.microsoft.com/office/drawing/2014/main" xmlns="" id="{922F19F4-FE70-43DC-856F-2CE5F521DC48}"/>
               </a:ext>
               <a:ext uri="{C183D7F6-B498-43B3-948B-1728B52AA6E4}">
-                <adec:decorative xmlns:adec="http://schemas.microsoft.com/office/drawing/2017/decorative" val="1"/>
+                <adec:decorative xmlns:adec="http://schemas.microsoft.com/office/drawing/2017/decorative" xmlns="" val="1"/>
               </a:ext>
             </a:extLst>
           </p:cNvPr>
@@ -16633,7 +16875,7 @@
           <p:nvPr>
             <p:extLst>
               <p:ext uri="{386F3935-93C4-4BCD-93E2-E3B085C9AB24}">
-                <p16:designElem xmlns:p16="http://schemas.microsoft.com/office/powerpoint/2015/main" val="1"/>
+                <p16:designElem xmlns:p16="http://schemas.microsoft.com/office/powerpoint/2015/main" xmlns="" val="1"/>
               </p:ext>
             </p:extLst>
           </p:nvPr>
@@ -16680,10 +16922,10 @@
           <p:cNvPr id="14" name="Group 13">
             <a:extLst>
               <a:ext uri="{FF2B5EF4-FFF2-40B4-BE49-F238E27FC236}">
-                <a16:creationId xmlns:a16="http://schemas.microsoft.com/office/drawing/2014/main" id="{AE1C45F0-260A-458C-96ED-C1F6D2151219}"/>
+                <a16:creationId xmlns:a16="http://schemas.microsoft.com/office/drawing/2014/main" xmlns="" id="{AE1C45F0-260A-458C-96ED-C1F6D2151219}"/>
               </a:ext>
               <a:ext uri="{C183D7F6-B498-43B3-948B-1728B52AA6E4}">
-                <adec:decorative xmlns:adec="http://schemas.microsoft.com/office/drawing/2017/decorative" val="1"/>
+                <adec:decorative xmlns:adec="http://schemas.microsoft.com/office/drawing/2017/decorative" xmlns="" val="1"/>
               </a:ext>
             </a:extLst>
           </p:cNvPr>
@@ -16693,7 +16935,7 @@
           <p:nvPr>
             <p:extLst>
               <p:ext uri="{386F3935-93C4-4BCD-93E2-E3B085C9AB24}">
-                <p16:designElem xmlns:p16="http://schemas.microsoft.com/office/powerpoint/2015/main" val="1"/>
+                <p16:designElem xmlns:p16="http://schemas.microsoft.com/office/powerpoint/2015/main" xmlns="" val="1"/>
               </p:ext>
             </p:extLst>
           </p:nvPr>
@@ -16714,10 +16956,10 @@
             <p:cNvPr id="15" name="Rectangle 14">
               <a:extLst>
                 <a:ext uri="{FF2B5EF4-FFF2-40B4-BE49-F238E27FC236}">
-                  <a16:creationId xmlns:a16="http://schemas.microsoft.com/office/drawing/2014/main" id="{A6604B49-AD5C-4590-B051-06C8222ECD99}"/>
+                  <a16:creationId xmlns:a16="http://schemas.microsoft.com/office/drawing/2014/main" xmlns="" id="{A6604B49-AD5C-4590-B051-06C8222ECD99}"/>
                 </a:ext>
                 <a:ext uri="{C183D7F6-B498-43B3-948B-1728B52AA6E4}">
-                  <adec:decorative xmlns:adec="http://schemas.microsoft.com/office/drawing/2017/decorative" val="1"/>
+                  <adec:decorative xmlns:adec="http://schemas.microsoft.com/office/drawing/2017/decorative" xmlns="" val="1"/>
                 </a:ext>
               </a:extLst>
             </p:cNvPr>
@@ -16725,7 +16967,7 @@
             <p:nvPr>
               <p:extLst>
                 <p:ext uri="{386F3935-93C4-4BCD-93E2-E3B085C9AB24}">
-                  <p16:designElem xmlns:p16="http://schemas.microsoft.com/office/powerpoint/2015/main" val="1"/>
+                  <p16:designElem xmlns:p16="http://schemas.microsoft.com/office/powerpoint/2015/main" xmlns="" val="1"/>
                 </p:ext>
               </p:extLst>
             </p:nvPr>
@@ -16773,10 +17015,10 @@
             <p:cNvPr id="16" name="Rectangle 15">
               <a:extLst>
                 <a:ext uri="{FF2B5EF4-FFF2-40B4-BE49-F238E27FC236}">
-                  <a16:creationId xmlns:a16="http://schemas.microsoft.com/office/drawing/2014/main" id="{743ECCAF-29C5-4537-947C-7EA1292463DB}"/>
+                  <a16:creationId xmlns:a16="http://schemas.microsoft.com/office/drawing/2014/main" xmlns="" id="{743ECCAF-29C5-4537-947C-7EA1292463DB}"/>
                 </a:ext>
                 <a:ext uri="{C183D7F6-B498-43B3-948B-1728B52AA6E4}">
-                  <adec:decorative xmlns:adec="http://schemas.microsoft.com/office/drawing/2017/decorative" val="1"/>
+                  <adec:decorative xmlns:adec="http://schemas.microsoft.com/office/drawing/2017/decorative" xmlns="" val="1"/>
                 </a:ext>
               </a:extLst>
             </p:cNvPr>
@@ -16784,7 +17026,7 @@
             <p:nvPr>
               <p:extLst>
                 <p:ext uri="{386F3935-93C4-4BCD-93E2-E3B085C9AB24}">
-                  <p16:designElem xmlns:p16="http://schemas.microsoft.com/office/powerpoint/2015/main" val="1"/>
+                  <p16:designElem xmlns:p16="http://schemas.microsoft.com/office/powerpoint/2015/main" xmlns="" val="1"/>
                 </p:ext>
               </p:extLst>
             </p:nvPr>
@@ -16832,10 +17074,10 @@
             <p:cNvPr id="17" name="Rectangle 16">
               <a:extLst>
                 <a:ext uri="{FF2B5EF4-FFF2-40B4-BE49-F238E27FC236}">
-                  <a16:creationId xmlns:a16="http://schemas.microsoft.com/office/drawing/2014/main" id="{ED49787B-8DE6-4467-AD0A-8DECC6E0C2D6}"/>
+                  <a16:creationId xmlns:a16="http://schemas.microsoft.com/office/drawing/2014/main" xmlns="" id="{ED49787B-8DE6-4467-AD0A-8DECC6E0C2D6}"/>
                 </a:ext>
                 <a:ext uri="{C183D7F6-B498-43B3-948B-1728B52AA6E4}">
-                  <adec:decorative xmlns:adec="http://schemas.microsoft.com/office/drawing/2017/decorative" val="1"/>
+                  <adec:decorative xmlns:adec="http://schemas.microsoft.com/office/drawing/2017/decorative" xmlns="" val="1"/>
                 </a:ext>
               </a:extLst>
             </p:cNvPr>
@@ -16843,7 +17085,7 @@
             <p:nvPr>
               <p:extLst>
                 <p:ext uri="{386F3935-93C4-4BCD-93E2-E3B085C9AB24}">
-                  <p16:designElem xmlns:p16="http://schemas.microsoft.com/office/powerpoint/2015/main" val="1"/>
+                  <p16:designElem xmlns:p16="http://schemas.microsoft.com/office/powerpoint/2015/main" xmlns="" val="1"/>
                 </p:ext>
               </p:extLst>
             </p:nvPr>
@@ -16892,10 +17134,10 @@
           <p:cNvPr id="19" name="Rectangle 18">
             <a:extLst>
               <a:ext uri="{FF2B5EF4-FFF2-40B4-BE49-F238E27FC236}">
-                <a16:creationId xmlns:a16="http://schemas.microsoft.com/office/drawing/2014/main" id="{D5B0017B-2ECA-49AF-B397-DC140825DF8D}"/>
+                <a16:creationId xmlns:a16="http://schemas.microsoft.com/office/drawing/2014/main" xmlns="" id="{D5B0017B-2ECA-49AF-B397-DC140825DF8D}"/>
               </a:ext>
               <a:ext uri="{C183D7F6-B498-43B3-948B-1728B52AA6E4}">
-                <adec:decorative xmlns:adec="http://schemas.microsoft.com/office/drawing/2017/decorative" val="1"/>
+                <adec:decorative xmlns:adec="http://schemas.microsoft.com/office/drawing/2017/decorative" xmlns="" val="1"/>
               </a:ext>
             </a:extLst>
           </p:cNvPr>
@@ -16905,7 +17147,7 @@
           <p:nvPr>
             <p:extLst>
               <p:ext uri="{386F3935-93C4-4BCD-93E2-E3B085C9AB24}">
-                <p16:designElem xmlns:p16="http://schemas.microsoft.com/office/powerpoint/2015/main" val="1"/>
+                <p16:designElem xmlns:p16="http://schemas.microsoft.com/office/powerpoint/2015/main" xmlns="" val="1"/>
               </p:ext>
             </p:extLst>
           </p:nvPr>
@@ -16962,7 +17204,7 @@
           <p:cNvPr id="2" name="Title 1">
             <a:extLst>
               <a:ext uri="{FF2B5EF4-FFF2-40B4-BE49-F238E27FC236}">
-                <a16:creationId xmlns:a16="http://schemas.microsoft.com/office/drawing/2014/main" id="{DA10EC88-18AF-96B2-55CF-FF1B99E740AD}"/>
+                <a16:creationId xmlns:a16="http://schemas.microsoft.com/office/drawing/2014/main" xmlns="" id="{DA10EC88-18AF-96B2-55CF-FF1B99E740AD}"/>
               </a:ext>
             </a:extLst>
           </p:cNvPr>
@@ -16997,7 +17239,7 @@
           <p:cNvPr id="3" name="Content Placeholder 2">
             <a:extLst>
               <a:ext uri="{FF2B5EF4-FFF2-40B4-BE49-F238E27FC236}">
-                <a16:creationId xmlns:a16="http://schemas.microsoft.com/office/drawing/2014/main" id="{FB8895F1-208C-B9D1-A066-4F06EA417D34}"/>
+                <a16:creationId xmlns:a16="http://schemas.microsoft.com/office/drawing/2014/main" xmlns="" id="{FB8895F1-208C-B9D1-A066-4F06EA417D34}"/>
               </a:ext>
             </a:extLst>
           </p:cNvPr>
@@ -17118,10 +17360,10 @@
           <p:cNvPr id="21" name="Rectangle 20">
             <a:extLst>
               <a:ext uri="{FF2B5EF4-FFF2-40B4-BE49-F238E27FC236}">
-                <a16:creationId xmlns:a16="http://schemas.microsoft.com/office/drawing/2014/main" id="{395ECC94-3D5E-46A7-A7A1-DE807E1563B4}"/>
+                <a16:creationId xmlns:a16="http://schemas.microsoft.com/office/drawing/2014/main" xmlns="" id="{395ECC94-3D5E-46A7-A7A1-DE807E1563B4}"/>
               </a:ext>
               <a:ext uri="{C183D7F6-B498-43B3-948B-1728B52AA6E4}">
-                <adec:decorative xmlns:adec="http://schemas.microsoft.com/office/drawing/2017/decorative" val="1"/>
+                <adec:decorative xmlns:adec="http://schemas.microsoft.com/office/drawing/2017/decorative" xmlns="" val="1"/>
               </a:ext>
             </a:extLst>
           </p:cNvPr>
@@ -17131,7 +17373,7 @@
           <p:nvPr>
             <p:extLst>
               <p:ext uri="{386F3935-93C4-4BCD-93E2-E3B085C9AB24}">
-                <p16:designElem xmlns:p16="http://schemas.microsoft.com/office/powerpoint/2015/main" val="1"/>
+                <p16:designElem xmlns:p16="http://schemas.microsoft.com/office/powerpoint/2015/main" xmlns="" val="1"/>
               </p:ext>
             </p:extLst>
           </p:nvPr>
@@ -17188,10 +17430,10 @@
           <p:cNvPr id="23" name="Rectangle 22">
             <a:extLst>
               <a:ext uri="{FF2B5EF4-FFF2-40B4-BE49-F238E27FC236}">
-                <a16:creationId xmlns:a16="http://schemas.microsoft.com/office/drawing/2014/main" id="{7E549738-9961-462D-81B7-4A7A44691102}"/>
+                <a16:creationId xmlns:a16="http://schemas.microsoft.com/office/drawing/2014/main" xmlns="" id="{7E549738-9961-462D-81B7-4A7A44691102}"/>
               </a:ext>
               <a:ext uri="{C183D7F6-B498-43B3-948B-1728B52AA6E4}">
-                <adec:decorative xmlns:adec="http://schemas.microsoft.com/office/drawing/2017/decorative" val="1"/>
+                <adec:decorative xmlns:adec="http://schemas.microsoft.com/office/drawing/2017/decorative" xmlns="" val="1"/>
               </a:ext>
             </a:extLst>
           </p:cNvPr>
@@ -17201,7 +17443,7 @@
           <p:nvPr>
             <p:extLst>
               <p:ext uri="{386F3935-93C4-4BCD-93E2-E3B085C9AB24}">
-                <p16:designElem xmlns:p16="http://schemas.microsoft.com/office/powerpoint/2015/main" val="1"/>
+                <p16:designElem xmlns:p16="http://schemas.microsoft.com/office/powerpoint/2015/main" xmlns="" val="1"/>
               </p:ext>
             </p:extLst>
           </p:nvPr>
@@ -17258,7 +17500,7 @@
           <p:cNvPr id="5" name="Picture 4">
             <a:extLst>
               <a:ext uri="{FF2B5EF4-FFF2-40B4-BE49-F238E27FC236}">
-                <a16:creationId xmlns:a16="http://schemas.microsoft.com/office/drawing/2014/main" id="{2A957248-BB1F-736B-DE00-B5BEB91A6DD8}"/>
+                <a16:creationId xmlns:a16="http://schemas.microsoft.com/office/drawing/2014/main" xmlns="" id="{2A957248-BB1F-736B-DE00-B5BEB91A6DD8}"/>
               </a:ext>
             </a:extLst>
           </p:cNvPr>
@@ -17288,10 +17530,10 @@
           <p:cNvPr id="25" name="Straight Connector 24">
             <a:extLst>
               <a:ext uri="{FF2B5EF4-FFF2-40B4-BE49-F238E27FC236}">
-                <a16:creationId xmlns:a16="http://schemas.microsoft.com/office/drawing/2014/main" id="{6CF1BAF6-AD41-4082-B212-8A1F9A2E8779}"/>
+                <a16:creationId xmlns:a16="http://schemas.microsoft.com/office/drawing/2014/main" xmlns="" id="{6CF1BAF6-AD41-4082-B212-8A1F9A2E8779}"/>
               </a:ext>
               <a:ext uri="{C183D7F6-B498-43B3-948B-1728B52AA6E4}">
-                <adec:decorative xmlns:adec="http://schemas.microsoft.com/office/drawing/2017/decorative" val="1"/>
+                <adec:decorative xmlns:adec="http://schemas.microsoft.com/office/drawing/2017/decorative" xmlns="" val="1"/>
               </a:ext>
             </a:extLst>
           </p:cNvPr>
@@ -17301,7 +17543,7 @@
           <p:nvPr>
             <p:extLst>
               <p:ext uri="{386F3935-93C4-4BCD-93E2-E3B085C9AB24}">
-                <p16:designElem xmlns:p16="http://schemas.microsoft.com/office/powerpoint/2015/main" val="1"/>
+                <p16:designElem xmlns:p16="http://schemas.microsoft.com/office/powerpoint/2015/main" xmlns="" val="1"/>
               </p:ext>
             </p:extLst>
           </p:nvPr>
@@ -17340,7 +17582,7 @@
           <p:cNvPr id="7" name="Picture 6">
             <a:extLst>
               <a:ext uri="{FF2B5EF4-FFF2-40B4-BE49-F238E27FC236}">
-                <a16:creationId xmlns:a16="http://schemas.microsoft.com/office/drawing/2014/main" id="{8EF91712-6515-E0D4-C5D2-D5917BCD5CCC}"/>
+                <a16:creationId xmlns:a16="http://schemas.microsoft.com/office/drawing/2014/main" xmlns="" id="{8EF91712-6515-E0D4-C5D2-D5917BCD5CCC}"/>
               </a:ext>
             </a:extLst>
           </p:cNvPr>
@@ -17375,6 +17617,13 @@
   <p:clrMapOvr>
     <a:masterClrMapping/>
   </p:clrMapOvr>
+  <p:timing>
+    <p:tnLst>
+      <p:par>
+        <p:cTn id="1" dur="indefinite" restart="never" nodeType="tmRoot"/>
+      </p:par>
+    </p:tnLst>
+  </p:timing>
 </p:sld>
 </file>
 
@@ -17408,10 +17657,10 @@
           <p:cNvPr id="29" name="Rectangle 28">
             <a:extLst>
               <a:ext uri="{FF2B5EF4-FFF2-40B4-BE49-F238E27FC236}">
-                <a16:creationId xmlns:a16="http://schemas.microsoft.com/office/drawing/2014/main" id="{922F19F4-FE70-43DC-856F-2CE5F521DC48}"/>
+                <a16:creationId xmlns:a16="http://schemas.microsoft.com/office/drawing/2014/main" xmlns="" id="{922F19F4-FE70-43DC-856F-2CE5F521DC48}"/>
               </a:ext>
               <a:ext uri="{C183D7F6-B498-43B3-948B-1728B52AA6E4}">
-                <adec:decorative xmlns:adec="http://schemas.microsoft.com/office/drawing/2017/decorative" val="1"/>
+                <adec:decorative xmlns:adec="http://schemas.microsoft.com/office/drawing/2017/decorative" xmlns="" val="1"/>
               </a:ext>
             </a:extLst>
           </p:cNvPr>
@@ -17421,7 +17670,7 @@
           <p:nvPr>
             <p:extLst>
               <p:ext uri="{386F3935-93C4-4BCD-93E2-E3B085C9AB24}">
-                <p16:designElem xmlns:p16="http://schemas.microsoft.com/office/powerpoint/2015/main" val="1"/>
+                <p16:designElem xmlns:p16="http://schemas.microsoft.com/office/powerpoint/2015/main" xmlns="" val="1"/>
               </p:ext>
             </p:extLst>
           </p:nvPr>
@@ -17468,10 +17717,10 @@
           <p:cNvPr id="31" name="Group 30">
             <a:extLst>
               <a:ext uri="{FF2B5EF4-FFF2-40B4-BE49-F238E27FC236}">
-                <a16:creationId xmlns:a16="http://schemas.microsoft.com/office/drawing/2014/main" id="{AE1C45F0-260A-458C-96ED-C1F6D2151219}"/>
+                <a16:creationId xmlns:a16="http://schemas.microsoft.com/office/drawing/2014/main" xmlns="" id="{AE1C45F0-260A-458C-96ED-C1F6D2151219}"/>
               </a:ext>
               <a:ext uri="{C183D7F6-B498-43B3-948B-1728B52AA6E4}">
-                <adec:decorative xmlns:adec="http://schemas.microsoft.com/office/drawing/2017/decorative" val="1"/>
+                <adec:decorative xmlns:adec="http://schemas.microsoft.com/office/drawing/2017/decorative" xmlns="" val="1"/>
               </a:ext>
             </a:extLst>
           </p:cNvPr>
@@ -17481,7 +17730,7 @@
           <p:nvPr>
             <p:extLst>
               <p:ext uri="{386F3935-93C4-4BCD-93E2-E3B085C9AB24}">
-                <p16:designElem xmlns:p16="http://schemas.microsoft.com/office/powerpoint/2015/main" val="1"/>
+                <p16:designElem xmlns:p16="http://schemas.microsoft.com/office/powerpoint/2015/main" xmlns="" val="1"/>
               </p:ext>
             </p:extLst>
           </p:nvPr>
@@ -17502,10 +17751,10 @@
             <p:cNvPr id="32" name="Rectangle 31">
               <a:extLst>
                 <a:ext uri="{FF2B5EF4-FFF2-40B4-BE49-F238E27FC236}">
-                  <a16:creationId xmlns:a16="http://schemas.microsoft.com/office/drawing/2014/main" id="{A6604B49-AD5C-4590-B051-06C8222ECD99}"/>
+                  <a16:creationId xmlns:a16="http://schemas.microsoft.com/office/drawing/2014/main" xmlns="" id="{A6604B49-AD5C-4590-B051-06C8222ECD99}"/>
                 </a:ext>
                 <a:ext uri="{C183D7F6-B498-43B3-948B-1728B52AA6E4}">
-                  <adec:decorative xmlns:adec="http://schemas.microsoft.com/office/drawing/2017/decorative" val="1"/>
+                  <adec:decorative xmlns:adec="http://schemas.microsoft.com/office/drawing/2017/decorative" xmlns="" val="1"/>
                 </a:ext>
               </a:extLst>
             </p:cNvPr>
@@ -17513,7 +17762,7 @@
             <p:nvPr>
               <p:extLst>
                 <p:ext uri="{386F3935-93C4-4BCD-93E2-E3B085C9AB24}">
-                  <p16:designElem xmlns:p16="http://schemas.microsoft.com/office/powerpoint/2015/main" val="1"/>
+                  <p16:designElem xmlns:p16="http://schemas.microsoft.com/office/powerpoint/2015/main" xmlns="" val="1"/>
                 </p:ext>
               </p:extLst>
             </p:nvPr>
@@ -17561,10 +17810,10 @@
             <p:cNvPr id="33" name="Rectangle 32">
               <a:extLst>
                 <a:ext uri="{FF2B5EF4-FFF2-40B4-BE49-F238E27FC236}">
-                  <a16:creationId xmlns:a16="http://schemas.microsoft.com/office/drawing/2014/main" id="{743ECCAF-29C5-4537-947C-7EA1292463DB}"/>
+                  <a16:creationId xmlns:a16="http://schemas.microsoft.com/office/drawing/2014/main" xmlns="" id="{743ECCAF-29C5-4537-947C-7EA1292463DB}"/>
                 </a:ext>
                 <a:ext uri="{C183D7F6-B498-43B3-948B-1728B52AA6E4}">
-                  <adec:decorative xmlns:adec="http://schemas.microsoft.com/office/drawing/2017/decorative" val="1"/>
+                  <adec:decorative xmlns:adec="http://schemas.microsoft.com/office/drawing/2017/decorative" xmlns="" val="1"/>
                 </a:ext>
               </a:extLst>
             </p:cNvPr>
@@ -17572,7 +17821,7 @@
             <p:nvPr>
               <p:extLst>
                 <p:ext uri="{386F3935-93C4-4BCD-93E2-E3B085C9AB24}">
-                  <p16:designElem xmlns:p16="http://schemas.microsoft.com/office/powerpoint/2015/main" val="1"/>
+                  <p16:designElem xmlns:p16="http://schemas.microsoft.com/office/powerpoint/2015/main" xmlns="" val="1"/>
                 </p:ext>
               </p:extLst>
             </p:nvPr>
@@ -17620,10 +17869,10 @@
             <p:cNvPr id="34" name="Rectangle 33">
               <a:extLst>
                 <a:ext uri="{FF2B5EF4-FFF2-40B4-BE49-F238E27FC236}">
-                  <a16:creationId xmlns:a16="http://schemas.microsoft.com/office/drawing/2014/main" id="{ED49787B-8DE6-4467-AD0A-8DECC6E0C2D6}"/>
+                  <a16:creationId xmlns:a16="http://schemas.microsoft.com/office/drawing/2014/main" xmlns="" id="{ED49787B-8DE6-4467-AD0A-8DECC6E0C2D6}"/>
                 </a:ext>
                 <a:ext uri="{C183D7F6-B498-43B3-948B-1728B52AA6E4}">
-                  <adec:decorative xmlns:adec="http://schemas.microsoft.com/office/drawing/2017/decorative" val="1"/>
+                  <adec:decorative xmlns:adec="http://schemas.microsoft.com/office/drawing/2017/decorative" xmlns="" val="1"/>
                 </a:ext>
               </a:extLst>
             </p:cNvPr>
@@ -17631,7 +17880,7 @@
             <p:nvPr>
               <p:extLst>
                 <p:ext uri="{386F3935-93C4-4BCD-93E2-E3B085C9AB24}">
-                  <p16:designElem xmlns:p16="http://schemas.microsoft.com/office/powerpoint/2015/main" val="1"/>
+                  <p16:designElem xmlns:p16="http://schemas.microsoft.com/office/powerpoint/2015/main" xmlns="" val="1"/>
                 </p:ext>
               </p:extLst>
             </p:nvPr>
@@ -17680,10 +17929,10 @@
           <p:cNvPr id="36" name="Rectangle 35">
             <a:extLst>
               <a:ext uri="{FF2B5EF4-FFF2-40B4-BE49-F238E27FC236}">
-                <a16:creationId xmlns:a16="http://schemas.microsoft.com/office/drawing/2014/main" id="{D5B0017B-2ECA-49AF-B397-DC140825DF8D}"/>
+                <a16:creationId xmlns:a16="http://schemas.microsoft.com/office/drawing/2014/main" xmlns="" id="{D5B0017B-2ECA-49AF-B397-DC140825DF8D}"/>
               </a:ext>
               <a:ext uri="{C183D7F6-B498-43B3-948B-1728B52AA6E4}">
-                <adec:decorative xmlns:adec="http://schemas.microsoft.com/office/drawing/2017/decorative" val="1"/>
+                <adec:decorative xmlns:adec="http://schemas.microsoft.com/office/drawing/2017/decorative" xmlns="" val="1"/>
               </a:ext>
             </a:extLst>
           </p:cNvPr>
@@ -17693,7 +17942,7 @@
           <p:nvPr>
             <p:extLst>
               <p:ext uri="{386F3935-93C4-4BCD-93E2-E3B085C9AB24}">
-                <p16:designElem xmlns:p16="http://schemas.microsoft.com/office/powerpoint/2015/main" val="1"/>
+                <p16:designElem xmlns:p16="http://schemas.microsoft.com/office/powerpoint/2015/main" xmlns="" val="1"/>
               </p:ext>
             </p:extLst>
           </p:nvPr>
@@ -17750,7 +17999,7 @@
           <p:cNvPr id="2" name="Title 1">
             <a:extLst>
               <a:ext uri="{FF2B5EF4-FFF2-40B4-BE49-F238E27FC236}">
-                <a16:creationId xmlns:a16="http://schemas.microsoft.com/office/drawing/2014/main" id="{2CE4C499-F44B-E1A5-CC44-5020391884ED}"/>
+                <a16:creationId xmlns:a16="http://schemas.microsoft.com/office/drawing/2014/main" xmlns="" id="{2CE4C499-F44B-E1A5-CC44-5020391884ED}"/>
               </a:ext>
             </a:extLst>
           </p:cNvPr>
@@ -17785,7 +18034,7 @@
           <p:cNvPr id="3" name="Content Placeholder 2">
             <a:extLst>
               <a:ext uri="{FF2B5EF4-FFF2-40B4-BE49-F238E27FC236}">
-                <a16:creationId xmlns:a16="http://schemas.microsoft.com/office/drawing/2014/main" id="{91AA0A6F-9208-DFD5-DC6C-1C07E6516D1B}"/>
+                <a16:creationId xmlns:a16="http://schemas.microsoft.com/office/drawing/2014/main" xmlns="" id="{91AA0A6F-9208-DFD5-DC6C-1C07E6516D1B}"/>
               </a:ext>
             </a:extLst>
           </p:cNvPr>
@@ -17883,7 +18132,15 @@
             </a:pPr>
             <a:r>
               <a:rPr lang="en-US" sz="1700" dirty="0"/>
-              <a:t>distance which is approx. 42.91 miles or kms</a:t>
+              <a:t>distance which is approx. </a:t>
+            </a:r>
+            <a:r>
+              <a:rPr lang="en-US" sz="1700" dirty="0" smtClean="0"/>
+              <a:t>43.91 </a:t>
+            </a:r>
+            <a:r>
+              <a:rPr lang="en-US" sz="1700" dirty="0"/>
+              <a:t>miles or kms</a:t>
             </a:r>
           </a:p>
           <a:p>
@@ -17899,10 +18156,10 @@
           <p:cNvPr id="38" name="Rectangle 37">
             <a:extLst>
               <a:ext uri="{FF2B5EF4-FFF2-40B4-BE49-F238E27FC236}">
-                <a16:creationId xmlns:a16="http://schemas.microsoft.com/office/drawing/2014/main" id="{395ECC94-3D5E-46A7-A7A1-DE807E1563B4}"/>
+                <a16:creationId xmlns:a16="http://schemas.microsoft.com/office/drawing/2014/main" xmlns="" id="{395ECC94-3D5E-46A7-A7A1-DE807E1563B4}"/>
               </a:ext>
               <a:ext uri="{C183D7F6-B498-43B3-948B-1728B52AA6E4}">
-                <adec:decorative xmlns:adec="http://schemas.microsoft.com/office/drawing/2017/decorative" val="1"/>
+                <adec:decorative xmlns:adec="http://schemas.microsoft.com/office/drawing/2017/decorative" xmlns="" val="1"/>
               </a:ext>
             </a:extLst>
           </p:cNvPr>
@@ -17912,7 +18169,7 @@
           <p:nvPr>
             <p:extLst>
               <p:ext uri="{386F3935-93C4-4BCD-93E2-E3B085C9AB24}">
-                <p16:designElem xmlns:p16="http://schemas.microsoft.com/office/powerpoint/2015/main" val="1"/>
+                <p16:designElem xmlns:p16="http://schemas.microsoft.com/office/powerpoint/2015/main" xmlns="" val="1"/>
               </p:ext>
             </p:extLst>
           </p:nvPr>
@@ -17969,10 +18226,10 @@
           <p:cNvPr id="40" name="Rectangle 39">
             <a:extLst>
               <a:ext uri="{FF2B5EF4-FFF2-40B4-BE49-F238E27FC236}">
-                <a16:creationId xmlns:a16="http://schemas.microsoft.com/office/drawing/2014/main" id="{7E549738-9961-462D-81B7-4A7A44691102}"/>
+                <a16:creationId xmlns:a16="http://schemas.microsoft.com/office/drawing/2014/main" xmlns="" id="{7E549738-9961-462D-81B7-4A7A44691102}"/>
               </a:ext>
               <a:ext uri="{C183D7F6-B498-43B3-948B-1728B52AA6E4}">
-                <adec:decorative xmlns:adec="http://schemas.microsoft.com/office/drawing/2017/decorative" val="1"/>
+                <adec:decorative xmlns:adec="http://schemas.microsoft.com/office/drawing/2017/decorative" xmlns="" val="1"/>
               </a:ext>
             </a:extLst>
           </p:cNvPr>
@@ -17982,7 +18239,7 @@
           <p:nvPr>
             <p:extLst>
               <p:ext uri="{386F3935-93C4-4BCD-93E2-E3B085C9AB24}">
-                <p16:designElem xmlns:p16="http://schemas.microsoft.com/office/powerpoint/2015/main" val="1"/>
+                <p16:designElem xmlns:p16="http://schemas.microsoft.com/office/powerpoint/2015/main" xmlns="" val="1"/>
               </p:ext>
             </p:extLst>
           </p:nvPr>
@@ -18039,7 +18296,7 @@
           <p:cNvPr id="5" name="Picture 4">
             <a:extLst>
               <a:ext uri="{FF2B5EF4-FFF2-40B4-BE49-F238E27FC236}">
-                <a16:creationId xmlns:a16="http://schemas.microsoft.com/office/drawing/2014/main" id="{BB4B2E19-DE53-67FD-CA3C-BB4D68E41613}"/>
+                <a16:creationId xmlns:a16="http://schemas.microsoft.com/office/drawing/2014/main" xmlns="" id="{BB4B2E19-DE53-67FD-CA3C-BB4D68E41613}"/>
               </a:ext>
             </a:extLst>
           </p:cNvPr>
@@ -18069,10 +18326,10 @@
           <p:cNvPr id="42" name="Straight Connector 41">
             <a:extLst>
               <a:ext uri="{FF2B5EF4-FFF2-40B4-BE49-F238E27FC236}">
-                <a16:creationId xmlns:a16="http://schemas.microsoft.com/office/drawing/2014/main" id="{6CF1BAF6-AD41-4082-B212-8A1F9A2E8779}"/>
+                <a16:creationId xmlns:a16="http://schemas.microsoft.com/office/drawing/2014/main" xmlns="" id="{6CF1BAF6-AD41-4082-B212-8A1F9A2E8779}"/>
               </a:ext>
               <a:ext uri="{C183D7F6-B498-43B3-948B-1728B52AA6E4}">
-                <adec:decorative xmlns:adec="http://schemas.microsoft.com/office/drawing/2017/decorative" val="1"/>
+                <adec:decorative xmlns:adec="http://schemas.microsoft.com/office/drawing/2017/decorative" xmlns="" val="1"/>
               </a:ext>
             </a:extLst>
           </p:cNvPr>
@@ -18082,7 +18339,7 @@
           <p:nvPr>
             <p:extLst>
               <p:ext uri="{386F3935-93C4-4BCD-93E2-E3B085C9AB24}">
-                <p16:designElem xmlns:p16="http://schemas.microsoft.com/office/powerpoint/2015/main" val="1"/>
+                <p16:designElem xmlns:p16="http://schemas.microsoft.com/office/powerpoint/2015/main" xmlns="" val="1"/>
               </p:ext>
             </p:extLst>
           </p:nvPr>
@@ -18121,7 +18378,7 @@
           <p:cNvPr id="9" name="Picture 8">
             <a:extLst>
               <a:ext uri="{FF2B5EF4-FFF2-40B4-BE49-F238E27FC236}">
-                <a16:creationId xmlns:a16="http://schemas.microsoft.com/office/drawing/2014/main" id="{517EDD7F-0331-7733-F690-6CECD002AAA9}"/>
+                <a16:creationId xmlns:a16="http://schemas.microsoft.com/office/drawing/2014/main" xmlns="" id="{517EDD7F-0331-7733-F690-6CECD002AAA9}"/>
               </a:ext>
             </a:extLst>
           </p:cNvPr>
@@ -18156,6 +18413,13 @@
   <p:clrMapOvr>
     <a:masterClrMapping/>
   </p:clrMapOvr>
+  <p:timing>
+    <p:tnLst>
+      <p:par>
+        <p:cTn id="1" dur="indefinite" restart="never" nodeType="tmRoot"/>
+      </p:par>
+    </p:tnLst>
+  </p:timing>
 </p:sld>
 </file>
 
@@ -18181,7 +18445,7 @@
           <p:cNvPr id="2" name="Title 1">
             <a:extLst>
               <a:ext uri="{FF2B5EF4-FFF2-40B4-BE49-F238E27FC236}">
-                <a16:creationId xmlns:a16="http://schemas.microsoft.com/office/drawing/2014/main" id="{BE48449E-7ED7-EC8C-6B0B-D14BB507D7E8}"/>
+                <a16:creationId xmlns:a16="http://schemas.microsoft.com/office/drawing/2014/main" xmlns="" id="{BE48449E-7ED7-EC8C-6B0B-D14BB507D7E8}"/>
               </a:ext>
             </a:extLst>
           </p:cNvPr>
@@ -18218,7 +18482,7 @@
           <p:cNvPr id="3" name="Content Placeholder 2">
             <a:extLst>
               <a:ext uri="{FF2B5EF4-FFF2-40B4-BE49-F238E27FC236}">
-                <a16:creationId xmlns:a16="http://schemas.microsoft.com/office/drawing/2014/main" id="{A5A427DB-D4EB-5A07-C937-1F639C48A17F}"/>
+                <a16:creationId xmlns:a16="http://schemas.microsoft.com/office/drawing/2014/main" xmlns="" id="{A5A427DB-D4EB-5A07-C937-1F639C48A17F}"/>
               </a:ext>
             </a:extLst>
           </p:cNvPr>
@@ -18237,7 +18501,7 @@
         </p:spPr>
         <p:txBody>
           <a:bodyPr>
-            <a:normAutofit/>
+            <a:normAutofit lnSpcReduction="10000"/>
           </a:bodyPr>
           <a:lstStyle/>
           <a:p>
@@ -18309,7 +18573,23 @@
                   <a:srgbClr val="FF0000"/>
                 </a:solidFill>
               </a:rPr>
-              <a:t>60%</a:t>
+              <a:t>4</a:t>
+            </a:r>
+            <a:r>
+              <a:rPr lang="en-US" sz="1800" dirty="0" smtClean="0">
+                <a:solidFill>
+                  <a:srgbClr val="FF0000"/>
+                </a:solidFill>
+              </a:rPr>
+              <a:t>0</a:t>
+            </a:r>
+            <a:r>
+              <a:rPr lang="en-US" sz="1800" dirty="0">
+                <a:solidFill>
+                  <a:srgbClr val="FF0000"/>
+                </a:solidFill>
+              </a:rPr>
+              <a:t>%</a:t>
             </a:r>
           </a:p>
           <a:p>
@@ -18323,8 +18603,30 @@
           </a:p>
           <a:p>
             <a:r>
+              <a:rPr lang="en-US" sz="1800" dirty="0" smtClean="0"/>
+              <a:t>More than </a:t>
+            </a:r>
+            <a:r>
+              <a:rPr lang="en-US" sz="1800" dirty="0" smtClean="0">
+                <a:solidFill>
+                  <a:srgbClr val="00B050"/>
+                </a:solidFill>
+              </a:rPr>
+              <a:t>60k customers reached </a:t>
+            </a:r>
+            <a:r>
+              <a:rPr lang="en-US" sz="1800" dirty="0" smtClean="0"/>
+              <a:t>via email catalogues delivered</a:t>
+            </a:r>
+          </a:p>
+          <a:p>
+            <a:r>
+              <a:rPr lang="en-US" sz="1800" dirty="0" smtClean="0"/>
+              <a:t>Spike </a:t>
+            </a:r>
+            <a:r>
               <a:rPr lang="en-US" sz="1800" dirty="0"/>
-              <a:t>Spike seen has resulted in a positive way, the trend is</a:t>
+              <a:t>seen has resulted in a positive way, the trend is</a:t>
             </a:r>
           </a:p>
           <a:p>
@@ -18333,8 +18635,13 @@
             </a:pPr>
             <a:r>
               <a:rPr lang="en-US" sz="1800" dirty="0"/>
-              <a:t>analogous with sales revenue</a:t>
-            </a:r>
+              <a:t>analogous with sales </a:t>
+            </a:r>
+            <a:r>
+              <a:rPr lang="en-US" sz="1800" dirty="0" smtClean="0"/>
+              <a:t>in August month</a:t>
+            </a:r>
+            <a:endParaRPr lang="en-US" sz="1800" dirty="0"/>
           </a:p>
           <a:p>
             <a:r>
@@ -18348,7 +18655,15 @@
             </a:pPr>
             <a:r>
               <a:rPr lang="en-US" sz="1800" dirty="0"/>
-              <a:t>See an uptick in Internet transactions and hence sales</a:t>
+              <a:t>s</a:t>
+            </a:r>
+            <a:r>
+              <a:rPr lang="en-US" sz="1800" dirty="0" smtClean="0"/>
+              <a:t>ee </a:t>
+            </a:r>
+            <a:r>
+              <a:rPr lang="en-US" sz="1800" dirty="0"/>
+              <a:t>an uptick in Internet transactions and hence sales</a:t>
             </a:r>
           </a:p>
           <a:p>
@@ -18364,7 +18679,7 @@
           <p:cNvPr id="5" name="Picture 4">
             <a:extLst>
               <a:ext uri="{FF2B5EF4-FFF2-40B4-BE49-F238E27FC236}">
-                <a16:creationId xmlns:a16="http://schemas.microsoft.com/office/drawing/2014/main" id="{F3CA0C3B-FB6A-329A-3BD7-98CEE74843DC}"/>
+                <a16:creationId xmlns:a16="http://schemas.microsoft.com/office/drawing/2014/main" xmlns="" id="{F3CA0C3B-FB6A-329A-3BD7-98CEE74843DC}"/>
               </a:ext>
             </a:extLst>
           </p:cNvPr>
@@ -18394,7 +18709,7 @@
           <p:cNvPr id="11" name="Picture 10">
             <a:extLst>
               <a:ext uri="{FF2B5EF4-FFF2-40B4-BE49-F238E27FC236}">
-                <a16:creationId xmlns:a16="http://schemas.microsoft.com/office/drawing/2014/main" id="{85955C00-B8C3-ACDA-C260-AC4631246B4C}"/>
+                <a16:creationId xmlns:a16="http://schemas.microsoft.com/office/drawing/2014/main" xmlns="" id="{85955C00-B8C3-ACDA-C260-AC4631246B4C}"/>
               </a:ext>
             </a:extLst>
           </p:cNvPr>
@@ -18424,7 +18739,7 @@
           <p:cNvPr id="13" name="Picture 12">
             <a:extLst>
               <a:ext uri="{FF2B5EF4-FFF2-40B4-BE49-F238E27FC236}">
-                <a16:creationId xmlns:a16="http://schemas.microsoft.com/office/drawing/2014/main" id="{9A7214E3-9ED2-27E2-3FF1-4C7985DAF122}"/>
+                <a16:creationId xmlns:a16="http://schemas.microsoft.com/office/drawing/2014/main" xmlns="" id="{9A7214E3-9ED2-27E2-3FF1-4C7985DAF122}"/>
               </a:ext>
             </a:extLst>
           </p:cNvPr>
@@ -18459,6 +18774,13 @@
   <p:clrMapOvr>
     <a:masterClrMapping/>
   </p:clrMapOvr>
+  <p:timing>
+    <p:tnLst>
+      <p:par>
+        <p:cTn id="1" dur="indefinite" restart="never" nodeType="tmRoot"/>
+      </p:par>
+    </p:tnLst>
+  </p:timing>
 </p:sld>
 </file>
 
@@ -18505,7 +18827,7 @@
     </a:clrScheme>
     <a:fontScheme name="Office">
       <a:majorFont>
-        <a:latin typeface="Calibri Light" panose="020F0302020204030204"/>
+        <a:latin typeface="Calibri Light"/>
         <a:ea typeface=""/>
         <a:cs typeface=""/>
         <a:font script="Jpan" typeface="游ゴシック Light"/>
@@ -18557,7 +18879,7 @@
         <a:font script="Tfng" typeface="Ebrima"/>
       </a:majorFont>
       <a:minorFont>
-        <a:latin typeface="Calibri" panose="020F0502020204030204"/>
+        <a:latin typeface="Calibri"/>
         <a:ea typeface=""/>
         <a:cs typeface=""/>
         <a:font script="Jpan" typeface="游ゴシック"/>
@@ -18751,7 +19073,7 @@
   <a:extraClrSchemeLst/>
   <a:extLst>
     <a:ext uri="{05A4C25C-085E-4340-85A3-A5531E510DB2}">
-      <thm15:themeFamily xmlns:thm15="http://schemas.microsoft.com/office/thememl/2012/main" name="Office Theme" id="{62F939B6-93AF-4DB8-9C6B-D6C7DFDC589F}" vid="{4A3C46E8-61CC-4603-A589-7422A47A8E4A}"/>
+      <thm15:themeFamily xmlns:thm15="http://schemas.microsoft.com/office/thememl/2012/main" xmlns="" name="Office Theme" id="{62F939B6-93AF-4DB8-9C6B-D6C7DFDC589F}" vid="{4A3C46E8-61CC-4603-A589-7422A47A8E4A}"/>
     </a:ext>
   </a:extLst>
 </a:theme>

</xml_diff>